<commit_message>
remove simplification by postcode
</commit_message>
<xml_diff>
--- a/final_presentation.pptx
+++ b/final_presentation.pptx
@@ -4,10 +4,16 @@
   <p:sldMasterIdLst>
     <p:sldMasterId id="2147483648" r:id="rId1"/>
   </p:sldMasterIdLst>
+  <p:notesMasterIdLst>
+    <p:notesMasterId r:id="rId8"/>
+  </p:notesMasterIdLst>
   <p:sldIdLst>
     <p:sldId id="256" r:id="rId2"/>
     <p:sldId id="257" r:id="rId3"/>
     <p:sldId id="258" r:id="rId4"/>
+    <p:sldId id="259" r:id="rId5"/>
+    <p:sldId id="260" r:id="rId6"/>
+    <p:sldId id="261" r:id="rId7"/>
   </p:sldIdLst>
   <p:sldSz cx="12192000" cy="6858000"/>
   <p:notesSz cx="6858000" cy="9144000"/>
@@ -106,7 +112,445 @@
       </a:defRPr>
     </a:lvl9pPr>
   </p:defaultTextStyle>
+  <p:extLst>
+    <p:ext uri="{EFAFB233-063F-42B5-8137-9DF3F51BA10A}">
+      <p15:sldGuideLst xmlns:p15="http://schemas.microsoft.com/office/powerpoint/2012/main"/>
+    </p:ext>
+  </p:extLst>
 </p:presentation>
+</file>
+
+<file path=ppt/notesMasters/notesMaster1.xml><?xml version="1.0" encoding="utf-8"?>
+<p:notesMaster xmlns:a="http://schemas.openxmlformats.org/drawingml/2006/main" xmlns:r="http://schemas.openxmlformats.org/officeDocument/2006/relationships" xmlns:p="http://schemas.openxmlformats.org/presentationml/2006/main">
+  <p:cSld>
+    <p:bg>
+      <p:bgRef idx="1001">
+        <a:schemeClr val="bg1"/>
+      </p:bgRef>
+    </p:bg>
+    <p:spTree>
+      <p:nvGrpSpPr>
+        <p:cNvPr id="1" name=""/>
+        <p:cNvGrpSpPr/>
+        <p:nvPr/>
+      </p:nvGrpSpPr>
+      <p:grpSpPr>
+        <a:xfrm>
+          <a:off x="0" y="0"/>
+          <a:ext cx="0" cy="0"/>
+          <a:chOff x="0" y="0"/>
+          <a:chExt cx="0" cy="0"/>
+        </a:xfrm>
+      </p:grpSpPr>
+      <p:sp>
+        <p:nvSpPr>
+          <p:cNvPr id="2" name="Header Placeholder 1"/>
+          <p:cNvSpPr>
+            <a:spLocks noGrp="1"/>
+          </p:cNvSpPr>
+          <p:nvPr>
+            <p:ph type="hdr" sz="quarter"/>
+          </p:nvPr>
+        </p:nvSpPr>
+        <p:spPr>
+          <a:xfrm>
+            <a:off x="0" y="0"/>
+            <a:ext cx="2971800" cy="458788"/>
+          </a:xfrm>
+          <a:prstGeom prst="rect">
+            <a:avLst/>
+          </a:prstGeom>
+        </p:spPr>
+        <p:txBody>
+          <a:bodyPr vert="horz" lIns="91440" tIns="45720" rIns="91440" bIns="45720" rtlCol="0"/>
+          <a:lstStyle>
+            <a:lvl1pPr algn="l">
+              <a:defRPr sz="1200"/>
+            </a:lvl1pPr>
+          </a:lstStyle>
+          <a:p>
+            <a:endParaRPr lang="en-US"/>
+          </a:p>
+        </p:txBody>
+      </p:sp>
+      <p:sp>
+        <p:nvSpPr>
+          <p:cNvPr id="3" name="Date Placeholder 2"/>
+          <p:cNvSpPr>
+            <a:spLocks noGrp="1"/>
+          </p:cNvSpPr>
+          <p:nvPr>
+            <p:ph type="dt" idx="1"/>
+          </p:nvPr>
+        </p:nvSpPr>
+        <p:spPr>
+          <a:xfrm>
+            <a:off x="3884613" y="0"/>
+            <a:ext cx="2971800" cy="458788"/>
+          </a:xfrm>
+          <a:prstGeom prst="rect">
+            <a:avLst/>
+          </a:prstGeom>
+        </p:spPr>
+        <p:txBody>
+          <a:bodyPr vert="horz" lIns="91440" tIns="45720" rIns="91440" bIns="45720" rtlCol="0"/>
+          <a:lstStyle>
+            <a:lvl1pPr algn="r">
+              <a:defRPr sz="1200"/>
+            </a:lvl1pPr>
+          </a:lstStyle>
+          <a:p>
+            <a:fld id="{91536E7A-20AD-974C-B880-153D8C44A64B}" type="datetimeFigureOut">
+              <a:rPr lang="en-US" smtClean="0"/>
+              <a:t>2/16/20</a:t>
+            </a:fld>
+            <a:endParaRPr lang="en-US"/>
+          </a:p>
+        </p:txBody>
+      </p:sp>
+      <p:sp>
+        <p:nvSpPr>
+          <p:cNvPr id="4" name="Slide Image Placeholder 3"/>
+          <p:cNvSpPr>
+            <a:spLocks noGrp="1" noRot="1" noChangeAspect="1"/>
+          </p:cNvSpPr>
+          <p:nvPr>
+            <p:ph type="sldImg" idx="2"/>
+          </p:nvPr>
+        </p:nvSpPr>
+        <p:spPr>
+          <a:xfrm>
+            <a:off x="685800" y="1143000"/>
+            <a:ext cx="5486400" cy="3086100"/>
+          </a:xfrm>
+          <a:prstGeom prst="rect">
+            <a:avLst/>
+          </a:prstGeom>
+          <a:noFill/>
+          <a:ln w="12700">
+            <a:solidFill>
+              <a:prstClr val="black"/>
+            </a:solidFill>
+          </a:ln>
+        </p:spPr>
+        <p:txBody>
+          <a:bodyPr vert="horz" lIns="91440" tIns="45720" rIns="91440" bIns="45720" rtlCol="0" anchor="ctr"/>
+          <a:lstStyle/>
+          <a:p>
+            <a:endParaRPr lang="en-US"/>
+          </a:p>
+        </p:txBody>
+      </p:sp>
+      <p:sp>
+        <p:nvSpPr>
+          <p:cNvPr id="5" name="Notes Placeholder 4"/>
+          <p:cNvSpPr>
+            <a:spLocks noGrp="1"/>
+          </p:cNvSpPr>
+          <p:nvPr>
+            <p:ph type="body" sz="quarter" idx="3"/>
+          </p:nvPr>
+        </p:nvSpPr>
+        <p:spPr>
+          <a:xfrm>
+            <a:off x="685800" y="4400550"/>
+            <a:ext cx="5486400" cy="3600450"/>
+          </a:xfrm>
+          <a:prstGeom prst="rect">
+            <a:avLst/>
+          </a:prstGeom>
+        </p:spPr>
+        <p:txBody>
+          <a:bodyPr vert="horz" lIns="91440" tIns="45720" rIns="91440" bIns="45720" rtlCol="0"/>
+          <a:lstStyle/>
+          <a:p>
+            <a:pPr lvl="0"/>
+            <a:r>
+              <a:rPr lang="en-US"/>
+              <a:t>Edit Master text styles</a:t>
+            </a:r>
+          </a:p>
+          <a:p>
+            <a:pPr lvl="1"/>
+            <a:r>
+              <a:rPr lang="en-US"/>
+              <a:t>Second level</a:t>
+            </a:r>
+          </a:p>
+          <a:p>
+            <a:pPr lvl="2"/>
+            <a:r>
+              <a:rPr lang="en-US"/>
+              <a:t>Third level</a:t>
+            </a:r>
+          </a:p>
+          <a:p>
+            <a:pPr lvl="3"/>
+            <a:r>
+              <a:rPr lang="en-US"/>
+              <a:t>Fourth level</a:t>
+            </a:r>
+          </a:p>
+          <a:p>
+            <a:pPr lvl="4"/>
+            <a:r>
+              <a:rPr lang="en-US"/>
+              <a:t>Fifth level</a:t>
+            </a:r>
+          </a:p>
+        </p:txBody>
+      </p:sp>
+      <p:sp>
+        <p:nvSpPr>
+          <p:cNvPr id="6" name="Footer Placeholder 5"/>
+          <p:cNvSpPr>
+            <a:spLocks noGrp="1"/>
+          </p:cNvSpPr>
+          <p:nvPr>
+            <p:ph type="ftr" sz="quarter" idx="4"/>
+          </p:nvPr>
+        </p:nvSpPr>
+        <p:spPr>
+          <a:xfrm>
+            <a:off x="0" y="8685213"/>
+            <a:ext cx="2971800" cy="458787"/>
+          </a:xfrm>
+          <a:prstGeom prst="rect">
+            <a:avLst/>
+          </a:prstGeom>
+        </p:spPr>
+        <p:txBody>
+          <a:bodyPr vert="horz" lIns="91440" tIns="45720" rIns="91440" bIns="45720" rtlCol="0" anchor="b"/>
+          <a:lstStyle>
+            <a:lvl1pPr algn="l">
+              <a:defRPr sz="1200"/>
+            </a:lvl1pPr>
+          </a:lstStyle>
+          <a:p>
+            <a:endParaRPr lang="en-US"/>
+          </a:p>
+        </p:txBody>
+      </p:sp>
+      <p:sp>
+        <p:nvSpPr>
+          <p:cNvPr id="7" name="Slide Number Placeholder 6"/>
+          <p:cNvSpPr>
+            <a:spLocks noGrp="1"/>
+          </p:cNvSpPr>
+          <p:nvPr>
+            <p:ph type="sldNum" sz="quarter" idx="5"/>
+          </p:nvPr>
+        </p:nvSpPr>
+        <p:spPr>
+          <a:xfrm>
+            <a:off x="3884613" y="8685213"/>
+            <a:ext cx="2971800" cy="458787"/>
+          </a:xfrm>
+          <a:prstGeom prst="rect">
+            <a:avLst/>
+          </a:prstGeom>
+        </p:spPr>
+        <p:txBody>
+          <a:bodyPr vert="horz" lIns="91440" tIns="45720" rIns="91440" bIns="45720" rtlCol="0" anchor="b"/>
+          <a:lstStyle>
+            <a:lvl1pPr algn="r">
+              <a:defRPr sz="1200"/>
+            </a:lvl1pPr>
+          </a:lstStyle>
+          <a:p>
+            <a:fld id="{A8983C90-4626-814B-837F-264CA2EC8117}" type="slidenum">
+              <a:rPr lang="en-US" smtClean="0"/>
+              <a:t>‹#›</a:t>
+            </a:fld>
+            <a:endParaRPr lang="en-US"/>
+          </a:p>
+        </p:txBody>
+      </p:sp>
+    </p:spTree>
+    <p:extLst>
+      <p:ext uri="{BB962C8B-B14F-4D97-AF65-F5344CB8AC3E}">
+        <p14:creationId xmlns:p14="http://schemas.microsoft.com/office/powerpoint/2010/main" val="4080618356"/>
+      </p:ext>
+    </p:extLst>
+  </p:cSld>
+  <p:clrMap bg1="lt1" tx1="dk1" bg2="lt2" tx2="dk2" accent1="accent1" accent2="accent2" accent3="accent3" accent4="accent4" accent5="accent5" accent6="accent6" hlink="hlink" folHlink="folHlink"/>
+  <p:notesStyle>
+    <a:lvl1pPr marL="0" algn="l" defTabSz="914400" rtl="0" eaLnBrk="1" latinLnBrk="0" hangingPunct="1">
+      <a:defRPr sz="1200" kern="1200">
+        <a:solidFill>
+          <a:schemeClr val="tx1"/>
+        </a:solidFill>
+        <a:latin typeface="+mn-lt"/>
+        <a:ea typeface="+mn-ea"/>
+        <a:cs typeface="+mn-cs"/>
+      </a:defRPr>
+    </a:lvl1pPr>
+    <a:lvl2pPr marL="457200" algn="l" defTabSz="914400" rtl="0" eaLnBrk="1" latinLnBrk="0" hangingPunct="1">
+      <a:defRPr sz="1200" kern="1200">
+        <a:solidFill>
+          <a:schemeClr val="tx1"/>
+        </a:solidFill>
+        <a:latin typeface="+mn-lt"/>
+        <a:ea typeface="+mn-ea"/>
+        <a:cs typeface="+mn-cs"/>
+      </a:defRPr>
+    </a:lvl2pPr>
+    <a:lvl3pPr marL="914400" algn="l" defTabSz="914400" rtl="0" eaLnBrk="1" latinLnBrk="0" hangingPunct="1">
+      <a:defRPr sz="1200" kern="1200">
+        <a:solidFill>
+          <a:schemeClr val="tx1"/>
+        </a:solidFill>
+        <a:latin typeface="+mn-lt"/>
+        <a:ea typeface="+mn-ea"/>
+        <a:cs typeface="+mn-cs"/>
+      </a:defRPr>
+    </a:lvl3pPr>
+    <a:lvl4pPr marL="1371600" algn="l" defTabSz="914400" rtl="0" eaLnBrk="1" latinLnBrk="0" hangingPunct="1">
+      <a:defRPr sz="1200" kern="1200">
+        <a:solidFill>
+          <a:schemeClr val="tx1"/>
+        </a:solidFill>
+        <a:latin typeface="+mn-lt"/>
+        <a:ea typeface="+mn-ea"/>
+        <a:cs typeface="+mn-cs"/>
+      </a:defRPr>
+    </a:lvl4pPr>
+    <a:lvl5pPr marL="1828800" algn="l" defTabSz="914400" rtl="0" eaLnBrk="1" latinLnBrk="0" hangingPunct="1">
+      <a:defRPr sz="1200" kern="1200">
+        <a:solidFill>
+          <a:schemeClr val="tx1"/>
+        </a:solidFill>
+        <a:latin typeface="+mn-lt"/>
+        <a:ea typeface="+mn-ea"/>
+        <a:cs typeface="+mn-cs"/>
+      </a:defRPr>
+    </a:lvl5pPr>
+    <a:lvl6pPr marL="2286000" algn="l" defTabSz="914400" rtl="0" eaLnBrk="1" latinLnBrk="0" hangingPunct="1">
+      <a:defRPr sz="1200" kern="1200">
+        <a:solidFill>
+          <a:schemeClr val="tx1"/>
+        </a:solidFill>
+        <a:latin typeface="+mn-lt"/>
+        <a:ea typeface="+mn-ea"/>
+        <a:cs typeface="+mn-cs"/>
+      </a:defRPr>
+    </a:lvl6pPr>
+    <a:lvl7pPr marL="2743200" algn="l" defTabSz="914400" rtl="0" eaLnBrk="1" latinLnBrk="0" hangingPunct="1">
+      <a:defRPr sz="1200" kern="1200">
+        <a:solidFill>
+          <a:schemeClr val="tx1"/>
+        </a:solidFill>
+        <a:latin typeface="+mn-lt"/>
+        <a:ea typeface="+mn-ea"/>
+        <a:cs typeface="+mn-cs"/>
+      </a:defRPr>
+    </a:lvl7pPr>
+    <a:lvl8pPr marL="3200400" algn="l" defTabSz="914400" rtl="0" eaLnBrk="1" latinLnBrk="0" hangingPunct="1">
+      <a:defRPr sz="1200" kern="1200">
+        <a:solidFill>
+          <a:schemeClr val="tx1"/>
+        </a:solidFill>
+        <a:latin typeface="+mn-lt"/>
+        <a:ea typeface="+mn-ea"/>
+        <a:cs typeface="+mn-cs"/>
+      </a:defRPr>
+    </a:lvl8pPr>
+    <a:lvl9pPr marL="3657600" algn="l" defTabSz="914400" rtl="0" eaLnBrk="1" latinLnBrk="0" hangingPunct="1">
+      <a:defRPr sz="1200" kern="1200">
+        <a:solidFill>
+          <a:schemeClr val="tx1"/>
+        </a:solidFill>
+        <a:latin typeface="+mn-lt"/>
+        <a:ea typeface="+mn-ea"/>
+        <a:cs typeface="+mn-cs"/>
+      </a:defRPr>
+    </a:lvl9pPr>
+  </p:notesStyle>
+</p:notesMaster>
+</file>
+
+<file path=ppt/notesSlides/notesSlide1.xml><?xml version="1.0" encoding="utf-8"?>
+<p:notes xmlns:a="http://schemas.openxmlformats.org/drawingml/2006/main" xmlns:r="http://schemas.openxmlformats.org/officeDocument/2006/relationships" xmlns:p="http://schemas.openxmlformats.org/presentationml/2006/main">
+  <p:cSld>
+    <p:spTree>
+      <p:nvGrpSpPr>
+        <p:cNvPr id="1" name=""/>
+        <p:cNvGrpSpPr/>
+        <p:nvPr/>
+      </p:nvGrpSpPr>
+      <p:grpSpPr>
+        <a:xfrm>
+          <a:off x="0" y="0"/>
+          <a:ext cx="0" cy="0"/>
+          <a:chOff x="0" y="0"/>
+          <a:chExt cx="0" cy="0"/>
+        </a:xfrm>
+      </p:grpSpPr>
+      <p:sp>
+        <p:nvSpPr>
+          <p:cNvPr id="2" name="Slide Image Placeholder 1"/>
+          <p:cNvSpPr>
+            <a:spLocks noGrp="1" noRot="1" noChangeAspect="1"/>
+          </p:cNvSpPr>
+          <p:nvPr>
+            <p:ph type="sldImg"/>
+          </p:nvPr>
+        </p:nvSpPr>
+        <p:spPr/>
+      </p:sp>
+      <p:sp>
+        <p:nvSpPr>
+          <p:cNvPr id="3" name="Notes Placeholder 2"/>
+          <p:cNvSpPr>
+            <a:spLocks noGrp="1"/>
+          </p:cNvSpPr>
+          <p:nvPr>
+            <p:ph type="body" idx="1"/>
+          </p:nvPr>
+        </p:nvSpPr>
+        <p:spPr/>
+        <p:txBody>
+          <a:bodyPr/>
+          <a:lstStyle/>
+          <a:p>
+            <a:endParaRPr lang="en-US" dirty="0"/>
+          </a:p>
+        </p:txBody>
+      </p:sp>
+      <p:sp>
+        <p:nvSpPr>
+          <p:cNvPr id="4" name="Slide Number Placeholder 3"/>
+          <p:cNvSpPr>
+            <a:spLocks noGrp="1"/>
+          </p:cNvSpPr>
+          <p:nvPr>
+            <p:ph type="sldNum" sz="quarter" idx="10"/>
+          </p:nvPr>
+        </p:nvSpPr>
+        <p:spPr/>
+        <p:txBody>
+          <a:bodyPr/>
+          <a:lstStyle/>
+          <a:p>
+            <a:fld id="{A8983C90-4626-814B-837F-264CA2EC8117}" type="slidenum">
+              <a:rPr lang="en-US" smtClean="0"/>
+              <a:t>4</a:t>
+            </a:fld>
+            <a:endParaRPr lang="en-US"/>
+          </a:p>
+        </p:txBody>
+      </p:sp>
+    </p:spTree>
+    <p:extLst>
+      <p:ext uri="{BB962C8B-B14F-4D97-AF65-F5344CB8AC3E}">
+        <p14:creationId xmlns:p14="http://schemas.microsoft.com/office/powerpoint/2010/main" val="3829648853"/>
+      </p:ext>
+    </p:extLst>
+  </p:cSld>
+  <p:clrMapOvr>
+    <a:masterClrMapping/>
+  </p:clrMapOvr>
+</p:notes>
 </file>
 
 <file path=ppt/slideLayouts/slideLayout1.xml><?xml version="1.0" encoding="utf-8"?>
@@ -3484,6 +3928,328 @@
 </p:sld>
 </file>
 
+<file path=ppt/slides/slide4.xml><?xml version="1.0" encoding="utf-8"?>
+<p:sld xmlns:a="http://schemas.openxmlformats.org/drawingml/2006/main" xmlns:r="http://schemas.openxmlformats.org/officeDocument/2006/relationships" xmlns:p="http://schemas.openxmlformats.org/presentationml/2006/main">
+  <p:cSld>
+    <p:spTree>
+      <p:nvGrpSpPr>
+        <p:cNvPr id="1" name=""/>
+        <p:cNvGrpSpPr/>
+        <p:nvPr/>
+      </p:nvGrpSpPr>
+      <p:grpSpPr>
+        <a:xfrm>
+          <a:off x="0" y="0"/>
+          <a:ext cx="0" cy="0"/>
+          <a:chOff x="0" y="0"/>
+          <a:chExt cx="0" cy="0"/>
+        </a:xfrm>
+      </p:grpSpPr>
+      <p:sp>
+        <p:nvSpPr>
+          <p:cNvPr id="2" name="Title 1">
+            <a:extLst>
+              <a:ext uri="{FF2B5EF4-FFF2-40B4-BE49-F238E27FC236}">
+                <a16:creationId xmlns:a16="http://schemas.microsoft.com/office/drawing/2014/main" id="{F5063B59-EFFC-8642-9D01-47A40B2BFD9A}"/>
+              </a:ext>
+            </a:extLst>
+          </p:cNvPr>
+          <p:cNvSpPr>
+            <a:spLocks noGrp="1"/>
+          </p:cNvSpPr>
+          <p:nvPr>
+            <p:ph type="title"/>
+          </p:nvPr>
+        </p:nvSpPr>
+        <p:spPr/>
+        <p:txBody>
+          <a:bodyPr/>
+          <a:lstStyle/>
+          <a:p>
+            <a:r>
+              <a:rPr lang="en-US" dirty="0"/>
+              <a:t>Data Sources</a:t>
+            </a:r>
+          </a:p>
+        </p:txBody>
+      </p:sp>
+      <p:sp>
+        <p:nvSpPr>
+          <p:cNvPr id="3" name="Content Placeholder 2">
+            <a:extLst>
+              <a:ext uri="{FF2B5EF4-FFF2-40B4-BE49-F238E27FC236}">
+                <a16:creationId xmlns:a16="http://schemas.microsoft.com/office/drawing/2014/main" id="{059D5BF5-8A23-DA4B-9C07-06CDED256842}"/>
+              </a:ext>
+            </a:extLst>
+          </p:cNvPr>
+          <p:cNvSpPr>
+            <a:spLocks noGrp="1"/>
+          </p:cNvSpPr>
+          <p:nvPr>
+            <p:ph idx="1"/>
+          </p:nvPr>
+        </p:nvSpPr>
+        <p:spPr/>
+        <p:txBody>
+          <a:bodyPr/>
+          <a:lstStyle/>
+          <a:p>
+            <a:r>
+              <a:rPr lang="en-US" dirty="0"/>
+              <a:t>Recent version of the 2016 aged care units data (</a:t>
+            </a:r>
+            <a:r>
+              <a:rPr lang="en-US" dirty="0">
+                <a:hlinkClick r:id="rId3"/>
+              </a:rPr>
+              <a:t>link</a:t>
+            </a:r>
+            <a:r>
+              <a:rPr lang="en-US" dirty="0"/>
+              <a:t>) - now in 2019</a:t>
+            </a:r>
+          </a:p>
+          <a:p>
+            <a:endParaRPr lang="en-US" dirty="0"/>
+          </a:p>
+          <a:p>
+            <a:endParaRPr lang="en-US" dirty="0"/>
+          </a:p>
+        </p:txBody>
+      </p:sp>
+    </p:spTree>
+    <p:extLst>
+      <p:ext uri="{BB962C8B-B14F-4D97-AF65-F5344CB8AC3E}">
+        <p14:creationId xmlns:p14="http://schemas.microsoft.com/office/powerpoint/2010/main" val="4174600064"/>
+      </p:ext>
+    </p:extLst>
+  </p:cSld>
+  <p:clrMapOvr>
+    <a:masterClrMapping/>
+  </p:clrMapOvr>
+</p:sld>
+</file>
+
+<file path=ppt/slides/slide5.xml><?xml version="1.0" encoding="utf-8"?>
+<p:sld xmlns:a="http://schemas.openxmlformats.org/drawingml/2006/main" xmlns:r="http://schemas.openxmlformats.org/officeDocument/2006/relationships" xmlns:p="http://schemas.openxmlformats.org/presentationml/2006/main">
+  <p:cSld>
+    <p:spTree>
+      <p:nvGrpSpPr>
+        <p:cNvPr id="1" name=""/>
+        <p:cNvGrpSpPr/>
+        <p:nvPr/>
+      </p:nvGrpSpPr>
+      <p:grpSpPr>
+        <a:xfrm>
+          <a:off x="0" y="0"/>
+          <a:ext cx="0" cy="0"/>
+          <a:chOff x="0" y="0"/>
+          <a:chExt cx="0" cy="0"/>
+        </a:xfrm>
+      </p:grpSpPr>
+      <p:sp>
+        <p:nvSpPr>
+          <p:cNvPr id="2" name="Title 1">
+            <a:extLst>
+              <a:ext uri="{FF2B5EF4-FFF2-40B4-BE49-F238E27FC236}">
+                <a16:creationId xmlns:a16="http://schemas.microsoft.com/office/drawing/2014/main" id="{325CD6BD-647C-7F4D-9F7D-5D9D81B8E11C}"/>
+              </a:ext>
+            </a:extLst>
+          </p:cNvPr>
+          <p:cNvSpPr>
+            <a:spLocks noGrp="1"/>
+          </p:cNvSpPr>
+          <p:nvPr>
+            <p:ph type="title"/>
+          </p:nvPr>
+        </p:nvSpPr>
+        <p:spPr/>
+        <p:txBody>
+          <a:bodyPr/>
+          <a:lstStyle/>
+          <a:p>
+            <a:r>
+              <a:rPr lang="en-US" dirty="0"/>
+              <a:t>R Sources</a:t>
+            </a:r>
+          </a:p>
+        </p:txBody>
+      </p:sp>
+      <p:sp>
+        <p:nvSpPr>
+          <p:cNvPr id="3" name="Content Placeholder 2">
+            <a:extLst>
+              <a:ext uri="{FF2B5EF4-FFF2-40B4-BE49-F238E27FC236}">
+                <a16:creationId xmlns:a16="http://schemas.microsoft.com/office/drawing/2014/main" id="{04D16BA3-18A7-7744-81FE-8DB0BD3A7D12}"/>
+              </a:ext>
+            </a:extLst>
+          </p:cNvPr>
+          <p:cNvSpPr>
+            <a:spLocks noGrp="1"/>
+          </p:cNvSpPr>
+          <p:nvPr>
+            <p:ph idx="1"/>
+          </p:nvPr>
+        </p:nvSpPr>
+        <p:spPr/>
+        <p:txBody>
+          <a:bodyPr/>
+          <a:lstStyle/>
+          <a:p>
+            <a:r>
+              <a:rPr lang="en-US" dirty="0"/>
+              <a:t>Creation of </a:t>
+            </a:r>
+            <a:r>
+              <a:rPr lang="en-US" dirty="0" err="1"/>
+              <a:t>GeoJSON</a:t>
+            </a:r>
+            <a:r>
+              <a:rPr lang="en-US" dirty="0"/>
+              <a:t> file for Australian postcodes (</a:t>
+            </a:r>
+            <a:r>
+              <a:rPr lang="en-US" dirty="0">
+                <a:hlinkClick r:id="rId2"/>
+              </a:rPr>
+              <a:t>link</a:t>
+            </a:r>
+            <a:r>
+              <a:rPr lang="en-US" dirty="0"/>
+              <a:t>)</a:t>
+            </a:r>
+          </a:p>
+          <a:p>
+            <a:r>
+              <a:rPr lang="en-US" dirty="0"/>
+              <a:t>Postcode </a:t>
+            </a:r>
+            <a:r>
+              <a:rPr lang="en-US" dirty="0" err="1"/>
+              <a:t>lat</a:t>
+            </a:r>
+            <a:r>
+              <a:rPr lang="en-US" dirty="0"/>
+              <a:t>/</a:t>
+            </a:r>
+            <a:r>
+              <a:rPr lang="en-US" dirty="0" err="1"/>
+              <a:t>lon</a:t>
+            </a:r>
+            <a:r>
+              <a:rPr lang="en-US" dirty="0"/>
+              <a:t> (</a:t>
+            </a:r>
+            <a:r>
+              <a:rPr lang="en-US" dirty="0">
+                <a:hlinkClick r:id="rId3"/>
+              </a:rPr>
+              <a:t>link</a:t>
+            </a:r>
+            <a:r>
+              <a:rPr lang="en-US" dirty="0"/>
+              <a:t>)</a:t>
+            </a:r>
+          </a:p>
+        </p:txBody>
+      </p:sp>
+    </p:spTree>
+    <p:extLst>
+      <p:ext uri="{BB962C8B-B14F-4D97-AF65-F5344CB8AC3E}">
+        <p14:creationId xmlns:p14="http://schemas.microsoft.com/office/powerpoint/2010/main" val="2817837217"/>
+      </p:ext>
+    </p:extLst>
+  </p:cSld>
+  <p:clrMapOvr>
+    <a:masterClrMapping/>
+  </p:clrMapOvr>
+</p:sld>
+</file>
+
+<file path=ppt/slides/slide6.xml><?xml version="1.0" encoding="utf-8"?>
+<p:sld xmlns:a="http://schemas.openxmlformats.org/drawingml/2006/main" xmlns:r="http://schemas.openxmlformats.org/officeDocument/2006/relationships" xmlns:p="http://schemas.openxmlformats.org/presentationml/2006/main">
+  <p:cSld>
+    <p:spTree>
+      <p:nvGrpSpPr>
+        <p:cNvPr id="1" name=""/>
+        <p:cNvGrpSpPr/>
+        <p:nvPr/>
+      </p:nvGrpSpPr>
+      <p:grpSpPr>
+        <a:xfrm>
+          <a:off x="0" y="0"/>
+          <a:ext cx="0" cy="0"/>
+          <a:chOff x="0" y="0"/>
+          <a:chExt cx="0" cy="0"/>
+        </a:xfrm>
+      </p:grpSpPr>
+      <p:sp>
+        <p:nvSpPr>
+          <p:cNvPr id="2" name="Title 1">
+            <a:extLst>
+              <a:ext uri="{FF2B5EF4-FFF2-40B4-BE49-F238E27FC236}">
+                <a16:creationId xmlns:a16="http://schemas.microsoft.com/office/drawing/2014/main" id="{AEFF4DEA-1CBE-0545-A6D6-FC33739BFA7C}"/>
+              </a:ext>
+            </a:extLst>
+          </p:cNvPr>
+          <p:cNvSpPr>
+            <a:spLocks noGrp="1"/>
+          </p:cNvSpPr>
+          <p:nvPr>
+            <p:ph type="title"/>
+          </p:nvPr>
+        </p:nvSpPr>
+        <p:spPr/>
+        <p:txBody>
+          <a:bodyPr/>
+          <a:lstStyle/>
+          <a:p>
+            <a:endParaRPr lang="en-US"/>
+          </a:p>
+        </p:txBody>
+      </p:sp>
+      <p:pic>
+        <p:nvPicPr>
+          <p:cNvPr id="5" name="Content Placeholder 4">
+            <a:extLst>
+              <a:ext uri="{FF2B5EF4-FFF2-40B4-BE49-F238E27FC236}">
+                <a16:creationId xmlns:a16="http://schemas.microsoft.com/office/drawing/2014/main" id="{7ECFBC75-B7CA-184B-BF9A-EB7D170E182A}"/>
+              </a:ext>
+            </a:extLst>
+          </p:cNvPr>
+          <p:cNvPicPr>
+            <a:picLocks noGrp="1" noChangeAspect="1"/>
+          </p:cNvPicPr>
+          <p:nvPr>
+            <p:ph idx="1"/>
+          </p:nvPr>
+        </p:nvPicPr>
+        <p:blipFill>
+          <a:blip r:embed="rId2"/>
+          <a:stretch>
+            <a:fillRect/>
+          </a:stretch>
+        </p:blipFill>
+        <p:spPr>
+          <a:xfrm>
+            <a:off x="848155" y="1825625"/>
+            <a:ext cx="10495689" cy="4351338"/>
+          </a:xfrm>
+        </p:spPr>
+      </p:pic>
+    </p:spTree>
+    <p:extLst>
+      <p:ext uri="{BB962C8B-B14F-4D97-AF65-F5344CB8AC3E}">
+        <p14:creationId xmlns:p14="http://schemas.microsoft.com/office/powerpoint/2010/main" val="179634760"/>
+      </p:ext>
+    </p:extLst>
+  </p:cSld>
+  <p:clrMapOvr>
+    <a:masterClrMapping/>
+  </p:clrMapOvr>
+</p:sld>
+</file>
+
 <file path=ppt/theme/theme1.xml><?xml version="1.0" encoding="utf-8"?>
 <a:theme xmlns:a="http://schemas.openxmlformats.org/drawingml/2006/main" name="Office Theme">
   <a:themeElements>
@@ -3777,4 +4543,299 @@
     </a:ext>
   </a:extLst>
 </a:theme>
+</file>
+
+<file path=ppt/theme/theme2.xml><?xml version="1.0" encoding="utf-8"?>
+<a:theme xmlns:a="http://schemas.openxmlformats.org/drawingml/2006/main" name="Office Theme">
+  <a:themeElements>
+    <a:clrScheme name="Office">
+      <a:dk1>
+        <a:sysClr val="windowText" lastClr="000000"/>
+      </a:dk1>
+      <a:lt1>
+        <a:sysClr val="window" lastClr="FFFFFF"/>
+      </a:lt1>
+      <a:dk2>
+        <a:srgbClr val="44546A"/>
+      </a:dk2>
+      <a:lt2>
+        <a:srgbClr val="E7E6E6"/>
+      </a:lt2>
+      <a:accent1>
+        <a:srgbClr val="4472C4"/>
+      </a:accent1>
+      <a:accent2>
+        <a:srgbClr val="ED7D31"/>
+      </a:accent2>
+      <a:accent3>
+        <a:srgbClr val="A5A5A5"/>
+      </a:accent3>
+      <a:accent4>
+        <a:srgbClr val="FFC000"/>
+      </a:accent4>
+      <a:accent5>
+        <a:srgbClr val="5B9BD5"/>
+      </a:accent5>
+      <a:accent6>
+        <a:srgbClr val="70AD47"/>
+      </a:accent6>
+      <a:hlink>
+        <a:srgbClr val="0563C1"/>
+      </a:hlink>
+      <a:folHlink>
+        <a:srgbClr val="954F72"/>
+      </a:folHlink>
+    </a:clrScheme>
+    <a:fontScheme name="Office">
+      <a:majorFont>
+        <a:latin typeface="Calibri Light" panose="020F0302020204030204"/>
+        <a:ea typeface=""/>
+        <a:cs typeface=""/>
+        <a:font script="Jpan" typeface="游ゴシック Light"/>
+        <a:font script="Hang" typeface="맑은 고딕"/>
+        <a:font script="Hans" typeface="等线 Light"/>
+        <a:font script="Hant" typeface="新細明體"/>
+        <a:font script="Arab" typeface="Times New Roman"/>
+        <a:font script="Hebr" typeface="Times New Roman"/>
+        <a:font script="Thai" typeface="Angsana New"/>
+        <a:font script="Ethi" typeface="Nyala"/>
+        <a:font script="Beng" typeface="Vrinda"/>
+        <a:font script="Gujr" typeface="Shruti"/>
+        <a:font script="Khmr" typeface="MoolBoran"/>
+        <a:font script="Knda" typeface="Tunga"/>
+        <a:font script="Guru" typeface="Raavi"/>
+        <a:font script="Cans" typeface="Euphemia"/>
+        <a:font script="Cher" typeface="Plantagenet Cherokee"/>
+        <a:font script="Yiii" typeface="Microsoft Yi Baiti"/>
+        <a:font script="Tibt" typeface="Microsoft Himalaya"/>
+        <a:font script="Thaa" typeface="MV Boli"/>
+        <a:font script="Deva" typeface="Mangal"/>
+        <a:font script="Telu" typeface="Gautami"/>
+        <a:font script="Taml" typeface="Latha"/>
+        <a:font script="Syrc" typeface="Estrangelo Edessa"/>
+        <a:font script="Orya" typeface="Kalinga"/>
+        <a:font script="Mlym" typeface="Kartika"/>
+        <a:font script="Laoo" typeface="DokChampa"/>
+        <a:font script="Sinh" typeface="Iskoola Pota"/>
+        <a:font script="Mong" typeface="Mongolian Baiti"/>
+        <a:font script="Viet" typeface="Times New Roman"/>
+        <a:font script="Uigh" typeface="Microsoft Uighur"/>
+        <a:font script="Geor" typeface="Sylfaen"/>
+        <a:font script="Armn" typeface="Arial"/>
+        <a:font script="Bugi" typeface="Leelawadee UI"/>
+        <a:font script="Bopo" typeface="Microsoft JhengHei"/>
+        <a:font script="Java" typeface="Javanese Text"/>
+        <a:font script="Lisu" typeface="Segoe UI"/>
+        <a:font script="Mymr" typeface="Myanmar Text"/>
+        <a:font script="Nkoo" typeface="Ebrima"/>
+        <a:font script="Olck" typeface="Nirmala UI"/>
+        <a:font script="Osma" typeface="Ebrima"/>
+        <a:font script="Phag" typeface="Phagspa"/>
+        <a:font script="Syrn" typeface="Estrangelo Edessa"/>
+        <a:font script="Syrj" typeface="Estrangelo Edessa"/>
+        <a:font script="Syre" typeface="Estrangelo Edessa"/>
+        <a:font script="Sora" typeface="Nirmala UI"/>
+        <a:font script="Tale" typeface="Microsoft Tai Le"/>
+        <a:font script="Talu" typeface="Microsoft New Tai Lue"/>
+        <a:font script="Tfng" typeface="Ebrima"/>
+      </a:majorFont>
+      <a:minorFont>
+        <a:latin typeface="Calibri" panose="020F0502020204030204"/>
+        <a:ea typeface=""/>
+        <a:cs typeface=""/>
+        <a:font script="Jpan" typeface="游ゴシック"/>
+        <a:font script="Hang" typeface="맑은 고딕"/>
+        <a:font script="Hans" typeface="等线"/>
+        <a:font script="Hant" typeface="新細明體"/>
+        <a:font script="Arab" typeface="Arial"/>
+        <a:font script="Hebr" typeface="Arial"/>
+        <a:font script="Thai" typeface="Cordia New"/>
+        <a:font script="Ethi" typeface="Nyala"/>
+        <a:font script="Beng" typeface="Vrinda"/>
+        <a:font script="Gujr" typeface="Shruti"/>
+        <a:font script="Khmr" typeface="DaunPenh"/>
+        <a:font script="Knda" typeface="Tunga"/>
+        <a:font script="Guru" typeface="Raavi"/>
+        <a:font script="Cans" typeface="Euphemia"/>
+        <a:font script="Cher" typeface="Plantagenet Cherokee"/>
+        <a:font script="Yiii" typeface="Microsoft Yi Baiti"/>
+        <a:font script="Tibt" typeface="Microsoft Himalaya"/>
+        <a:font script="Thaa" typeface="MV Boli"/>
+        <a:font script="Deva" typeface="Mangal"/>
+        <a:font script="Telu" typeface="Gautami"/>
+        <a:font script="Taml" typeface="Latha"/>
+        <a:font script="Syrc" typeface="Estrangelo Edessa"/>
+        <a:font script="Orya" typeface="Kalinga"/>
+        <a:font script="Mlym" typeface="Kartika"/>
+        <a:font script="Laoo" typeface="DokChampa"/>
+        <a:font script="Sinh" typeface="Iskoola Pota"/>
+        <a:font script="Mong" typeface="Mongolian Baiti"/>
+        <a:font script="Viet" typeface="Arial"/>
+        <a:font script="Uigh" typeface="Microsoft Uighur"/>
+        <a:font script="Geor" typeface="Sylfaen"/>
+        <a:font script="Armn" typeface="Arial"/>
+        <a:font script="Bugi" typeface="Leelawadee UI"/>
+        <a:font script="Bopo" typeface="Microsoft JhengHei"/>
+        <a:font script="Java" typeface="Javanese Text"/>
+        <a:font script="Lisu" typeface="Segoe UI"/>
+        <a:font script="Mymr" typeface="Myanmar Text"/>
+        <a:font script="Nkoo" typeface="Ebrima"/>
+        <a:font script="Olck" typeface="Nirmala UI"/>
+        <a:font script="Osma" typeface="Ebrima"/>
+        <a:font script="Phag" typeface="Phagspa"/>
+        <a:font script="Syrn" typeface="Estrangelo Edessa"/>
+        <a:font script="Syrj" typeface="Estrangelo Edessa"/>
+        <a:font script="Syre" typeface="Estrangelo Edessa"/>
+        <a:font script="Sora" typeface="Nirmala UI"/>
+        <a:font script="Tale" typeface="Microsoft Tai Le"/>
+        <a:font script="Talu" typeface="Microsoft New Tai Lue"/>
+        <a:font script="Tfng" typeface="Ebrima"/>
+      </a:minorFont>
+    </a:fontScheme>
+    <a:fmtScheme name="Office">
+      <a:fillStyleLst>
+        <a:solidFill>
+          <a:schemeClr val="phClr"/>
+        </a:solidFill>
+        <a:gradFill rotWithShape="1">
+          <a:gsLst>
+            <a:gs pos="0">
+              <a:schemeClr val="phClr">
+                <a:lumMod val="110000"/>
+                <a:satMod val="105000"/>
+                <a:tint val="67000"/>
+              </a:schemeClr>
+            </a:gs>
+            <a:gs pos="50000">
+              <a:schemeClr val="phClr">
+                <a:lumMod val="105000"/>
+                <a:satMod val="103000"/>
+                <a:tint val="73000"/>
+              </a:schemeClr>
+            </a:gs>
+            <a:gs pos="100000">
+              <a:schemeClr val="phClr">
+                <a:lumMod val="105000"/>
+                <a:satMod val="109000"/>
+                <a:tint val="81000"/>
+              </a:schemeClr>
+            </a:gs>
+          </a:gsLst>
+          <a:lin ang="5400000" scaled="0"/>
+        </a:gradFill>
+        <a:gradFill rotWithShape="1">
+          <a:gsLst>
+            <a:gs pos="0">
+              <a:schemeClr val="phClr">
+                <a:satMod val="103000"/>
+                <a:lumMod val="102000"/>
+                <a:tint val="94000"/>
+              </a:schemeClr>
+            </a:gs>
+            <a:gs pos="50000">
+              <a:schemeClr val="phClr">
+                <a:satMod val="110000"/>
+                <a:lumMod val="100000"/>
+                <a:shade val="100000"/>
+              </a:schemeClr>
+            </a:gs>
+            <a:gs pos="100000">
+              <a:schemeClr val="phClr">
+                <a:lumMod val="99000"/>
+                <a:satMod val="120000"/>
+                <a:shade val="78000"/>
+              </a:schemeClr>
+            </a:gs>
+          </a:gsLst>
+          <a:lin ang="5400000" scaled="0"/>
+        </a:gradFill>
+      </a:fillStyleLst>
+      <a:lnStyleLst>
+        <a:ln w="6350" cap="flat" cmpd="sng" algn="ctr">
+          <a:solidFill>
+            <a:schemeClr val="phClr"/>
+          </a:solidFill>
+          <a:prstDash val="solid"/>
+          <a:miter lim="800000"/>
+        </a:ln>
+        <a:ln w="12700" cap="flat" cmpd="sng" algn="ctr">
+          <a:solidFill>
+            <a:schemeClr val="phClr"/>
+          </a:solidFill>
+          <a:prstDash val="solid"/>
+          <a:miter lim="800000"/>
+        </a:ln>
+        <a:ln w="19050" cap="flat" cmpd="sng" algn="ctr">
+          <a:solidFill>
+            <a:schemeClr val="phClr"/>
+          </a:solidFill>
+          <a:prstDash val="solid"/>
+          <a:miter lim="800000"/>
+        </a:ln>
+      </a:lnStyleLst>
+      <a:effectStyleLst>
+        <a:effectStyle>
+          <a:effectLst/>
+        </a:effectStyle>
+        <a:effectStyle>
+          <a:effectLst/>
+        </a:effectStyle>
+        <a:effectStyle>
+          <a:effectLst>
+            <a:outerShdw blurRad="57150" dist="19050" dir="5400000" algn="ctr" rotWithShape="0">
+              <a:srgbClr val="000000">
+                <a:alpha val="63000"/>
+              </a:srgbClr>
+            </a:outerShdw>
+          </a:effectLst>
+        </a:effectStyle>
+      </a:effectStyleLst>
+      <a:bgFillStyleLst>
+        <a:solidFill>
+          <a:schemeClr val="phClr"/>
+        </a:solidFill>
+        <a:solidFill>
+          <a:schemeClr val="phClr">
+            <a:tint val="95000"/>
+            <a:satMod val="170000"/>
+          </a:schemeClr>
+        </a:solidFill>
+        <a:gradFill rotWithShape="1">
+          <a:gsLst>
+            <a:gs pos="0">
+              <a:schemeClr val="phClr">
+                <a:tint val="93000"/>
+                <a:satMod val="150000"/>
+                <a:shade val="98000"/>
+                <a:lumMod val="102000"/>
+              </a:schemeClr>
+            </a:gs>
+            <a:gs pos="50000">
+              <a:schemeClr val="phClr">
+                <a:tint val="98000"/>
+                <a:satMod val="130000"/>
+                <a:shade val="90000"/>
+                <a:lumMod val="103000"/>
+              </a:schemeClr>
+            </a:gs>
+            <a:gs pos="100000">
+              <a:schemeClr val="phClr">
+                <a:shade val="63000"/>
+                <a:satMod val="120000"/>
+              </a:schemeClr>
+            </a:gs>
+          </a:gsLst>
+          <a:lin ang="5400000" scaled="0"/>
+        </a:gradFill>
+      </a:bgFillStyleLst>
+    </a:fmtScheme>
+  </a:themeElements>
+  <a:objectDefaults/>
+  <a:extraClrSchemeLst/>
+  <a:extLst>
+    <a:ext uri="{05A4C25C-085E-4340-85A3-A5531E510DB2}">
+      <thm15:themeFamily xmlns:thm15="http://schemas.microsoft.com/office/thememl/2012/main" name="Office Theme" id="{62F939B6-93AF-4DB8-9C6B-D6C7DFDC589F}" vid="{4A3C46E8-61CC-4603-A589-7422A47A8E4A}"/>
+    </a:ext>
+  </a:extLst>
+</a:theme>
 </file>
</xml_diff>

<commit_message>
viz popn by state
</commit_message>
<xml_diff>
--- a/final_presentation.pptx
+++ b/final_presentation.pptx
@@ -544,6 +544,90 @@
     <p:extLst>
       <p:ext uri="{BB962C8B-B14F-4D97-AF65-F5344CB8AC3E}">
         <p14:creationId xmlns:p14="http://schemas.microsoft.com/office/powerpoint/2010/main" val="3829648853"/>
+      </p:ext>
+    </p:extLst>
+  </p:cSld>
+  <p:clrMapOvr>
+    <a:masterClrMapping/>
+  </p:clrMapOvr>
+</p:notes>
+</file>
+
+<file path=ppt/notesSlides/notesSlide2.xml><?xml version="1.0" encoding="utf-8"?>
+<p:notes xmlns:a="http://schemas.openxmlformats.org/drawingml/2006/main" xmlns:r="http://schemas.openxmlformats.org/officeDocument/2006/relationships" xmlns:p="http://schemas.openxmlformats.org/presentationml/2006/main">
+  <p:cSld>
+    <p:spTree>
+      <p:nvGrpSpPr>
+        <p:cNvPr id="1" name=""/>
+        <p:cNvGrpSpPr/>
+        <p:nvPr/>
+      </p:nvGrpSpPr>
+      <p:grpSpPr>
+        <a:xfrm>
+          <a:off x="0" y="0"/>
+          <a:ext cx="0" cy="0"/>
+          <a:chOff x="0" y="0"/>
+          <a:chExt cx="0" cy="0"/>
+        </a:xfrm>
+      </p:grpSpPr>
+      <p:sp>
+        <p:nvSpPr>
+          <p:cNvPr id="2" name="Slide Image Placeholder 1"/>
+          <p:cNvSpPr>
+            <a:spLocks noGrp="1" noRot="1" noChangeAspect="1"/>
+          </p:cNvSpPr>
+          <p:nvPr>
+            <p:ph type="sldImg"/>
+          </p:nvPr>
+        </p:nvSpPr>
+        <p:spPr/>
+      </p:sp>
+      <p:sp>
+        <p:nvSpPr>
+          <p:cNvPr id="3" name="Notes Placeholder 2"/>
+          <p:cNvSpPr>
+            <a:spLocks noGrp="1"/>
+          </p:cNvSpPr>
+          <p:nvPr>
+            <p:ph type="body" idx="1"/>
+          </p:nvPr>
+        </p:nvSpPr>
+        <p:spPr/>
+        <p:txBody>
+          <a:bodyPr/>
+          <a:lstStyle/>
+          <a:p>
+            <a:endParaRPr lang="en-US" dirty="0"/>
+          </a:p>
+        </p:txBody>
+      </p:sp>
+      <p:sp>
+        <p:nvSpPr>
+          <p:cNvPr id="4" name="Slide Number Placeholder 3"/>
+          <p:cNvSpPr>
+            <a:spLocks noGrp="1"/>
+          </p:cNvSpPr>
+          <p:nvPr>
+            <p:ph type="sldNum" sz="quarter" idx="10"/>
+          </p:nvPr>
+        </p:nvSpPr>
+        <p:spPr/>
+        <p:txBody>
+          <a:bodyPr/>
+          <a:lstStyle/>
+          <a:p>
+            <a:fld id="{A8983C90-4626-814B-837F-264CA2EC8117}" type="slidenum">
+              <a:rPr lang="en-US" smtClean="0"/>
+              <a:t>5</a:t>
+            </a:fld>
+            <a:endParaRPr lang="en-US"/>
+          </a:p>
+        </p:txBody>
+      </p:sp>
+    </p:spTree>
+    <p:extLst>
+      <p:ext uri="{BB962C8B-B14F-4D97-AF65-F5344CB8AC3E}">
+        <p14:creationId xmlns:p14="http://schemas.microsoft.com/office/powerpoint/2010/main" val="1900512452"/>
       </p:ext>
     </p:extLst>
   </p:cSld>
@@ -3915,6 +3999,83 @@
           </a:p>
         </p:txBody>
       </p:sp>
+      <p:sp>
+        <p:nvSpPr>
+          <p:cNvPr id="3" name="Content Placeholder 2">
+            <a:extLst>
+              <a:ext uri="{FF2B5EF4-FFF2-40B4-BE49-F238E27FC236}">
+                <a16:creationId xmlns:a16="http://schemas.microsoft.com/office/drawing/2014/main" id="{5AA2C1D9-9F25-EF4C-AAE7-FD3FE9B7526C}"/>
+              </a:ext>
+            </a:extLst>
+          </p:cNvPr>
+          <p:cNvSpPr>
+            <a:spLocks noGrp="1"/>
+          </p:cNvSpPr>
+          <p:nvPr>
+            <p:ph idx="1"/>
+          </p:nvPr>
+        </p:nvSpPr>
+        <p:spPr/>
+        <p:txBody>
+          <a:bodyPr/>
+          <a:lstStyle/>
+          <a:p>
+            <a:r>
+              <a:rPr lang="en-US" dirty="0"/>
+              <a:t>Visualise the problem using </a:t>
+            </a:r>
+            <a:r>
+              <a:rPr lang="en-US" dirty="0" err="1"/>
+              <a:t>RShiny</a:t>
+            </a:r>
+            <a:endParaRPr lang="en-US" dirty="0"/>
+          </a:p>
+          <a:p>
+            <a:pPr lvl="1"/>
+            <a:r>
+              <a:rPr lang="en-US" dirty="0"/>
+              <a:t>Physical location of aged care units</a:t>
+            </a:r>
+          </a:p>
+          <a:p>
+            <a:pPr lvl="1"/>
+            <a:r>
+              <a:rPr lang="en-US" dirty="0"/>
+              <a:t>Population by LGAs (In Quantiles)</a:t>
+            </a:r>
+          </a:p>
+          <a:p>
+            <a:r>
+              <a:rPr lang="en-US" dirty="0"/>
+              <a:t>Population data</a:t>
+            </a:r>
+          </a:p>
+          <a:p>
+            <a:pPr lvl="1"/>
+            <a:r>
+              <a:rPr lang="en-US" dirty="0"/>
+              <a:t>Aggregate population ranges (ages55andUp, ages60andUp) on a state-level (NSW, QLD, </a:t>
+            </a:r>
+            <a:r>
+              <a:rPr lang="en-US" dirty="0" err="1"/>
+              <a:t>etc</a:t>
+            </a:r>
+            <a:r>
+              <a:rPr lang="en-US" dirty="0"/>
+              <a:t>)</a:t>
+            </a:r>
+          </a:p>
+          <a:p>
+            <a:endParaRPr lang="en-US" dirty="0"/>
+          </a:p>
+          <a:p>
+            <a:endParaRPr lang="en-US" dirty="0"/>
+          </a:p>
+          <a:p>
+            <a:endParaRPr lang="en-US" dirty="0"/>
+          </a:p>
+        </p:txBody>
+      </p:sp>
     </p:spTree>
     <p:extLst>
       <p:ext uri="{BB962C8B-B14F-4D97-AF65-F5344CB8AC3E}">
@@ -4010,6 +4171,22 @@
             </a:r>
           </a:p>
           <a:p>
+            <a:r>
+              <a:rPr lang="en-US" dirty="0"/>
+              <a:t>Population by Age and Sex (</a:t>
+            </a:r>
+            <a:r>
+              <a:rPr lang="en-US" dirty="0">
+                <a:hlinkClick r:id="rId4"/>
+              </a:rPr>
+              <a:t>link</a:t>
+            </a:r>
+            <a:r>
+              <a:rPr lang="en-US" dirty="0"/>
+              <a:t>)</a:t>
+            </a:r>
+          </a:p>
+          <a:p>
             <a:endParaRPr lang="en-US" dirty="0"/>
           </a:p>
           <a:p>
@@ -4110,38 +4287,6 @@
             </a:r>
             <a:r>
               <a:rPr lang="en-US" dirty="0">
-                <a:hlinkClick r:id="rId2"/>
-              </a:rPr>
-              <a:t>link</a:t>
-            </a:r>
-            <a:r>
-              <a:rPr lang="en-US" dirty="0"/>
-              <a:t>)</a:t>
-            </a:r>
-          </a:p>
-          <a:p>
-            <a:r>
-              <a:rPr lang="en-US" dirty="0"/>
-              <a:t>Postcode </a:t>
-            </a:r>
-            <a:r>
-              <a:rPr lang="en-US" dirty="0" err="1"/>
-              <a:t>lat</a:t>
-            </a:r>
-            <a:r>
-              <a:rPr lang="en-US" dirty="0"/>
-              <a:t>/</a:t>
-            </a:r>
-            <a:r>
-              <a:rPr lang="en-US" dirty="0" err="1"/>
-              <a:t>lon</a:t>
-            </a:r>
-            <a:r>
-              <a:rPr lang="en-US" dirty="0"/>
-              <a:t> (</a:t>
-            </a:r>
-            <a:r>
-              <a:rPr lang="en-US" dirty="0">
                 <a:hlinkClick r:id="rId3"/>
               </a:rPr>
               <a:t>link</a:t>
@@ -4154,11 +4299,43 @@
           <a:p>
             <a:r>
               <a:rPr lang="en-US" dirty="0"/>
-              <a:t>LGA (</a:t>
+              <a:t>Postcode </a:t>
+            </a:r>
+            <a:r>
+              <a:rPr lang="en-US" dirty="0" err="1"/>
+              <a:t>lat</a:t>
+            </a:r>
+            <a:r>
+              <a:rPr lang="en-US" dirty="0"/>
+              <a:t>/</a:t>
+            </a:r>
+            <a:r>
+              <a:rPr lang="en-US" dirty="0" err="1"/>
+              <a:t>lon</a:t>
+            </a:r>
+            <a:r>
+              <a:rPr lang="en-US" dirty="0"/>
+              <a:t> (</a:t>
             </a:r>
             <a:r>
               <a:rPr lang="en-US" dirty="0">
                 <a:hlinkClick r:id="rId4"/>
+              </a:rPr>
+              <a:t>link</a:t>
+            </a:r>
+            <a:r>
+              <a:rPr lang="en-US" dirty="0"/>
+              <a:t>)</a:t>
+            </a:r>
+          </a:p>
+          <a:p>
+            <a:r>
+              <a:rPr lang="en-US" dirty="0"/>
+              <a:t>LGA (</a:t>
+            </a:r>
+            <a:r>
+              <a:rPr lang="en-US" dirty="0">
+                <a:hlinkClick r:id="rId5"/>
               </a:rPr>
               <a:t>link</a:t>
             </a:r>

</xml_diff>

<commit_message>
focus on state-wide difference
</commit_message>
<xml_diff>
--- a/final_presentation.pptx
+++ b/final_presentation.pptx
@@ -9,11 +9,11 @@
   </p:notesMasterIdLst>
   <p:sldIdLst>
     <p:sldId id="256" r:id="rId2"/>
-    <p:sldId id="257" r:id="rId3"/>
-    <p:sldId id="258" r:id="rId4"/>
-    <p:sldId id="259" r:id="rId5"/>
-    <p:sldId id="260" r:id="rId6"/>
-    <p:sldId id="261" r:id="rId7"/>
+    <p:sldId id="262" r:id="rId3"/>
+    <p:sldId id="257" r:id="rId4"/>
+    <p:sldId id="258" r:id="rId5"/>
+    <p:sldId id="261" r:id="rId6"/>
+    <p:sldId id="259" r:id="rId7"/>
   </p:sldIdLst>
   <p:sldSz cx="12192000" cy="6858000"/>
   <p:notesSz cx="6858000" cy="9144000"/>
@@ -534,7 +534,7 @@
           <a:p>
             <a:fld id="{A8983C90-4626-814B-837F-264CA2EC8117}" type="slidenum">
               <a:rPr lang="en-US" smtClean="0"/>
-              <a:t>4</a:t>
+              <a:t>6</a:t>
             </a:fld>
             <a:endParaRPr lang="en-US"/>
           </a:p>
@@ -544,90 +544,6 @@
     <p:extLst>
       <p:ext uri="{BB962C8B-B14F-4D97-AF65-F5344CB8AC3E}">
         <p14:creationId xmlns:p14="http://schemas.microsoft.com/office/powerpoint/2010/main" val="3829648853"/>
-      </p:ext>
-    </p:extLst>
-  </p:cSld>
-  <p:clrMapOvr>
-    <a:masterClrMapping/>
-  </p:clrMapOvr>
-</p:notes>
-</file>
-
-<file path=ppt/notesSlides/notesSlide2.xml><?xml version="1.0" encoding="utf-8"?>
-<p:notes xmlns:a="http://schemas.openxmlformats.org/drawingml/2006/main" xmlns:r="http://schemas.openxmlformats.org/officeDocument/2006/relationships" xmlns:p="http://schemas.openxmlformats.org/presentationml/2006/main">
-  <p:cSld>
-    <p:spTree>
-      <p:nvGrpSpPr>
-        <p:cNvPr id="1" name=""/>
-        <p:cNvGrpSpPr/>
-        <p:nvPr/>
-      </p:nvGrpSpPr>
-      <p:grpSpPr>
-        <a:xfrm>
-          <a:off x="0" y="0"/>
-          <a:ext cx="0" cy="0"/>
-          <a:chOff x="0" y="0"/>
-          <a:chExt cx="0" cy="0"/>
-        </a:xfrm>
-      </p:grpSpPr>
-      <p:sp>
-        <p:nvSpPr>
-          <p:cNvPr id="2" name="Slide Image Placeholder 1"/>
-          <p:cNvSpPr>
-            <a:spLocks noGrp="1" noRot="1" noChangeAspect="1"/>
-          </p:cNvSpPr>
-          <p:nvPr>
-            <p:ph type="sldImg"/>
-          </p:nvPr>
-        </p:nvSpPr>
-        <p:spPr/>
-      </p:sp>
-      <p:sp>
-        <p:nvSpPr>
-          <p:cNvPr id="3" name="Notes Placeholder 2"/>
-          <p:cNvSpPr>
-            <a:spLocks noGrp="1"/>
-          </p:cNvSpPr>
-          <p:nvPr>
-            <p:ph type="body" idx="1"/>
-          </p:nvPr>
-        </p:nvSpPr>
-        <p:spPr/>
-        <p:txBody>
-          <a:bodyPr/>
-          <a:lstStyle/>
-          <a:p>
-            <a:endParaRPr lang="en-US" dirty="0"/>
-          </a:p>
-        </p:txBody>
-      </p:sp>
-      <p:sp>
-        <p:nvSpPr>
-          <p:cNvPr id="4" name="Slide Number Placeholder 3"/>
-          <p:cNvSpPr>
-            <a:spLocks noGrp="1"/>
-          </p:cNvSpPr>
-          <p:nvPr>
-            <p:ph type="sldNum" sz="quarter" idx="10"/>
-          </p:nvPr>
-        </p:nvSpPr>
-        <p:spPr/>
-        <p:txBody>
-          <a:bodyPr/>
-          <a:lstStyle/>
-          <a:p>
-            <a:fld id="{A8983C90-4626-814B-837F-264CA2EC8117}" type="slidenum">
-              <a:rPr lang="en-US" smtClean="0"/>
-              <a:t>5</a:t>
-            </a:fld>
-            <a:endParaRPr lang="en-US"/>
-          </a:p>
-        </p:txBody>
-      </p:sp>
-    </p:spTree>
-    <p:extLst>
-      <p:ext uri="{BB962C8B-B14F-4D97-AF65-F5344CB8AC3E}">
-        <p14:creationId xmlns:p14="http://schemas.microsoft.com/office/powerpoint/2010/main" val="1900512452"/>
       </p:ext>
     </p:extLst>
   </p:cSld>
@@ -3914,7 +3830,7 @@
           <p:cNvPr id="2" name="Title 1">
             <a:extLst>
               <a:ext uri="{FF2B5EF4-FFF2-40B4-BE49-F238E27FC236}">
-                <a16:creationId xmlns:a16="http://schemas.microsoft.com/office/drawing/2014/main" id="{B69CC8F2-6600-9143-988A-F30CA8B38301}"/>
+                <a16:creationId xmlns:a16="http://schemas.microsoft.com/office/drawing/2014/main" id="{155C2051-EFAB-2F47-9839-B8496127350B}"/>
               </a:ext>
             </a:extLst>
           </p:cNvPr>
@@ -3932,7 +3848,51 @@
           <a:p>
             <a:r>
               <a:rPr lang="en-US" dirty="0"/>
-              <a:t>*Non-Technical Methodology*</a:t>
+              <a:t>Hypothesis</a:t>
+            </a:r>
+          </a:p>
+        </p:txBody>
+      </p:sp>
+      <p:sp>
+        <p:nvSpPr>
+          <p:cNvPr id="3" name="Content Placeholder 2">
+            <a:extLst>
+              <a:ext uri="{FF2B5EF4-FFF2-40B4-BE49-F238E27FC236}">
+                <a16:creationId xmlns:a16="http://schemas.microsoft.com/office/drawing/2014/main" id="{9D02C2DD-A0C7-E84A-A3A9-2E70D4E3753A}"/>
+              </a:ext>
+            </a:extLst>
+          </p:cNvPr>
+          <p:cNvSpPr>
+            <a:spLocks noGrp="1"/>
+          </p:cNvSpPr>
+          <p:nvPr>
+            <p:ph idx="1"/>
+          </p:nvPr>
+        </p:nvSpPr>
+        <p:spPr/>
+        <p:txBody>
+          <a:bodyPr/>
+          <a:lstStyle/>
+          <a:p>
+            <a:r>
+              <a:rPr lang="en-US" dirty="0"/>
+              <a:t>The ratio </a:t>
+            </a:r>
+            <a:r>
+              <a:rPr lang="en-US"/>
+              <a:t>of old-age </a:t>
+            </a:r>
+            <a:r>
+              <a:rPr lang="en-US" dirty="0"/>
+              <a:t>population and available health care units in each </a:t>
+            </a:r>
+            <a:r>
+              <a:rPr lang="en-US" b="1" dirty="0"/>
+              <a:t>state</a:t>
+            </a:r>
+            <a:r>
+              <a:rPr lang="en-US" dirty="0"/>
+              <a:t> (or better yet, suburb) should be as close as possible.</a:t>
             </a:r>
           </a:p>
         </p:txBody>
@@ -3940,7 +3900,7 @@
     </p:spTree>
     <p:extLst>
       <p:ext uri="{BB962C8B-B14F-4D97-AF65-F5344CB8AC3E}">
-        <p14:creationId xmlns:p14="http://schemas.microsoft.com/office/powerpoint/2010/main" val="3453906704"/>
+        <p14:creationId xmlns:p14="http://schemas.microsoft.com/office/powerpoint/2010/main" val="4268784176"/>
       </p:ext>
     </p:extLst>
   </p:cSld>
@@ -3972,7 +3932,7 @@
           <p:cNvPr id="2" name="Title 1">
             <a:extLst>
               <a:ext uri="{FF2B5EF4-FFF2-40B4-BE49-F238E27FC236}">
-                <a16:creationId xmlns:a16="http://schemas.microsoft.com/office/drawing/2014/main" id="{BFC4FF89-F7D9-0D49-8660-0CA7CF98541A}"/>
+                <a16:creationId xmlns:a16="http://schemas.microsoft.com/office/drawing/2014/main" id="{B69CC8F2-6600-9143-988A-F30CA8B38301}"/>
               </a:ext>
             </a:extLst>
           </p:cNvPr>
@@ -3989,12 +3949,8 @@
           <a:lstStyle/>
           <a:p>
             <a:r>
-              <a:rPr lang="en-US"/>
-              <a:t>*Technical </a:t>
-            </a:r>
-            <a:r>
               <a:rPr lang="en-US" dirty="0"/>
-              <a:t>Methodology*</a:t>
+              <a:t>*Non-Technical Methodology*</a:t>
             </a:r>
           </a:p>
         </p:txBody>
@@ -4004,7 +3960,7 @@
           <p:cNvPr id="3" name="Content Placeholder 2">
             <a:extLst>
               <a:ext uri="{FF2B5EF4-FFF2-40B4-BE49-F238E27FC236}">
-                <a16:creationId xmlns:a16="http://schemas.microsoft.com/office/drawing/2014/main" id="{5AA2C1D9-9F25-EF4C-AAE7-FD3FE9B7526C}"/>
+                <a16:creationId xmlns:a16="http://schemas.microsoft.com/office/drawing/2014/main" id="{F1B6E64A-69AB-984E-9DB5-1370E96612E2}"/>
               </a:ext>
             </a:extLst>
           </p:cNvPr>
@@ -4022,64 +3978,33 @@
           <a:p>
             <a:r>
               <a:rPr lang="en-US" dirty="0"/>
-              <a:t>Visualise the problem using </a:t>
-            </a:r>
-            <a:r>
-              <a:rPr lang="en-US" dirty="0" err="1"/>
-              <a:t>RShiny</a:t>
-            </a:r>
-            <a:endParaRPr lang="en-US" dirty="0"/>
-          </a:p>
-          <a:p>
-            <a:pPr lvl="1"/>
+              <a:t>Gather data on population arranged by age and location</a:t>
+            </a:r>
+          </a:p>
+          <a:p>
             <a:r>
               <a:rPr lang="en-US" dirty="0"/>
-              <a:t>Physical location of aged care units</a:t>
-            </a:r>
-          </a:p>
-          <a:p>
-            <a:pPr lvl="1"/>
+              <a:t>Gather data regarding the location, and capacity of existing aged care units</a:t>
+            </a:r>
+          </a:p>
+          <a:p>
             <a:r>
               <a:rPr lang="en-US" dirty="0"/>
-              <a:t>Population by LGAs (In Quantiles)</a:t>
+              <a:t>Merge the two data sources and decide the best possible location for the 200 new aged care units</a:t>
             </a:r>
           </a:p>
           <a:p>
             <a:r>
               <a:rPr lang="en-US" dirty="0"/>
-              <a:t>Population data</a:t>
-            </a:r>
-          </a:p>
-          <a:p>
-            <a:pPr lvl="1"/>
-            <a:r>
-              <a:rPr lang="en-US" dirty="0"/>
-              <a:t>Aggregate population ranges (ages55andUp, ages60andUp) on a state-level (NSW, QLD, </a:t>
-            </a:r>
-            <a:r>
-              <a:rPr lang="en-US" dirty="0" err="1"/>
-              <a:t>etc</a:t>
-            </a:r>
-            <a:r>
-              <a:rPr lang="en-US" dirty="0"/>
-              <a:t>)</a:t>
-            </a:r>
-          </a:p>
-          <a:p>
-            <a:endParaRPr lang="en-US" dirty="0"/>
-          </a:p>
-          <a:p>
-            <a:endParaRPr lang="en-US" dirty="0"/>
-          </a:p>
-          <a:p>
-            <a:endParaRPr lang="en-US" dirty="0"/>
+              <a:t>Provide visualisation to effectively report findings</a:t>
+            </a:r>
           </a:p>
         </p:txBody>
       </p:sp>
     </p:spTree>
     <p:extLst>
       <p:ext uri="{BB962C8B-B14F-4D97-AF65-F5344CB8AC3E}">
-        <p14:creationId xmlns:p14="http://schemas.microsoft.com/office/powerpoint/2010/main" val="2637013669"/>
+        <p14:creationId xmlns:p14="http://schemas.microsoft.com/office/powerpoint/2010/main" val="3453906704"/>
       </p:ext>
     </p:extLst>
   </p:cSld>
@@ -4111,7 +4036,7 @@
           <p:cNvPr id="2" name="Title 1">
             <a:extLst>
               <a:ext uri="{FF2B5EF4-FFF2-40B4-BE49-F238E27FC236}">
-                <a16:creationId xmlns:a16="http://schemas.microsoft.com/office/drawing/2014/main" id="{F5063B59-EFFC-8642-9D01-47A40B2BFD9A}"/>
+                <a16:creationId xmlns:a16="http://schemas.microsoft.com/office/drawing/2014/main" id="{BFC4FF89-F7D9-0D49-8660-0CA7CF98541A}"/>
               </a:ext>
             </a:extLst>
           </p:cNvPr>
@@ -4128,8 +4053,12 @@
           <a:lstStyle/>
           <a:p>
             <a:r>
+              <a:rPr lang="en-US"/>
+              <a:t>*Technical </a:t>
+            </a:r>
+            <a:r>
               <a:rPr lang="en-US" dirty="0"/>
-              <a:t>Data Sources</a:t>
+              <a:t>Methodology*</a:t>
             </a:r>
           </a:p>
         </p:txBody>
@@ -4139,7 +4068,7 @@
           <p:cNvPr id="3" name="Content Placeholder 2">
             <a:extLst>
               <a:ext uri="{FF2B5EF4-FFF2-40B4-BE49-F238E27FC236}">
-                <a16:creationId xmlns:a16="http://schemas.microsoft.com/office/drawing/2014/main" id="{059D5BF5-8A23-DA4B-9C07-06CDED256842}"/>
+                <a16:creationId xmlns:a16="http://schemas.microsoft.com/office/drawing/2014/main" id="{5AA2C1D9-9F25-EF4C-AAE7-FD3FE9B7526C}"/>
               </a:ext>
             </a:extLst>
           </p:cNvPr>
@@ -4157,34 +4086,43 @@
           <a:p>
             <a:r>
               <a:rPr lang="en-US" dirty="0"/>
-              <a:t>Recent version of the 2016 aged care units data (</a:t>
-            </a:r>
-            <a:r>
-              <a:rPr lang="en-US" dirty="0">
-                <a:hlinkClick r:id="rId3"/>
-              </a:rPr>
-              <a:t>link</a:t>
-            </a:r>
+              <a:t>Visualise the problem using </a:t>
+            </a:r>
+            <a:r>
+              <a:rPr lang="en-US" dirty="0" err="1"/>
+              <a:t>RShiny</a:t>
+            </a:r>
+            <a:endParaRPr lang="en-US" dirty="0"/>
+          </a:p>
+          <a:p>
+            <a:pPr lvl="1"/>
             <a:r>
               <a:rPr lang="en-US" dirty="0"/>
-              <a:t>) - now in 2019</a:t>
-            </a:r>
-          </a:p>
-          <a:p>
+              <a:t>Mark the physical location of aged care units in the Australian map</a:t>
+            </a:r>
+          </a:p>
+          <a:p>
+            <a:pPr lvl="1"/>
             <a:r>
               <a:rPr lang="en-US" dirty="0"/>
-              <a:t>Population by Age and Sex (</a:t>
-            </a:r>
-            <a:r>
-              <a:rPr lang="en-US" dirty="0">
-                <a:hlinkClick r:id="rId4"/>
-              </a:rPr>
-              <a:t>link</a:t>
-            </a:r>
+              <a:t>Color the local government areas (LGA) depending on the (old-age) population density</a:t>
+            </a:r>
+          </a:p>
+          <a:p>
             <a:r>
               <a:rPr lang="en-US" dirty="0"/>
-              <a:t>)</a:t>
-            </a:r>
+              <a:t>Merge population data with aged care units data</a:t>
+            </a:r>
+          </a:p>
+          <a:p>
+            <a:pPr lvl="1"/>
+            <a:r>
+              <a:rPr lang="en-US" dirty="0"/>
+              <a:t>The tricky part is getting data with matching location granularity (smallest possible)</a:t>
+            </a:r>
+          </a:p>
+          <a:p>
+            <a:endParaRPr lang="en-US" dirty="0"/>
           </a:p>
           <a:p>
             <a:endParaRPr lang="en-US" dirty="0"/>
@@ -4197,7 +4135,7 @@
     </p:spTree>
     <p:extLst>
       <p:ext uri="{BB962C8B-B14F-4D97-AF65-F5344CB8AC3E}">
-        <p14:creationId xmlns:p14="http://schemas.microsoft.com/office/powerpoint/2010/main" val="4174600064"/>
+        <p14:creationId xmlns:p14="http://schemas.microsoft.com/office/powerpoint/2010/main" val="2637013669"/>
       </p:ext>
     </p:extLst>
   </p:cSld>
@@ -4229,7 +4167,7 @@
           <p:cNvPr id="2" name="Title 1">
             <a:extLst>
               <a:ext uri="{FF2B5EF4-FFF2-40B4-BE49-F238E27FC236}">
-                <a16:creationId xmlns:a16="http://schemas.microsoft.com/office/drawing/2014/main" id="{325CD6BD-647C-7F4D-9F7D-5D9D81B8E11C}"/>
+                <a16:creationId xmlns:a16="http://schemas.microsoft.com/office/drawing/2014/main" id="{AEFF4DEA-1CBE-0545-A6D6-FC33739BFA7C}"/>
               </a:ext>
             </a:extLst>
           </p:cNvPr>
@@ -4245,111 +4183,43 @@
           <a:bodyPr/>
           <a:lstStyle/>
           <a:p>
-            <a:r>
-              <a:rPr lang="en-US" dirty="0"/>
-              <a:t>R Sources</a:t>
-            </a:r>
-          </a:p>
-        </p:txBody>
-      </p:sp>
-      <p:sp>
-        <p:nvSpPr>
-          <p:cNvPr id="3" name="Content Placeholder 2">
-            <a:extLst>
-              <a:ext uri="{FF2B5EF4-FFF2-40B4-BE49-F238E27FC236}">
-                <a16:creationId xmlns:a16="http://schemas.microsoft.com/office/drawing/2014/main" id="{04D16BA3-18A7-7744-81FE-8DB0BD3A7D12}"/>
-              </a:ext>
-            </a:extLst>
-          </p:cNvPr>
-          <p:cNvSpPr>
-            <a:spLocks noGrp="1"/>
-          </p:cNvSpPr>
+            <a:endParaRPr lang="en-US" dirty="0"/>
+          </a:p>
+        </p:txBody>
+      </p:sp>
+      <p:pic>
+        <p:nvPicPr>
+          <p:cNvPr id="5" name="Content Placeholder 4">
+            <a:extLst>
+              <a:ext uri="{FF2B5EF4-FFF2-40B4-BE49-F238E27FC236}">
+                <a16:creationId xmlns:a16="http://schemas.microsoft.com/office/drawing/2014/main" id="{7ECFBC75-B7CA-184B-BF9A-EB7D170E182A}"/>
+              </a:ext>
+            </a:extLst>
+          </p:cNvPr>
+          <p:cNvPicPr>
+            <a:picLocks noGrp="1" noChangeAspect="1"/>
+          </p:cNvPicPr>
           <p:nvPr>
             <p:ph idx="1"/>
           </p:nvPr>
-        </p:nvSpPr>
-        <p:spPr/>
-        <p:txBody>
-          <a:bodyPr/>
-          <a:lstStyle/>
-          <a:p>
-            <a:r>
-              <a:rPr lang="en-US" dirty="0"/>
-              <a:t>Creation of </a:t>
-            </a:r>
-            <a:r>
-              <a:rPr lang="en-US" dirty="0" err="1"/>
-              <a:t>GeoJSON</a:t>
-            </a:r>
-            <a:r>
-              <a:rPr lang="en-US" dirty="0"/>
-              <a:t> file for Australian postcodes (</a:t>
-            </a:r>
-            <a:r>
-              <a:rPr lang="en-US" dirty="0">
-                <a:hlinkClick r:id="rId3"/>
-              </a:rPr>
-              <a:t>link</a:t>
-            </a:r>
-            <a:r>
-              <a:rPr lang="en-US" dirty="0"/>
-              <a:t>)</a:t>
-            </a:r>
-          </a:p>
-          <a:p>
-            <a:r>
-              <a:rPr lang="en-US" dirty="0"/>
-              <a:t>Postcode </a:t>
-            </a:r>
-            <a:r>
-              <a:rPr lang="en-US" dirty="0" err="1"/>
-              <a:t>lat</a:t>
-            </a:r>
-            <a:r>
-              <a:rPr lang="en-US" dirty="0"/>
-              <a:t>/</a:t>
-            </a:r>
-            <a:r>
-              <a:rPr lang="en-US" dirty="0" err="1"/>
-              <a:t>lon</a:t>
-            </a:r>
-            <a:r>
-              <a:rPr lang="en-US" dirty="0"/>
-              <a:t> (</a:t>
-            </a:r>
-            <a:r>
-              <a:rPr lang="en-US" dirty="0">
-                <a:hlinkClick r:id="rId4"/>
-              </a:rPr>
-              <a:t>link</a:t>
-            </a:r>
-            <a:r>
-              <a:rPr lang="en-US" dirty="0"/>
-              <a:t>)</a:t>
-            </a:r>
-          </a:p>
-          <a:p>
-            <a:r>
-              <a:rPr lang="en-US" dirty="0"/>
-              <a:t>LGA (</a:t>
-            </a:r>
-            <a:r>
-              <a:rPr lang="en-US" dirty="0">
-                <a:hlinkClick r:id="rId5"/>
-              </a:rPr>
-              <a:t>link</a:t>
-            </a:r>
-            <a:r>
-              <a:rPr lang="en-US" dirty="0"/>
-              <a:t>)</a:t>
-            </a:r>
-          </a:p>
-        </p:txBody>
-      </p:sp>
+        </p:nvPicPr>
+        <p:blipFill>
+          <a:blip r:embed="rId2"/>
+          <a:stretch>
+            <a:fillRect/>
+          </a:stretch>
+        </p:blipFill>
+        <p:spPr>
+          <a:xfrm>
+            <a:off x="848155" y="1825625"/>
+            <a:ext cx="10495689" cy="4351338"/>
+          </a:xfrm>
+        </p:spPr>
+      </p:pic>
     </p:spTree>
     <p:extLst>
       <p:ext uri="{BB962C8B-B14F-4D97-AF65-F5344CB8AC3E}">
-        <p14:creationId xmlns:p14="http://schemas.microsoft.com/office/powerpoint/2010/main" val="2817837217"/>
+        <p14:creationId xmlns:p14="http://schemas.microsoft.com/office/powerpoint/2010/main" val="179634760"/>
       </p:ext>
     </p:extLst>
   </p:cSld>
@@ -4381,7 +4251,7 @@
           <p:cNvPr id="2" name="Title 1">
             <a:extLst>
               <a:ext uri="{FF2B5EF4-FFF2-40B4-BE49-F238E27FC236}">
-                <a16:creationId xmlns:a16="http://schemas.microsoft.com/office/drawing/2014/main" id="{AEFF4DEA-1CBE-0545-A6D6-FC33739BFA7C}"/>
+                <a16:creationId xmlns:a16="http://schemas.microsoft.com/office/drawing/2014/main" id="{F5063B59-EFFC-8642-9D01-47A40B2BFD9A}"/>
               </a:ext>
             </a:extLst>
           </p:cNvPr>
@@ -4397,43 +4267,149 @@
           <a:bodyPr/>
           <a:lstStyle/>
           <a:p>
-            <a:endParaRPr lang="en-US"/>
-          </a:p>
-        </p:txBody>
-      </p:sp>
-      <p:pic>
-        <p:nvPicPr>
-          <p:cNvPr id="5" name="Content Placeholder 4">
-            <a:extLst>
-              <a:ext uri="{FF2B5EF4-FFF2-40B4-BE49-F238E27FC236}">
-                <a16:creationId xmlns:a16="http://schemas.microsoft.com/office/drawing/2014/main" id="{7ECFBC75-B7CA-184B-BF9A-EB7D170E182A}"/>
-              </a:ext>
-            </a:extLst>
-          </p:cNvPr>
-          <p:cNvPicPr>
-            <a:picLocks noGrp="1" noChangeAspect="1"/>
-          </p:cNvPicPr>
+            <a:r>
+              <a:rPr lang="en-US" dirty="0"/>
+              <a:t>Sources</a:t>
+            </a:r>
+          </a:p>
+        </p:txBody>
+      </p:sp>
+      <p:sp>
+        <p:nvSpPr>
+          <p:cNvPr id="3" name="Content Placeholder 2">
+            <a:extLst>
+              <a:ext uri="{FF2B5EF4-FFF2-40B4-BE49-F238E27FC236}">
+                <a16:creationId xmlns:a16="http://schemas.microsoft.com/office/drawing/2014/main" id="{059D5BF5-8A23-DA4B-9C07-06CDED256842}"/>
+              </a:ext>
+            </a:extLst>
+          </p:cNvPr>
+          <p:cNvSpPr>
+            <a:spLocks noGrp="1"/>
+          </p:cNvSpPr>
           <p:nvPr>
             <p:ph idx="1"/>
           </p:nvPr>
-        </p:nvPicPr>
-        <p:blipFill>
-          <a:blip r:embed="rId2"/>
-          <a:stretch>
-            <a:fillRect/>
-          </a:stretch>
-        </p:blipFill>
-        <p:spPr>
-          <a:xfrm>
-            <a:off x="848155" y="1825625"/>
-            <a:ext cx="10495689" cy="4351338"/>
-          </a:xfrm>
-        </p:spPr>
-      </p:pic>
+        </p:nvSpPr>
+        <p:spPr/>
+        <p:txBody>
+          <a:bodyPr/>
+          <a:lstStyle/>
+          <a:p>
+            <a:r>
+              <a:rPr lang="en-US" dirty="0"/>
+              <a:t>Recent version of the 2016 aged care units data (</a:t>
+            </a:r>
+            <a:r>
+              <a:rPr lang="en-US" dirty="0">
+                <a:hlinkClick r:id="rId3"/>
+              </a:rPr>
+              <a:t>link</a:t>
+            </a:r>
+            <a:r>
+              <a:rPr lang="en-US" dirty="0"/>
+              <a:t>) - now in 2019</a:t>
+            </a:r>
+          </a:p>
+          <a:p>
+            <a:r>
+              <a:rPr lang="en-US" dirty="0"/>
+              <a:t>Population by Age and Sex (</a:t>
+            </a:r>
+            <a:r>
+              <a:rPr lang="en-US" dirty="0">
+                <a:hlinkClick r:id="rId4"/>
+              </a:rPr>
+              <a:t>link</a:t>
+            </a:r>
+            <a:r>
+              <a:rPr lang="en-US" dirty="0"/>
+              <a:t>)</a:t>
+            </a:r>
+          </a:p>
+          <a:p>
+            <a:r>
+              <a:rPr lang="en-US" dirty="0"/>
+              <a:t>Creation of </a:t>
+            </a:r>
+            <a:r>
+              <a:rPr lang="en-US" dirty="0" err="1"/>
+              <a:t>GeoJSON</a:t>
+            </a:r>
+            <a:r>
+              <a:rPr lang="en-US" dirty="0"/>
+              <a:t> file for Australian postcodes (</a:t>
+            </a:r>
+            <a:r>
+              <a:rPr lang="en-US" dirty="0">
+                <a:hlinkClick r:id="rId5"/>
+              </a:rPr>
+              <a:t>link</a:t>
+            </a:r>
+            <a:r>
+              <a:rPr lang="en-US" dirty="0"/>
+              <a:t>)</a:t>
+            </a:r>
+          </a:p>
+          <a:p>
+            <a:r>
+              <a:rPr lang="en-US" dirty="0"/>
+              <a:t>Postcode </a:t>
+            </a:r>
+            <a:r>
+              <a:rPr lang="en-US" dirty="0" err="1"/>
+              <a:t>lat</a:t>
+            </a:r>
+            <a:r>
+              <a:rPr lang="en-US" dirty="0"/>
+              <a:t>/</a:t>
+            </a:r>
+            <a:r>
+              <a:rPr lang="en-US" dirty="0" err="1"/>
+              <a:t>lon</a:t>
+            </a:r>
+            <a:r>
+              <a:rPr lang="en-US" dirty="0"/>
+              <a:t> (</a:t>
+            </a:r>
+            <a:r>
+              <a:rPr lang="en-US" dirty="0">
+                <a:hlinkClick r:id="rId6"/>
+              </a:rPr>
+              <a:t>link</a:t>
+            </a:r>
+            <a:r>
+              <a:rPr lang="en-US" dirty="0"/>
+              <a:t>)</a:t>
+            </a:r>
+          </a:p>
+          <a:p>
+            <a:r>
+              <a:rPr lang="en-US" dirty="0"/>
+              <a:t>LGA (</a:t>
+            </a:r>
+            <a:r>
+              <a:rPr lang="en-US" dirty="0">
+                <a:hlinkClick r:id="rId7"/>
+              </a:rPr>
+              <a:t>link</a:t>
+            </a:r>
+            <a:r>
+              <a:rPr lang="en-US" dirty="0"/>
+              <a:t>)</a:t>
+            </a:r>
+          </a:p>
+          <a:p>
+            <a:endParaRPr lang="en-US" dirty="0"/>
+          </a:p>
+          <a:p>
+            <a:endParaRPr lang="en-US" dirty="0"/>
+          </a:p>
+        </p:txBody>
+      </p:sp>
     </p:spTree>
     <p:extLst>
       <p:ext uri="{BB962C8B-B14F-4D97-AF65-F5344CB8AC3E}">
-        <p14:creationId xmlns:p14="http://schemas.microsoft.com/office/powerpoint/2010/main" val="179634760"/>
+        <p14:creationId xmlns:p14="http://schemas.microsoft.com/office/powerpoint/2010/main" val="4174600064"/>
       </p:ext>
     </p:extLst>
   </p:cSld>

</xml_diff>

<commit_message>
finalise presentation, temporarily disable maps
</commit_message>
<xml_diff>
--- a/final_presentation.pptx
+++ b/final_presentation.pptx
@@ -5,15 +5,20 @@
     <p:sldMasterId id="2147483648" r:id="rId1"/>
   </p:sldMasterIdLst>
   <p:notesMasterIdLst>
-    <p:notesMasterId r:id="rId8"/>
+    <p:notesMasterId r:id="rId13"/>
   </p:notesMasterIdLst>
   <p:sldIdLst>
-    <p:sldId id="256" r:id="rId2"/>
-    <p:sldId id="262" r:id="rId3"/>
-    <p:sldId id="257" r:id="rId4"/>
-    <p:sldId id="258" r:id="rId5"/>
-    <p:sldId id="261" r:id="rId6"/>
-    <p:sldId id="259" r:id="rId7"/>
+    <p:sldId id="268" r:id="rId2"/>
+    <p:sldId id="266" r:id="rId3"/>
+    <p:sldId id="267" r:id="rId4"/>
+    <p:sldId id="262" r:id="rId5"/>
+    <p:sldId id="257" r:id="rId6"/>
+    <p:sldId id="263" r:id="rId7"/>
+    <p:sldId id="265" r:id="rId8"/>
+    <p:sldId id="258" r:id="rId9"/>
+    <p:sldId id="264" r:id="rId10"/>
+    <p:sldId id="256" r:id="rId11"/>
+    <p:sldId id="259" r:id="rId12"/>
   </p:sldIdLst>
   <p:sldSz cx="12192000" cy="6858000"/>
   <p:notesSz cx="6858000" cy="9144000"/>
@@ -534,7 +539,259 @@
           <a:p>
             <a:fld id="{A8983C90-4626-814B-837F-264CA2EC8117}" type="slidenum">
               <a:rPr lang="en-US" smtClean="0"/>
-              <a:t>6</a:t>
+              <a:t>3</a:t>
+            </a:fld>
+            <a:endParaRPr lang="en-US"/>
+          </a:p>
+        </p:txBody>
+      </p:sp>
+    </p:spTree>
+    <p:extLst>
+      <p:ext uri="{BB962C8B-B14F-4D97-AF65-F5344CB8AC3E}">
+        <p14:creationId xmlns:p14="http://schemas.microsoft.com/office/powerpoint/2010/main" val="715004413"/>
+      </p:ext>
+    </p:extLst>
+  </p:cSld>
+  <p:clrMapOvr>
+    <a:masterClrMapping/>
+  </p:clrMapOvr>
+</p:notes>
+</file>
+
+<file path=ppt/notesSlides/notesSlide2.xml><?xml version="1.0" encoding="utf-8"?>
+<p:notes xmlns:a="http://schemas.openxmlformats.org/drawingml/2006/main" xmlns:r="http://schemas.openxmlformats.org/officeDocument/2006/relationships" xmlns:p="http://schemas.openxmlformats.org/presentationml/2006/main">
+  <p:cSld>
+    <p:spTree>
+      <p:nvGrpSpPr>
+        <p:cNvPr id="1" name=""/>
+        <p:cNvGrpSpPr/>
+        <p:nvPr/>
+      </p:nvGrpSpPr>
+      <p:grpSpPr>
+        <a:xfrm>
+          <a:off x="0" y="0"/>
+          <a:ext cx="0" cy="0"/>
+          <a:chOff x="0" y="0"/>
+          <a:chExt cx="0" cy="0"/>
+        </a:xfrm>
+      </p:grpSpPr>
+      <p:sp>
+        <p:nvSpPr>
+          <p:cNvPr id="2" name="Slide Image Placeholder 1"/>
+          <p:cNvSpPr>
+            <a:spLocks noGrp="1" noRot="1" noChangeAspect="1"/>
+          </p:cNvSpPr>
+          <p:nvPr>
+            <p:ph type="sldImg"/>
+          </p:nvPr>
+        </p:nvSpPr>
+        <p:spPr/>
+      </p:sp>
+      <p:sp>
+        <p:nvSpPr>
+          <p:cNvPr id="3" name="Notes Placeholder 2"/>
+          <p:cNvSpPr>
+            <a:spLocks noGrp="1"/>
+          </p:cNvSpPr>
+          <p:nvPr>
+            <p:ph type="body" idx="1"/>
+          </p:nvPr>
+        </p:nvSpPr>
+        <p:spPr/>
+        <p:txBody>
+          <a:bodyPr/>
+          <a:lstStyle/>
+          <a:p>
+            <a:endParaRPr lang="en-US" dirty="0"/>
+          </a:p>
+        </p:txBody>
+      </p:sp>
+      <p:sp>
+        <p:nvSpPr>
+          <p:cNvPr id="4" name="Slide Number Placeholder 3"/>
+          <p:cNvSpPr>
+            <a:spLocks noGrp="1"/>
+          </p:cNvSpPr>
+          <p:nvPr>
+            <p:ph type="sldNum" sz="quarter" idx="10"/>
+          </p:nvPr>
+        </p:nvSpPr>
+        <p:spPr/>
+        <p:txBody>
+          <a:bodyPr/>
+          <a:lstStyle/>
+          <a:p>
+            <a:fld id="{A8983C90-4626-814B-837F-264CA2EC8117}" type="slidenum">
+              <a:rPr lang="en-US" smtClean="0"/>
+              <a:t>8</a:t>
+            </a:fld>
+            <a:endParaRPr lang="en-US"/>
+          </a:p>
+        </p:txBody>
+      </p:sp>
+    </p:spTree>
+    <p:extLst>
+      <p:ext uri="{BB962C8B-B14F-4D97-AF65-F5344CB8AC3E}">
+        <p14:creationId xmlns:p14="http://schemas.microsoft.com/office/powerpoint/2010/main" val="1221485146"/>
+      </p:ext>
+    </p:extLst>
+  </p:cSld>
+  <p:clrMapOvr>
+    <a:masterClrMapping/>
+  </p:clrMapOvr>
+</p:notes>
+</file>
+
+<file path=ppt/notesSlides/notesSlide3.xml><?xml version="1.0" encoding="utf-8"?>
+<p:notes xmlns:a="http://schemas.openxmlformats.org/drawingml/2006/main" xmlns:r="http://schemas.openxmlformats.org/officeDocument/2006/relationships" xmlns:p="http://schemas.openxmlformats.org/presentationml/2006/main">
+  <p:cSld>
+    <p:spTree>
+      <p:nvGrpSpPr>
+        <p:cNvPr id="1" name=""/>
+        <p:cNvGrpSpPr/>
+        <p:nvPr/>
+      </p:nvGrpSpPr>
+      <p:grpSpPr>
+        <a:xfrm>
+          <a:off x="0" y="0"/>
+          <a:ext cx="0" cy="0"/>
+          <a:chOff x="0" y="0"/>
+          <a:chExt cx="0" cy="0"/>
+        </a:xfrm>
+      </p:grpSpPr>
+      <p:sp>
+        <p:nvSpPr>
+          <p:cNvPr id="2" name="Slide Image Placeholder 1"/>
+          <p:cNvSpPr>
+            <a:spLocks noGrp="1" noRot="1" noChangeAspect="1"/>
+          </p:cNvSpPr>
+          <p:nvPr>
+            <p:ph type="sldImg"/>
+          </p:nvPr>
+        </p:nvSpPr>
+        <p:spPr/>
+      </p:sp>
+      <p:sp>
+        <p:nvSpPr>
+          <p:cNvPr id="3" name="Notes Placeholder 2"/>
+          <p:cNvSpPr>
+            <a:spLocks noGrp="1"/>
+          </p:cNvSpPr>
+          <p:nvPr>
+            <p:ph type="body" idx="1"/>
+          </p:nvPr>
+        </p:nvSpPr>
+        <p:spPr/>
+        <p:txBody>
+          <a:bodyPr/>
+          <a:lstStyle/>
+          <a:p>
+            <a:endParaRPr lang="en-US" dirty="0"/>
+          </a:p>
+        </p:txBody>
+      </p:sp>
+      <p:sp>
+        <p:nvSpPr>
+          <p:cNvPr id="4" name="Slide Number Placeholder 3"/>
+          <p:cNvSpPr>
+            <a:spLocks noGrp="1"/>
+          </p:cNvSpPr>
+          <p:nvPr>
+            <p:ph type="sldNum" sz="quarter" idx="10"/>
+          </p:nvPr>
+        </p:nvSpPr>
+        <p:spPr/>
+        <p:txBody>
+          <a:bodyPr/>
+          <a:lstStyle/>
+          <a:p>
+            <a:fld id="{A8983C90-4626-814B-837F-264CA2EC8117}" type="slidenum">
+              <a:rPr lang="en-US" smtClean="0"/>
+              <a:t>9</a:t>
+            </a:fld>
+            <a:endParaRPr lang="en-US"/>
+          </a:p>
+        </p:txBody>
+      </p:sp>
+    </p:spTree>
+    <p:extLst>
+      <p:ext uri="{BB962C8B-B14F-4D97-AF65-F5344CB8AC3E}">
+        <p14:creationId xmlns:p14="http://schemas.microsoft.com/office/powerpoint/2010/main" val="3947132434"/>
+      </p:ext>
+    </p:extLst>
+  </p:cSld>
+  <p:clrMapOvr>
+    <a:masterClrMapping/>
+  </p:clrMapOvr>
+</p:notes>
+</file>
+
+<file path=ppt/notesSlides/notesSlide4.xml><?xml version="1.0" encoding="utf-8"?>
+<p:notes xmlns:a="http://schemas.openxmlformats.org/drawingml/2006/main" xmlns:r="http://schemas.openxmlformats.org/officeDocument/2006/relationships" xmlns:p="http://schemas.openxmlformats.org/presentationml/2006/main">
+  <p:cSld>
+    <p:spTree>
+      <p:nvGrpSpPr>
+        <p:cNvPr id="1" name=""/>
+        <p:cNvGrpSpPr/>
+        <p:nvPr/>
+      </p:nvGrpSpPr>
+      <p:grpSpPr>
+        <a:xfrm>
+          <a:off x="0" y="0"/>
+          <a:ext cx="0" cy="0"/>
+          <a:chOff x="0" y="0"/>
+          <a:chExt cx="0" cy="0"/>
+        </a:xfrm>
+      </p:grpSpPr>
+      <p:sp>
+        <p:nvSpPr>
+          <p:cNvPr id="2" name="Slide Image Placeholder 1"/>
+          <p:cNvSpPr>
+            <a:spLocks noGrp="1" noRot="1" noChangeAspect="1"/>
+          </p:cNvSpPr>
+          <p:nvPr>
+            <p:ph type="sldImg"/>
+          </p:nvPr>
+        </p:nvSpPr>
+        <p:spPr/>
+      </p:sp>
+      <p:sp>
+        <p:nvSpPr>
+          <p:cNvPr id="3" name="Notes Placeholder 2"/>
+          <p:cNvSpPr>
+            <a:spLocks noGrp="1"/>
+          </p:cNvSpPr>
+          <p:nvPr>
+            <p:ph type="body" idx="1"/>
+          </p:nvPr>
+        </p:nvSpPr>
+        <p:spPr/>
+        <p:txBody>
+          <a:bodyPr/>
+          <a:lstStyle/>
+          <a:p>
+            <a:endParaRPr lang="en-US" dirty="0"/>
+          </a:p>
+        </p:txBody>
+      </p:sp>
+      <p:sp>
+        <p:nvSpPr>
+          <p:cNvPr id="4" name="Slide Number Placeholder 3"/>
+          <p:cNvSpPr>
+            <a:spLocks noGrp="1"/>
+          </p:cNvSpPr>
+          <p:nvPr>
+            <p:ph type="sldNum" sz="quarter" idx="10"/>
+          </p:nvPr>
+        </p:nvSpPr>
+        <p:spPr/>
+        <p:txBody>
+          <a:bodyPr/>
+          <a:lstStyle/>
+          <a:p>
+            <a:fld id="{A8983C90-4626-814B-837F-264CA2EC8117}" type="slidenum">
+              <a:rPr lang="en-US" smtClean="0"/>
+              <a:t>11</a:t>
             </a:fld>
             <a:endParaRPr lang="en-US"/>
           </a:p>
@@ -3772,6 +4029,96 @@
           <p:cNvPr id="4" name="Title 3">
             <a:extLst>
               <a:ext uri="{FF2B5EF4-FFF2-40B4-BE49-F238E27FC236}">
+                <a16:creationId xmlns:a16="http://schemas.microsoft.com/office/drawing/2014/main" id="{60262703-B7AF-BB45-B82D-74F3DC33469B}"/>
+              </a:ext>
+            </a:extLst>
+          </p:cNvPr>
+          <p:cNvSpPr>
+            <a:spLocks noGrp="1"/>
+          </p:cNvSpPr>
+          <p:nvPr>
+            <p:ph type="ctrTitle"/>
+          </p:nvPr>
+        </p:nvSpPr>
+        <p:spPr/>
+        <p:txBody>
+          <a:bodyPr/>
+          <a:lstStyle/>
+          <a:p>
+            <a:r>
+              <a:rPr lang="en-US" dirty="0" err="1"/>
+              <a:t>Annalect</a:t>
+            </a:r>
+            <a:r>
+              <a:rPr lang="en-US" dirty="0"/>
+              <a:t> Problem Set</a:t>
+            </a:r>
+          </a:p>
+        </p:txBody>
+      </p:sp>
+      <p:sp>
+        <p:nvSpPr>
+          <p:cNvPr id="5" name="Subtitle 4">
+            <a:extLst>
+              <a:ext uri="{FF2B5EF4-FFF2-40B4-BE49-F238E27FC236}">
+                <a16:creationId xmlns:a16="http://schemas.microsoft.com/office/drawing/2014/main" id="{7A07A65E-AB86-4A48-B301-FDC937CF1BCE}"/>
+              </a:ext>
+            </a:extLst>
+          </p:cNvPr>
+          <p:cNvSpPr>
+            <a:spLocks noGrp="1"/>
+          </p:cNvSpPr>
+          <p:nvPr>
+            <p:ph type="subTitle" idx="1"/>
+          </p:nvPr>
+        </p:nvSpPr>
+        <p:spPr/>
+        <p:txBody>
+          <a:bodyPr/>
+          <a:lstStyle/>
+          <a:p>
+            <a:r>
+              <a:rPr lang="en-US" dirty="0"/>
+              <a:t>Vivienne</a:t>
+            </a:r>
+          </a:p>
+        </p:txBody>
+      </p:sp>
+    </p:spTree>
+    <p:extLst>
+      <p:ext uri="{BB962C8B-B14F-4D97-AF65-F5344CB8AC3E}">
+        <p14:creationId xmlns:p14="http://schemas.microsoft.com/office/powerpoint/2010/main" val="1592621063"/>
+      </p:ext>
+    </p:extLst>
+  </p:cSld>
+  <p:clrMapOvr>
+    <a:masterClrMapping/>
+  </p:clrMapOvr>
+</p:sld>
+</file>
+
+<file path=ppt/slides/slide10.xml><?xml version="1.0" encoding="utf-8"?>
+<p:sld xmlns:a="http://schemas.openxmlformats.org/drawingml/2006/main" xmlns:r="http://schemas.openxmlformats.org/officeDocument/2006/relationships" xmlns:p="http://schemas.openxmlformats.org/presentationml/2006/main">
+  <p:cSld>
+    <p:spTree>
+      <p:nvGrpSpPr>
+        <p:cNvPr id="1" name=""/>
+        <p:cNvGrpSpPr/>
+        <p:nvPr/>
+      </p:nvGrpSpPr>
+      <p:grpSpPr>
+        <a:xfrm>
+          <a:off x="0" y="0"/>
+          <a:ext cx="0" cy="0"/>
+          <a:chOff x="0" y="0"/>
+          <a:chExt cx="0" cy="0"/>
+        </a:xfrm>
+      </p:grpSpPr>
+      <p:sp>
+        <p:nvSpPr>
+          <p:cNvPr id="4" name="Title 3">
+            <a:extLst>
+              <a:ext uri="{FF2B5EF4-FFF2-40B4-BE49-F238E27FC236}">
                 <a16:creationId xmlns:a16="http://schemas.microsoft.com/office/drawing/2014/main" id="{6D5CEB95-69CA-A146-BE1D-261779EC7067}"/>
               </a:ext>
             </a:extLst>
@@ -3790,7 +4137,7 @@
           <a:p>
             <a:r>
               <a:rPr lang="en-US" dirty="0"/>
-              <a:t>Findings</a:t>
+              <a:t>Allocation of 200 New Aged Care Units</a:t>
             </a:r>
           </a:p>
         </p:txBody>
@@ -3811,19 +4158,1026 @@
             <p:ph idx="1"/>
           </p:nvPr>
         </p:nvSpPr>
-        <p:spPr/>
+        <p:spPr>
+          <a:xfrm>
+            <a:off x="838200" y="1464678"/>
+            <a:ext cx="10515600" cy="4351338"/>
+          </a:xfrm>
+        </p:spPr>
         <p:txBody>
           <a:bodyPr/>
           <a:lstStyle/>
           <a:p>
+            <a:pPr marL="0" indent="0">
+              <a:buNone/>
+            </a:pPr>
             <a:endParaRPr lang="en-US" dirty="0"/>
           </a:p>
         </p:txBody>
       </p:sp>
+      <p:graphicFrame>
+        <p:nvGraphicFramePr>
+          <p:cNvPr id="3" name="Table 2">
+            <a:extLst>
+              <a:ext uri="{FF2B5EF4-FFF2-40B4-BE49-F238E27FC236}">
+                <a16:creationId xmlns:a16="http://schemas.microsoft.com/office/drawing/2014/main" id="{2454315C-A826-3949-A746-9CC6E7819ACC}"/>
+              </a:ext>
+            </a:extLst>
+          </p:cNvPr>
+          <p:cNvGraphicFramePr>
+            <a:graphicFrameLocks noGrp="1"/>
+          </p:cNvGraphicFramePr>
+          <p:nvPr>
+            <p:extLst>
+              <p:ext uri="{D42A27DB-BD31-4B8C-83A1-F6EECF244321}">
+                <p14:modId xmlns:p14="http://schemas.microsoft.com/office/powerpoint/2010/main" val="2381121513"/>
+              </p:ext>
+            </p:extLst>
+          </p:nvPr>
+        </p:nvGraphicFramePr>
+        <p:xfrm>
+          <a:off x="838200" y="1464678"/>
+          <a:ext cx="10515600" cy="4328781"/>
+        </p:xfrm>
+        <a:graphic>
+          <a:graphicData uri="http://schemas.openxmlformats.org/drawingml/2006/table">
+            <a:tbl>
+              <a:tblPr firstRow="1" bandRow="1">
+                <a:tableStyleId>{5C22544A-7EE6-4342-B048-85BDC9FD1C3A}</a:tableStyleId>
+              </a:tblPr>
+              <a:tblGrid>
+                <a:gridCol w="2103120">
+                  <a:extLst>
+                    <a:ext uri="{9D8B030D-6E8A-4147-A177-3AD203B41FA5}">
+                      <a16:colId xmlns:a16="http://schemas.microsoft.com/office/drawing/2014/main" val="2350512347"/>
+                    </a:ext>
+                  </a:extLst>
+                </a:gridCol>
+                <a:gridCol w="2103120">
+                  <a:extLst>
+                    <a:ext uri="{9D8B030D-6E8A-4147-A177-3AD203B41FA5}">
+                      <a16:colId xmlns:a16="http://schemas.microsoft.com/office/drawing/2014/main" val="360015556"/>
+                    </a:ext>
+                  </a:extLst>
+                </a:gridCol>
+                <a:gridCol w="2103120">
+                  <a:extLst>
+                    <a:ext uri="{9D8B030D-6E8A-4147-A177-3AD203B41FA5}">
+                      <a16:colId xmlns:a16="http://schemas.microsoft.com/office/drawing/2014/main" val="2611921016"/>
+                    </a:ext>
+                  </a:extLst>
+                </a:gridCol>
+                <a:gridCol w="2382487">
+                  <a:extLst>
+                    <a:ext uri="{9D8B030D-6E8A-4147-A177-3AD203B41FA5}">
+                      <a16:colId xmlns:a16="http://schemas.microsoft.com/office/drawing/2014/main" val="2352901676"/>
+                    </a:ext>
+                  </a:extLst>
+                </a:gridCol>
+                <a:gridCol w="1823753">
+                  <a:extLst>
+                    <a:ext uri="{9D8B030D-6E8A-4147-A177-3AD203B41FA5}">
+                      <a16:colId xmlns:a16="http://schemas.microsoft.com/office/drawing/2014/main" val="3979451838"/>
+                    </a:ext>
+                  </a:extLst>
+                </a:gridCol>
+              </a:tblGrid>
+              <a:tr h="1059389">
+                <a:tc>
+                  <a:txBody>
+                    <a:bodyPr/>
+                    <a:lstStyle/>
+                    <a:p>
+                      <a:pPr algn="ctr"/>
+                      <a:r>
+                        <a:rPr lang="en-US" b="0" dirty="0"/>
+                        <a:t>State</a:t>
+                      </a:r>
+                    </a:p>
+                  </a:txBody>
+                  <a:tcPr/>
+                </a:tc>
+                <a:tc>
+                  <a:txBody>
+                    <a:bodyPr/>
+                    <a:lstStyle/>
+                    <a:p>
+                      <a:pPr algn="ctr"/>
+                      <a:r>
+                        <a:rPr lang="en-US" b="0" dirty="0"/>
+                        <a:t>ACU Distribution by Capacity</a:t>
+                      </a:r>
+                    </a:p>
+                  </a:txBody>
+                  <a:tcPr/>
+                </a:tc>
+                <a:tc>
+                  <a:txBody>
+                    <a:bodyPr/>
+                    <a:lstStyle/>
+                    <a:p>
+                      <a:pPr algn="ctr"/>
+                      <a:r>
+                        <a:rPr lang="en-US" b="0" dirty="0"/>
+                        <a:t>Population Distribution</a:t>
+                      </a:r>
+                    </a:p>
+                  </a:txBody>
+                  <a:tcPr/>
+                </a:tc>
+                <a:tc>
+                  <a:txBody>
+                    <a:bodyPr/>
+                    <a:lstStyle/>
+                    <a:p>
+                      <a:pPr algn="ctr"/>
+                      <a:r>
+                        <a:rPr lang="en-US" b="0" dirty="0"/>
+                        <a:t>Ratio of ACU </a:t>
+                      </a:r>
+                      <a:r>
+                        <a:rPr lang="en-US" b="0" dirty="0" err="1"/>
+                        <a:t>Distrib</a:t>
+                      </a:r>
+                      <a:r>
+                        <a:rPr lang="en-US" b="0" dirty="0"/>
+                        <a:t> and Population </a:t>
+                      </a:r>
+                      <a:r>
+                        <a:rPr lang="en-US" b="0" dirty="0" err="1"/>
+                        <a:t>Distrib</a:t>
+                      </a:r>
+                      <a:endParaRPr lang="en-US" b="0" dirty="0"/>
+                    </a:p>
+                  </a:txBody>
+                  <a:tcPr/>
+                </a:tc>
+                <a:tc>
+                  <a:txBody>
+                    <a:bodyPr/>
+                    <a:lstStyle/>
+                    <a:p>
+                      <a:pPr algn="ctr"/>
+                      <a:r>
+                        <a:rPr lang="en-US" b="0" dirty="0"/>
+                        <a:t>Population</a:t>
+                      </a:r>
+                    </a:p>
+                  </a:txBody>
+                  <a:tcPr/>
+                </a:tc>
+                <a:extLst>
+                  <a:ext uri="{0D108BD9-81ED-4DB2-BD59-A6C34878D82A}">
+                    <a16:rowId xmlns:a16="http://schemas.microsoft.com/office/drawing/2014/main" val="3499412382"/>
+                  </a:ext>
+                </a:extLst>
+              </a:tr>
+              <a:tr h="408674">
+                <a:tc>
+                  <a:txBody>
+                    <a:bodyPr/>
+                    <a:lstStyle/>
+                    <a:p>
+                      <a:r>
+                        <a:rPr lang="en-US" dirty="0"/>
+                        <a:t>NT</a:t>
+                      </a:r>
+                    </a:p>
+                  </a:txBody>
+                  <a:tcPr/>
+                </a:tc>
+                <a:tc>
+                  <a:txBody>
+                    <a:bodyPr/>
+                    <a:lstStyle/>
+                    <a:p>
+                      <a:r>
+                        <a:rPr lang="en-US" dirty="0"/>
+                        <a:t>0.48%</a:t>
+                      </a:r>
+                    </a:p>
+                  </a:txBody>
+                  <a:tcPr/>
+                </a:tc>
+                <a:tc>
+                  <a:txBody>
+                    <a:bodyPr/>
+                    <a:lstStyle/>
+                    <a:p>
+                      <a:r>
+                        <a:rPr lang="en-US" dirty="0"/>
+                        <a:t>0.71%</a:t>
+                      </a:r>
+                    </a:p>
+                  </a:txBody>
+                  <a:tcPr/>
+                </a:tc>
+                <a:tc>
+                  <a:txBody>
+                    <a:bodyPr/>
+                    <a:lstStyle/>
+                    <a:p>
+                      <a:r>
+                        <a:rPr lang="en-US" dirty="0"/>
+                        <a:t>1.48</a:t>
+                      </a:r>
+                    </a:p>
+                  </a:txBody>
+                  <a:tcPr/>
+                </a:tc>
+                <a:tc>
+                  <a:txBody>
+                    <a:bodyPr/>
+                    <a:lstStyle/>
+                    <a:p>
+                      <a:r>
+                        <a:rPr lang="en-PH" sz="1800" b="0" i="0" kern="1200" dirty="0">
+                          <a:solidFill>
+                            <a:schemeClr val="dk1"/>
+                          </a:solidFill>
+                          <a:effectLst/>
+                          <a:latin typeface="+mn-lt"/>
+                          <a:ea typeface="+mn-ea"/>
+                          <a:cs typeface="+mn-cs"/>
+                        </a:rPr>
+                        <a:t>59,423</a:t>
+                      </a:r>
+                      <a:endParaRPr lang="en-US" dirty="0"/>
+                    </a:p>
+                  </a:txBody>
+                  <a:tcPr/>
+                </a:tc>
+                <a:extLst>
+                  <a:ext uri="{0D108BD9-81ED-4DB2-BD59-A6C34878D82A}">
+                    <a16:rowId xmlns:a16="http://schemas.microsoft.com/office/drawing/2014/main" val="1114881580"/>
+                  </a:ext>
+                </a:extLst>
+              </a:tr>
+              <a:tr h="408674">
+                <a:tc>
+                  <a:txBody>
+                    <a:bodyPr/>
+                    <a:lstStyle/>
+                    <a:p>
+                      <a:r>
+                        <a:rPr lang="en-US" dirty="0"/>
+                        <a:t>ACT</a:t>
+                      </a:r>
+                    </a:p>
+                  </a:txBody>
+                  <a:tcPr/>
+                </a:tc>
+                <a:tc>
+                  <a:txBody>
+                    <a:bodyPr/>
+                    <a:lstStyle/>
+                    <a:p>
+                      <a:r>
+                        <a:rPr lang="en-US" dirty="0"/>
+                        <a:t>1.19%</a:t>
+                      </a:r>
+                    </a:p>
+                  </a:txBody>
+                  <a:tcPr/>
+                </a:tc>
+                <a:tc>
+                  <a:txBody>
+                    <a:bodyPr/>
+                    <a:lstStyle/>
+                    <a:p>
+                      <a:r>
+                        <a:rPr lang="en-US" dirty="0"/>
+                        <a:t>1.45%</a:t>
+                      </a:r>
+                    </a:p>
+                  </a:txBody>
+                  <a:tcPr/>
+                </a:tc>
+                <a:tc>
+                  <a:txBody>
+                    <a:bodyPr/>
+                    <a:lstStyle/>
+                    <a:p>
+                      <a:r>
+                        <a:rPr lang="en-US" dirty="0"/>
+                        <a:t>1.21</a:t>
+                      </a:r>
+                    </a:p>
+                  </a:txBody>
+                  <a:tcPr/>
+                </a:tc>
+                <a:tc>
+                  <a:txBody>
+                    <a:bodyPr/>
+                    <a:lstStyle/>
+                    <a:p>
+                      <a:r>
+                        <a:rPr lang="en-PH" sz="1800" b="0" i="0" kern="1200" dirty="0">
+                          <a:solidFill>
+                            <a:schemeClr val="dk1"/>
+                          </a:solidFill>
+                          <a:effectLst/>
+                          <a:latin typeface="+mn-lt"/>
+                          <a:ea typeface="+mn-ea"/>
+                          <a:cs typeface="+mn-cs"/>
+                        </a:rPr>
+                        <a:t>120,857</a:t>
+                      </a:r>
+                      <a:endParaRPr lang="en-US" dirty="0"/>
+                    </a:p>
+                  </a:txBody>
+                  <a:tcPr/>
+                </a:tc>
+                <a:extLst>
+                  <a:ext uri="{0D108BD9-81ED-4DB2-BD59-A6C34878D82A}">
+                    <a16:rowId xmlns:a16="http://schemas.microsoft.com/office/drawing/2014/main" val="538226209"/>
+                  </a:ext>
+                </a:extLst>
+              </a:tr>
+              <a:tr h="408674">
+                <a:tc>
+                  <a:txBody>
+                    <a:bodyPr/>
+                    <a:lstStyle/>
+                    <a:p>
+                      <a:r>
+                        <a:rPr lang="en-US" dirty="0"/>
+                        <a:t>WA</a:t>
+                      </a:r>
+                    </a:p>
+                  </a:txBody>
+                  <a:tcPr/>
+                </a:tc>
+                <a:tc>
+                  <a:txBody>
+                    <a:bodyPr/>
+                    <a:lstStyle/>
+                    <a:p>
+                      <a:r>
+                        <a:rPr lang="en-US" dirty="0"/>
+                        <a:t>8.55%</a:t>
+                      </a:r>
+                    </a:p>
+                  </a:txBody>
+                  <a:tcPr/>
+                </a:tc>
+                <a:tc>
+                  <a:txBody>
+                    <a:bodyPr/>
+                    <a:lstStyle/>
+                    <a:p>
+                      <a:r>
+                        <a:rPr lang="en-US" dirty="0"/>
+                        <a:t>10.02%</a:t>
+                      </a:r>
+                    </a:p>
+                  </a:txBody>
+                  <a:tcPr/>
+                </a:tc>
+                <a:tc>
+                  <a:txBody>
+                    <a:bodyPr/>
+                    <a:lstStyle/>
+                    <a:p>
+                      <a:r>
+                        <a:rPr lang="en-US" dirty="0"/>
+                        <a:t>1.17</a:t>
+                      </a:r>
+                    </a:p>
+                  </a:txBody>
+                  <a:tcPr/>
+                </a:tc>
+                <a:tc>
+                  <a:txBody>
+                    <a:bodyPr/>
+                    <a:lstStyle/>
+                    <a:p>
+                      <a:r>
+                        <a:rPr lang="en-PH" sz="1800" b="0" i="0" kern="1200" dirty="0">
+                          <a:solidFill>
+                            <a:schemeClr val="dk1"/>
+                          </a:solidFill>
+                          <a:effectLst/>
+                          <a:latin typeface="+mn-lt"/>
+                          <a:ea typeface="+mn-ea"/>
+                          <a:cs typeface="+mn-cs"/>
+                        </a:rPr>
+                        <a:t>834,753</a:t>
+                      </a:r>
+                      <a:endParaRPr lang="en-US" dirty="0"/>
+                    </a:p>
+                  </a:txBody>
+                  <a:tcPr/>
+                </a:tc>
+                <a:extLst>
+                  <a:ext uri="{0D108BD9-81ED-4DB2-BD59-A6C34878D82A}">
+                    <a16:rowId xmlns:a16="http://schemas.microsoft.com/office/drawing/2014/main" val="491189153"/>
+                  </a:ext>
+                </a:extLst>
+              </a:tr>
+              <a:tr h="408674">
+                <a:tc>
+                  <a:txBody>
+                    <a:bodyPr/>
+                    <a:lstStyle/>
+                    <a:p>
+                      <a:r>
+                        <a:rPr lang="en-US" dirty="0"/>
+                        <a:t>TAS</a:t>
+                      </a:r>
+                    </a:p>
+                  </a:txBody>
+                  <a:tcPr/>
+                </a:tc>
+                <a:tc>
+                  <a:txBody>
+                    <a:bodyPr/>
+                    <a:lstStyle/>
+                    <a:p>
+                      <a:r>
+                        <a:rPr lang="en-US" dirty="0"/>
+                        <a:t>2.42%</a:t>
+                      </a:r>
+                    </a:p>
+                  </a:txBody>
+                  <a:tcPr/>
+                </a:tc>
+                <a:tc>
+                  <a:txBody>
+                    <a:bodyPr/>
+                    <a:lstStyle/>
+                    <a:p>
+                      <a:r>
+                        <a:rPr lang="en-US" dirty="0"/>
+                        <a:t>2.54%</a:t>
+                      </a:r>
+                    </a:p>
+                  </a:txBody>
+                  <a:tcPr/>
+                </a:tc>
+                <a:tc>
+                  <a:txBody>
+                    <a:bodyPr/>
+                    <a:lstStyle/>
+                    <a:p>
+                      <a:r>
+                        <a:rPr lang="en-US" dirty="0"/>
+                        <a:t>1.05</a:t>
+                      </a:r>
+                    </a:p>
+                  </a:txBody>
+                  <a:tcPr/>
+                </a:tc>
+                <a:tc>
+                  <a:txBody>
+                    <a:bodyPr/>
+                    <a:lstStyle/>
+                    <a:p>
+                      <a:r>
+                        <a:rPr lang="en-PH" sz="1800" b="0" i="0" kern="1200" dirty="0">
+                          <a:solidFill>
+                            <a:schemeClr val="dk1"/>
+                          </a:solidFill>
+                          <a:effectLst/>
+                          <a:latin typeface="+mn-lt"/>
+                          <a:ea typeface="+mn-ea"/>
+                          <a:cs typeface="+mn-cs"/>
+                        </a:rPr>
+                        <a:t>211,885</a:t>
+                      </a:r>
+                      <a:endParaRPr lang="en-US" dirty="0"/>
+                    </a:p>
+                  </a:txBody>
+                  <a:tcPr/>
+                </a:tc>
+                <a:extLst>
+                  <a:ext uri="{0D108BD9-81ED-4DB2-BD59-A6C34878D82A}">
+                    <a16:rowId xmlns:a16="http://schemas.microsoft.com/office/drawing/2014/main" val="485612198"/>
+                  </a:ext>
+                </a:extLst>
+              </a:tr>
+              <a:tr h="408674">
+                <a:tc>
+                  <a:txBody>
+                    <a:bodyPr/>
+                    <a:lstStyle/>
+                    <a:p>
+                      <a:r>
+                        <a:rPr lang="en-US" dirty="0"/>
+                        <a:t>QLD</a:t>
+                      </a:r>
+                    </a:p>
+                  </a:txBody>
+                  <a:tcPr/>
+                </a:tc>
+                <a:tc>
+                  <a:txBody>
+                    <a:bodyPr/>
+                    <a:lstStyle/>
+                    <a:p>
+                      <a:r>
+                        <a:rPr lang="en-US" dirty="0"/>
+                        <a:t>19.06%</a:t>
+                      </a:r>
+                    </a:p>
+                  </a:txBody>
+                  <a:tcPr/>
+                </a:tc>
+                <a:tc>
+                  <a:txBody>
+                    <a:bodyPr/>
+                    <a:lstStyle/>
+                    <a:p>
+                      <a:r>
+                        <a:rPr lang="en-US" dirty="0"/>
+                        <a:t>19.95%</a:t>
+                      </a:r>
+                    </a:p>
+                  </a:txBody>
+                  <a:tcPr/>
+                </a:tc>
+                <a:tc>
+                  <a:txBody>
+                    <a:bodyPr/>
+                    <a:lstStyle/>
+                    <a:p>
+                      <a:r>
+                        <a:rPr lang="en-US" dirty="0"/>
+                        <a:t>1.05</a:t>
+                      </a:r>
+                    </a:p>
+                  </a:txBody>
+                  <a:tcPr/>
+                </a:tc>
+                <a:tc>
+                  <a:txBody>
+                    <a:bodyPr/>
+                    <a:lstStyle/>
+                    <a:p>
+                      <a:r>
+                        <a:rPr lang="en-PH" sz="1800" b="0" i="0" kern="1200" dirty="0">
+                          <a:solidFill>
+                            <a:schemeClr val="dk1"/>
+                          </a:solidFill>
+                          <a:effectLst/>
+                          <a:latin typeface="+mn-lt"/>
+                          <a:ea typeface="+mn-ea"/>
+                          <a:cs typeface="+mn-cs"/>
+                        </a:rPr>
+                        <a:t>166,2089</a:t>
+                      </a:r>
+                      <a:endParaRPr lang="en-US" dirty="0"/>
+                    </a:p>
+                  </a:txBody>
+                  <a:tcPr/>
+                </a:tc>
+                <a:extLst>
+                  <a:ext uri="{0D108BD9-81ED-4DB2-BD59-A6C34878D82A}">
+                    <a16:rowId xmlns:a16="http://schemas.microsoft.com/office/drawing/2014/main" val="1825124918"/>
+                  </a:ext>
+                </a:extLst>
+              </a:tr>
+              <a:tr h="408674">
+                <a:tc>
+                  <a:txBody>
+                    <a:bodyPr/>
+                    <a:lstStyle/>
+                    <a:p>
+                      <a:r>
+                        <a:rPr lang="en-US" dirty="0"/>
+                        <a:t>NSW</a:t>
+                      </a:r>
+                    </a:p>
+                  </a:txBody>
+                  <a:tcPr/>
+                </a:tc>
+                <a:tc>
+                  <a:txBody>
+                    <a:bodyPr/>
+                    <a:lstStyle/>
+                    <a:p>
+                      <a:r>
+                        <a:rPr lang="en-US" dirty="0"/>
+                        <a:t>33.30%</a:t>
+                      </a:r>
+                    </a:p>
+                  </a:txBody>
+                  <a:tcPr/>
+                </a:tc>
+                <a:tc>
+                  <a:txBody>
+                    <a:bodyPr/>
+                    <a:lstStyle/>
+                    <a:p>
+                      <a:r>
+                        <a:rPr lang="en-US" dirty="0"/>
+                        <a:t>32.35%</a:t>
+                      </a:r>
+                    </a:p>
+                  </a:txBody>
+                  <a:tcPr/>
+                </a:tc>
+                <a:tc>
+                  <a:txBody>
+                    <a:bodyPr/>
+                    <a:lstStyle/>
+                    <a:p>
+                      <a:r>
+                        <a:rPr lang="en-US" dirty="0"/>
+                        <a:t>0.97</a:t>
+                      </a:r>
+                    </a:p>
+                  </a:txBody>
+                  <a:tcPr/>
+                </a:tc>
+                <a:tc>
+                  <a:txBody>
+                    <a:bodyPr/>
+                    <a:lstStyle/>
+                    <a:p>
+                      <a:r>
+                        <a:rPr lang="en-PH" sz="1800" b="0" i="0" kern="1200" dirty="0">
+                          <a:solidFill>
+                            <a:schemeClr val="dk1"/>
+                          </a:solidFill>
+                          <a:effectLst/>
+                          <a:latin typeface="+mn-lt"/>
+                          <a:ea typeface="+mn-ea"/>
+                          <a:cs typeface="+mn-cs"/>
+                        </a:rPr>
+                        <a:t>2,695,373</a:t>
+                      </a:r>
+                      <a:endParaRPr lang="en-US" dirty="0"/>
+                    </a:p>
+                  </a:txBody>
+                  <a:tcPr/>
+                </a:tc>
+                <a:extLst>
+                  <a:ext uri="{0D108BD9-81ED-4DB2-BD59-A6C34878D82A}">
+                    <a16:rowId xmlns:a16="http://schemas.microsoft.com/office/drawing/2014/main" val="2408441376"/>
+                  </a:ext>
+                </a:extLst>
+              </a:tr>
+              <a:tr h="408674">
+                <a:tc>
+                  <a:txBody>
+                    <a:bodyPr/>
+                    <a:lstStyle/>
+                    <a:p>
+                      <a:r>
+                        <a:rPr lang="en-US" dirty="0"/>
+                        <a:t>VIC</a:t>
+                      </a:r>
+                    </a:p>
+                  </a:txBody>
+                  <a:tcPr/>
+                </a:tc>
+                <a:tc>
+                  <a:txBody>
+                    <a:bodyPr/>
+                    <a:lstStyle/>
+                    <a:p>
+                      <a:r>
+                        <a:rPr lang="en-US" dirty="0"/>
+                        <a:t>26.21%</a:t>
+                      </a:r>
+                    </a:p>
+                  </a:txBody>
+                  <a:tcPr/>
+                </a:tc>
+                <a:tc>
+                  <a:txBody>
+                    <a:bodyPr/>
+                    <a:lstStyle/>
+                    <a:p>
+                      <a:r>
+                        <a:rPr lang="en-US" dirty="0"/>
+                        <a:t>25.16%</a:t>
+                      </a:r>
+                    </a:p>
+                  </a:txBody>
+                  <a:tcPr/>
+                </a:tc>
+                <a:tc>
+                  <a:txBody>
+                    <a:bodyPr/>
+                    <a:lstStyle/>
+                    <a:p>
+                      <a:r>
+                        <a:rPr lang="en-US" dirty="0"/>
+                        <a:t>0.96</a:t>
+                      </a:r>
+                    </a:p>
+                  </a:txBody>
+                  <a:tcPr/>
+                </a:tc>
+                <a:tc>
+                  <a:txBody>
+                    <a:bodyPr/>
+                    <a:lstStyle/>
+                    <a:p>
+                      <a:r>
+                        <a:rPr lang="en-PH" sz="1800" b="0" i="0" kern="1200" dirty="0">
+                          <a:solidFill>
+                            <a:schemeClr val="dk1"/>
+                          </a:solidFill>
+                          <a:effectLst/>
+                          <a:latin typeface="+mn-lt"/>
+                          <a:ea typeface="+mn-ea"/>
+                          <a:cs typeface="+mn-cs"/>
+                        </a:rPr>
+                        <a:t>2,096,751</a:t>
+                      </a:r>
+                      <a:endParaRPr lang="en-US" dirty="0"/>
+                    </a:p>
+                  </a:txBody>
+                  <a:tcPr/>
+                </a:tc>
+                <a:extLst>
+                  <a:ext uri="{0D108BD9-81ED-4DB2-BD59-A6C34878D82A}">
+                    <a16:rowId xmlns:a16="http://schemas.microsoft.com/office/drawing/2014/main" val="2719133994"/>
+                  </a:ext>
+                </a:extLst>
+              </a:tr>
+              <a:tr h="408674">
+                <a:tc>
+                  <a:txBody>
+                    <a:bodyPr/>
+                    <a:lstStyle/>
+                    <a:p>
+                      <a:r>
+                        <a:rPr lang="en-US" dirty="0"/>
+                        <a:t>SA</a:t>
+                      </a:r>
+                    </a:p>
+                  </a:txBody>
+                  <a:tcPr/>
+                </a:tc>
+                <a:tc>
+                  <a:txBody>
+                    <a:bodyPr/>
+                    <a:lstStyle/>
+                    <a:p>
+                      <a:r>
+                        <a:rPr lang="en-US" dirty="0"/>
+                        <a:t>8.78%</a:t>
+                      </a:r>
+                    </a:p>
+                  </a:txBody>
+                  <a:tcPr/>
+                </a:tc>
+                <a:tc>
+                  <a:txBody>
+                    <a:bodyPr/>
+                    <a:lstStyle/>
+                    <a:p>
+                      <a:r>
+                        <a:rPr lang="en-US" dirty="0"/>
+                        <a:t>7.79%</a:t>
+                      </a:r>
+                    </a:p>
+                  </a:txBody>
+                  <a:tcPr/>
+                </a:tc>
+                <a:tc>
+                  <a:txBody>
+                    <a:bodyPr/>
+                    <a:lstStyle/>
+                    <a:p>
+                      <a:r>
+                        <a:rPr lang="en-US" dirty="0"/>
+                        <a:t>0.89</a:t>
+                      </a:r>
+                    </a:p>
+                  </a:txBody>
+                  <a:tcPr/>
+                </a:tc>
+                <a:tc>
+                  <a:txBody>
+                    <a:bodyPr/>
+                    <a:lstStyle/>
+                    <a:p>
+                      <a:r>
+                        <a:rPr lang="en-PH" sz="1800" b="0" i="0" kern="1200" dirty="0">
+                          <a:solidFill>
+                            <a:schemeClr val="dk1"/>
+                          </a:solidFill>
+                          <a:effectLst/>
+                          <a:latin typeface="+mn-lt"/>
+                          <a:ea typeface="+mn-ea"/>
+                          <a:cs typeface="+mn-cs"/>
+                        </a:rPr>
+                        <a:t>649,483</a:t>
+                      </a:r>
+                      <a:endParaRPr lang="en-US" dirty="0"/>
+                    </a:p>
+                  </a:txBody>
+                  <a:tcPr/>
+                </a:tc>
+                <a:extLst>
+                  <a:ext uri="{0D108BD9-81ED-4DB2-BD59-A6C34878D82A}">
+                    <a16:rowId xmlns:a16="http://schemas.microsoft.com/office/drawing/2014/main" val="1659587602"/>
+                  </a:ext>
+                </a:extLst>
+              </a:tr>
+            </a:tbl>
+          </a:graphicData>
+        </a:graphic>
+      </p:graphicFrame>
     </p:spTree>
     <p:extLst>
       <p:ext uri="{BB962C8B-B14F-4D97-AF65-F5344CB8AC3E}">
         <p14:creationId xmlns:p14="http://schemas.microsoft.com/office/powerpoint/2010/main" val="3703574678"/>
+      </p:ext>
+    </p:extLst>
+  </p:cSld>
+  <p:clrMapOvr>
+    <a:masterClrMapping/>
+  </p:clrMapOvr>
+</p:sld>
+</file>
+
+<file path=ppt/slides/slide11.xml><?xml version="1.0" encoding="utf-8"?>
+<p:sld xmlns:a="http://schemas.openxmlformats.org/drawingml/2006/main" xmlns:r="http://schemas.openxmlformats.org/officeDocument/2006/relationships" xmlns:p="http://schemas.openxmlformats.org/presentationml/2006/main">
+  <p:cSld>
+    <p:spTree>
+      <p:nvGrpSpPr>
+        <p:cNvPr id="1" name=""/>
+        <p:cNvGrpSpPr/>
+        <p:nvPr/>
+      </p:nvGrpSpPr>
+      <p:grpSpPr>
+        <a:xfrm>
+          <a:off x="0" y="0"/>
+          <a:ext cx="0" cy="0"/>
+          <a:chOff x="0" y="0"/>
+          <a:chExt cx="0" cy="0"/>
+        </a:xfrm>
+      </p:grpSpPr>
+      <p:sp>
+        <p:nvSpPr>
+          <p:cNvPr id="2" name="Title 1">
+            <a:extLst>
+              <a:ext uri="{FF2B5EF4-FFF2-40B4-BE49-F238E27FC236}">
+                <a16:creationId xmlns:a16="http://schemas.microsoft.com/office/drawing/2014/main" id="{F5063B59-EFFC-8642-9D01-47A40B2BFD9A}"/>
+              </a:ext>
+            </a:extLst>
+          </p:cNvPr>
+          <p:cNvSpPr>
+            <a:spLocks noGrp="1"/>
+          </p:cNvSpPr>
+          <p:nvPr>
+            <p:ph type="title"/>
+          </p:nvPr>
+        </p:nvSpPr>
+        <p:spPr/>
+        <p:txBody>
+          <a:bodyPr/>
+          <a:lstStyle/>
+          <a:p>
+            <a:r>
+              <a:rPr lang="en-US" dirty="0"/>
+              <a:t>Sources</a:t>
+            </a:r>
+          </a:p>
+        </p:txBody>
+      </p:sp>
+      <p:sp>
+        <p:nvSpPr>
+          <p:cNvPr id="3" name="Content Placeholder 2">
+            <a:extLst>
+              <a:ext uri="{FF2B5EF4-FFF2-40B4-BE49-F238E27FC236}">
+                <a16:creationId xmlns:a16="http://schemas.microsoft.com/office/drawing/2014/main" id="{059D5BF5-8A23-DA4B-9C07-06CDED256842}"/>
+              </a:ext>
+            </a:extLst>
+          </p:cNvPr>
+          <p:cNvSpPr>
+            <a:spLocks noGrp="1"/>
+          </p:cNvSpPr>
+          <p:nvPr>
+            <p:ph idx="1"/>
+          </p:nvPr>
+        </p:nvSpPr>
+        <p:spPr/>
+        <p:txBody>
+          <a:bodyPr/>
+          <a:lstStyle/>
+          <a:p>
+            <a:r>
+              <a:rPr lang="en-US" dirty="0"/>
+              <a:t>Recent version of the 2016 aged care units data (</a:t>
+            </a:r>
+            <a:r>
+              <a:rPr lang="en-US" dirty="0">
+                <a:hlinkClick r:id="rId3"/>
+              </a:rPr>
+              <a:t>link</a:t>
+            </a:r>
+            <a:r>
+              <a:rPr lang="en-US" dirty="0"/>
+              <a:t>) - now in 2019</a:t>
+            </a:r>
+          </a:p>
+          <a:p>
+            <a:r>
+              <a:rPr lang="en-US" dirty="0"/>
+              <a:t>Population by Age and Sex (</a:t>
+            </a:r>
+            <a:r>
+              <a:rPr lang="en-US" dirty="0">
+                <a:hlinkClick r:id="rId4"/>
+              </a:rPr>
+              <a:t>link</a:t>
+            </a:r>
+            <a:r>
+              <a:rPr lang="en-US" dirty="0"/>
+              <a:t>)</a:t>
+            </a:r>
+          </a:p>
+          <a:p>
+            <a:r>
+              <a:rPr lang="en-US" dirty="0"/>
+              <a:t>Creation of </a:t>
+            </a:r>
+            <a:r>
+              <a:rPr lang="en-US" dirty="0" err="1"/>
+              <a:t>GeoJSON</a:t>
+            </a:r>
+            <a:r>
+              <a:rPr lang="en-US" dirty="0"/>
+              <a:t> file for Australian postcodes (</a:t>
+            </a:r>
+            <a:r>
+              <a:rPr lang="en-US" dirty="0">
+                <a:hlinkClick r:id="rId5"/>
+              </a:rPr>
+              <a:t>link</a:t>
+            </a:r>
+            <a:r>
+              <a:rPr lang="en-US" dirty="0"/>
+              <a:t>)</a:t>
+            </a:r>
+          </a:p>
+          <a:p>
+            <a:r>
+              <a:rPr lang="en-US" dirty="0"/>
+              <a:t>Postcode </a:t>
+            </a:r>
+            <a:r>
+              <a:rPr lang="en-US" dirty="0" err="1"/>
+              <a:t>lat</a:t>
+            </a:r>
+            <a:r>
+              <a:rPr lang="en-US" dirty="0"/>
+              <a:t>/</a:t>
+            </a:r>
+            <a:r>
+              <a:rPr lang="en-US" dirty="0" err="1"/>
+              <a:t>lon</a:t>
+            </a:r>
+            <a:r>
+              <a:rPr lang="en-US" dirty="0"/>
+              <a:t> (</a:t>
+            </a:r>
+            <a:r>
+              <a:rPr lang="en-US" dirty="0">
+                <a:hlinkClick r:id="rId6"/>
+              </a:rPr>
+              <a:t>link</a:t>
+            </a:r>
+            <a:r>
+              <a:rPr lang="en-US" dirty="0"/>
+              <a:t>)</a:t>
+            </a:r>
+          </a:p>
+          <a:p>
+            <a:r>
+              <a:rPr lang="en-US" dirty="0"/>
+              <a:t>LGA (</a:t>
+            </a:r>
+            <a:r>
+              <a:rPr lang="en-US" dirty="0">
+                <a:hlinkClick r:id="rId7"/>
+              </a:rPr>
+              <a:t>link</a:t>
+            </a:r>
+            <a:r>
+              <a:rPr lang="en-US" dirty="0"/>
+              <a:t>)</a:t>
+            </a:r>
+          </a:p>
+          <a:p>
+            <a:endParaRPr lang="en-US" dirty="0"/>
+          </a:p>
+          <a:p>
+            <a:endParaRPr lang="en-US" dirty="0"/>
+          </a:p>
+        </p:txBody>
+      </p:sp>
+    </p:spTree>
+    <p:extLst>
+      <p:ext uri="{BB962C8B-B14F-4D97-AF65-F5344CB8AC3E}">
+        <p14:creationId xmlns:p14="http://schemas.microsoft.com/office/powerpoint/2010/main" val="4174600064"/>
       </p:ext>
     </p:extLst>
   </p:cSld>
@@ -3855,7 +5209,7 @@
           <p:cNvPr id="2" name="Title 1">
             <a:extLst>
               <a:ext uri="{FF2B5EF4-FFF2-40B4-BE49-F238E27FC236}">
-                <a16:creationId xmlns:a16="http://schemas.microsoft.com/office/drawing/2014/main" id="{155C2051-EFAB-2F47-9839-B8496127350B}"/>
+                <a16:creationId xmlns:a16="http://schemas.microsoft.com/office/drawing/2014/main" id="{1CACDB00-60B0-014D-ABE9-1562E8D7EA73}"/>
               </a:ext>
             </a:extLst>
           </p:cNvPr>
@@ -3873,7 +5227,7 @@
           <a:p>
             <a:r>
               <a:rPr lang="en-US" dirty="0"/>
-              <a:t>Hypothesis</a:t>
+              <a:t>Allocation of 200 New Age Care Units</a:t>
             </a:r>
           </a:p>
         </p:txBody>
@@ -3883,7 +5237,7 @@
           <p:cNvPr id="3" name="Content Placeholder 2">
             <a:extLst>
               <a:ext uri="{FF2B5EF4-FFF2-40B4-BE49-F238E27FC236}">
-                <a16:creationId xmlns:a16="http://schemas.microsoft.com/office/drawing/2014/main" id="{9D02C2DD-A0C7-E84A-A3A9-2E70D4E3753A}"/>
+                <a16:creationId xmlns:a16="http://schemas.microsoft.com/office/drawing/2014/main" id="{EA9534A7-4739-6344-B299-D733732BC8FA}"/>
               </a:ext>
             </a:extLst>
           </p:cNvPr>
@@ -3901,33 +5255,39 @@
           <a:p>
             <a:r>
               <a:rPr lang="en-US" dirty="0"/>
-              <a:t>The ratio of old-age population distribution, and available Aged Care Units (ACU) across </a:t>
-            </a:r>
-            <a:r>
-              <a:rPr lang="en-US" b="1" dirty="0"/>
-              <a:t>states</a:t>
-            </a:r>
+              <a:t>Assumptions</a:t>
+            </a:r>
+          </a:p>
+          <a:p>
+            <a:pPr lvl="1"/>
             <a:r>
               <a:rPr lang="en-US" dirty="0"/>
-              <a:t> (or better yet, suburbs) should be as close as possible.</a:t>
-            </a:r>
-          </a:p>
-          <a:p>
+              <a:t>Each Age Care Unit has a capacity of 90</a:t>
+            </a:r>
+          </a:p>
+          <a:p>
+            <a:r>
+              <a:rPr lang="en-US" dirty="0"/>
+              <a:t>Goal</a:t>
+            </a:r>
+          </a:p>
+          <a:p>
+            <a:pPr lvl="1"/>
+            <a:r>
+              <a:rPr lang="en-US" dirty="0"/>
+              <a:t>1 in 35 Australian residents, ages 50 and above should have access to an ACU in their state</a:t>
+            </a:r>
+          </a:p>
+          <a:p>
+            <a:pPr lvl="1"/>
             <a:endParaRPr lang="en-US" dirty="0"/>
-          </a:p>
-          <a:p>
-            <a:pPr lvl="1"/>
-            <a:r>
-              <a:rPr lang="en-US" dirty="0"/>
-              <a:t>If NSW contains 15% of the old-age population, then about 15% of the ACUs should be in NSW.</a:t>
-            </a:r>
           </a:p>
         </p:txBody>
       </p:sp>
     </p:spTree>
     <p:extLst>
       <p:ext uri="{BB962C8B-B14F-4D97-AF65-F5344CB8AC3E}">
-        <p14:creationId xmlns:p14="http://schemas.microsoft.com/office/powerpoint/2010/main" val="4268784176"/>
+        <p14:creationId xmlns:p14="http://schemas.microsoft.com/office/powerpoint/2010/main" val="3078432965"/>
       </p:ext>
     </p:extLst>
   </p:cSld>
@@ -3959,7 +5319,7 @@
           <p:cNvPr id="2" name="Title 1">
             <a:extLst>
               <a:ext uri="{FF2B5EF4-FFF2-40B4-BE49-F238E27FC236}">
-                <a16:creationId xmlns:a16="http://schemas.microsoft.com/office/drawing/2014/main" id="{B69CC8F2-6600-9143-988A-F30CA8B38301}"/>
+                <a16:creationId xmlns:a16="http://schemas.microsoft.com/office/drawing/2014/main" id="{81F7A0E7-1BD6-E04E-8D7A-E1BA2596F18C}"/>
               </a:ext>
             </a:extLst>
           </p:cNvPr>
@@ -3977,53 +5337,915 @@
           <a:p>
             <a:r>
               <a:rPr lang="en-US" dirty="0"/>
-              <a:t>Methodology</a:t>
-            </a:r>
-          </a:p>
-        </p:txBody>
-      </p:sp>
-      <p:sp>
-        <p:nvSpPr>
-          <p:cNvPr id="3" name="Content Placeholder 2">
-            <a:extLst>
-              <a:ext uri="{FF2B5EF4-FFF2-40B4-BE49-F238E27FC236}">
-                <a16:creationId xmlns:a16="http://schemas.microsoft.com/office/drawing/2014/main" id="{F1B6E64A-69AB-984E-9DB5-1370E96612E2}"/>
-              </a:ext>
-            </a:extLst>
-          </p:cNvPr>
-          <p:cNvSpPr>
-            <a:spLocks noGrp="1"/>
-          </p:cNvSpPr>
+              <a:t>Allocation of 200 New Aged Care Units</a:t>
+            </a:r>
+          </a:p>
+        </p:txBody>
+      </p:sp>
+      <p:graphicFrame>
+        <p:nvGraphicFramePr>
+          <p:cNvPr id="4" name="Content Placeholder 3">
+            <a:extLst>
+              <a:ext uri="{FF2B5EF4-FFF2-40B4-BE49-F238E27FC236}">
+                <a16:creationId xmlns:a16="http://schemas.microsoft.com/office/drawing/2014/main" id="{D4D729BB-67BF-B841-9539-A14B42D8C919}"/>
+              </a:ext>
+            </a:extLst>
+          </p:cNvPr>
+          <p:cNvGraphicFramePr>
+            <a:graphicFrameLocks noGrp="1"/>
+          </p:cNvGraphicFramePr>
           <p:nvPr>
             <p:ph idx="1"/>
-          </p:nvPr>
-        </p:nvSpPr>
-        <p:spPr/>
-        <p:txBody>
-          <a:bodyPr/>
-          <a:lstStyle/>
-          <a:p>
-            <a:r>
-              <a:rPr lang="en-US" dirty="0"/>
-              <a:t>Gather data on population arranged by age and location</a:t>
-            </a:r>
-          </a:p>
-          <a:p>
-            <a:r>
-              <a:rPr lang="en-US" dirty="0"/>
-              <a:t>Gather data regarding the location, and capacity of existing aged care units</a:t>
-            </a:r>
-          </a:p>
-          <a:p>
-            <a:r>
-              <a:rPr lang="en-US" dirty="0"/>
-              <a:t>Merge the two data sources and decide the best possible location for the 200 new aged care units</a:t>
-            </a:r>
-          </a:p>
-          <a:p>
-            <a:r>
-              <a:rPr lang="en-US" dirty="0"/>
-              <a:t>Provide visualisation to effectively report findings</a:t>
+            <p:extLst>
+              <p:ext uri="{D42A27DB-BD31-4B8C-83A1-F6EECF244321}">
+                <p14:modId xmlns:p14="http://schemas.microsoft.com/office/powerpoint/2010/main" val="3150699209"/>
+              </p:ext>
+            </p:extLst>
+          </p:nvPr>
+        </p:nvGraphicFramePr>
+        <p:xfrm>
+          <a:off x="838200" y="1825625"/>
+          <a:ext cx="10515600" cy="3997960"/>
+        </p:xfrm>
+        <a:graphic>
+          <a:graphicData uri="http://schemas.openxmlformats.org/drawingml/2006/table">
+            <a:tbl>
+              <a:tblPr firstRow="1" bandRow="1">
+                <a:tableStyleId>{5C22544A-7EE6-4342-B048-85BDC9FD1C3A}</a:tableStyleId>
+              </a:tblPr>
+              <a:tblGrid>
+                <a:gridCol w="2628900">
+                  <a:extLst>
+                    <a:ext uri="{9D8B030D-6E8A-4147-A177-3AD203B41FA5}">
+                      <a16:colId xmlns:a16="http://schemas.microsoft.com/office/drawing/2014/main" val="4043041516"/>
+                    </a:ext>
+                  </a:extLst>
+                </a:gridCol>
+                <a:gridCol w="2628900">
+                  <a:extLst>
+                    <a:ext uri="{9D8B030D-6E8A-4147-A177-3AD203B41FA5}">
+                      <a16:colId xmlns:a16="http://schemas.microsoft.com/office/drawing/2014/main" val="1800822170"/>
+                    </a:ext>
+                  </a:extLst>
+                </a:gridCol>
+                <a:gridCol w="2628900">
+                  <a:extLst>
+                    <a:ext uri="{9D8B030D-6E8A-4147-A177-3AD203B41FA5}">
+                      <a16:colId xmlns:a16="http://schemas.microsoft.com/office/drawing/2014/main" val="2050480389"/>
+                    </a:ext>
+                  </a:extLst>
+                </a:gridCol>
+                <a:gridCol w="2628900">
+                  <a:extLst>
+                    <a:ext uri="{9D8B030D-6E8A-4147-A177-3AD203B41FA5}">
+                      <a16:colId xmlns:a16="http://schemas.microsoft.com/office/drawing/2014/main" val="2947554206"/>
+                    </a:ext>
+                  </a:extLst>
+                </a:gridCol>
+              </a:tblGrid>
+              <a:tr h="370840">
+                <a:tc>
+                  <a:txBody>
+                    <a:bodyPr/>
+                    <a:lstStyle/>
+                    <a:p>
+                      <a:pPr algn="ctr"/>
+                      <a:r>
+                        <a:rPr lang="en-US" b="0" dirty="0"/>
+                        <a:t>State</a:t>
+                      </a:r>
+                    </a:p>
+                  </a:txBody>
+                  <a:tcPr/>
+                </a:tc>
+                <a:tc>
+                  <a:txBody>
+                    <a:bodyPr/>
+                    <a:lstStyle/>
+                    <a:p>
+                      <a:pPr algn="ctr"/>
+                      <a:r>
+                        <a:rPr lang="en-US" b="0" dirty="0"/>
+                        <a:t>Current State</a:t>
+                      </a:r>
+                      <a:br>
+                        <a:rPr lang="en-US" b="0" dirty="0"/>
+                      </a:br>
+                      <a:r>
+                        <a:rPr lang="en-US" b="0" dirty="0"/>
+                        <a:t>1 in X has access to ACU</a:t>
+                      </a:r>
+                    </a:p>
+                  </a:txBody>
+                  <a:tcPr/>
+                </a:tc>
+                <a:tc>
+                  <a:txBody>
+                    <a:bodyPr/>
+                    <a:lstStyle/>
+                    <a:p>
+                      <a:pPr algn="ctr"/>
+                      <a:r>
+                        <a:rPr lang="en-US" b="0" dirty="0"/>
+                        <a:t># of Proposed ACUs to Build</a:t>
+                      </a:r>
+                    </a:p>
+                  </a:txBody>
+                  <a:tcPr/>
+                </a:tc>
+                <a:tc>
+                  <a:txBody>
+                    <a:bodyPr/>
+                    <a:lstStyle/>
+                    <a:p>
+                      <a:pPr algn="ctr"/>
+                      <a:r>
+                        <a:rPr lang="en-US" b="0" dirty="0"/>
+                        <a:t>Proposed State</a:t>
+                      </a:r>
+                      <a:br>
+                        <a:rPr lang="en-US" b="0" dirty="0"/>
+                      </a:br>
+                      <a:r>
+                        <a:rPr lang="en-US" b="0" dirty="0"/>
+                        <a:t>1 in X has access to ACU</a:t>
+                      </a:r>
+                    </a:p>
+                  </a:txBody>
+                  <a:tcPr/>
+                </a:tc>
+                <a:extLst>
+                  <a:ext uri="{0D108BD9-81ED-4DB2-BD59-A6C34878D82A}">
+                    <a16:rowId xmlns:a16="http://schemas.microsoft.com/office/drawing/2014/main" val="2037082470"/>
+                  </a:ext>
+                </a:extLst>
+              </a:tr>
+              <a:tr h="370840">
+                <a:tc>
+                  <a:txBody>
+                    <a:bodyPr/>
+                    <a:lstStyle/>
+                    <a:p>
+                      <a:pPr algn="ctr" fontAlgn="b"/>
+                      <a:r>
+                        <a:rPr lang="en-PH" sz="1800" b="0" i="0" u="none" strike="noStrike" dirty="0">
+                          <a:solidFill>
+                            <a:srgbClr val="333333"/>
+                          </a:solidFill>
+                          <a:effectLst/>
+                          <a:latin typeface="+mn-lt"/>
+                        </a:rPr>
+                        <a:t>NSW</a:t>
+                      </a:r>
+                    </a:p>
+                  </a:txBody>
+                  <a:tcPr marL="9525" marR="9525" marT="9525" marB="0" anchor="b"/>
+                </a:tc>
+                <a:tc>
+                  <a:txBody>
+                    <a:bodyPr/>
+                    <a:lstStyle/>
+                    <a:p>
+                      <a:pPr algn="ctr" fontAlgn="b"/>
+                      <a:r>
+                        <a:rPr lang="en-PH" sz="1800" b="0" i="0" u="none" strike="noStrike" dirty="0">
+                          <a:solidFill>
+                            <a:srgbClr val="000000"/>
+                          </a:solidFill>
+                          <a:effectLst/>
+                          <a:latin typeface="+mn-lt"/>
+                        </a:rPr>
+                        <a:t>36.2871471</a:t>
+                      </a:r>
+                    </a:p>
+                  </a:txBody>
+                  <a:tcPr marL="9525" marR="9525" marT="9525" marB="0" anchor="b"/>
+                </a:tc>
+                <a:tc>
+                  <a:txBody>
+                    <a:bodyPr/>
+                    <a:lstStyle/>
+                    <a:p>
+                      <a:pPr algn="ctr" fontAlgn="b"/>
+                      <a:r>
+                        <a:rPr lang="en-PH" sz="1800" b="0" i="0" u="none" strike="noStrike" dirty="0">
+                          <a:solidFill>
+                            <a:srgbClr val="000000"/>
+                          </a:solidFill>
+                          <a:effectLst/>
+                          <a:latin typeface="+mn-lt"/>
+                        </a:rPr>
+                        <a:t>31</a:t>
+                      </a:r>
+                    </a:p>
+                  </a:txBody>
+                  <a:tcPr marL="9525" marR="9525" marT="9525" marB="0" anchor="b"/>
+                </a:tc>
+                <a:tc>
+                  <a:txBody>
+                    <a:bodyPr/>
+                    <a:lstStyle/>
+                    <a:p>
+                      <a:pPr algn="ctr"/>
+                      <a:r>
+                        <a:rPr lang="en-US" sz="1800" dirty="0">
+                          <a:latin typeface="+mn-lt"/>
+                        </a:rPr>
+                        <a:t>35</a:t>
+                      </a:r>
+                    </a:p>
+                  </a:txBody>
+                  <a:tcPr/>
+                </a:tc>
+                <a:extLst>
+                  <a:ext uri="{0D108BD9-81ED-4DB2-BD59-A6C34878D82A}">
+                    <a16:rowId xmlns:a16="http://schemas.microsoft.com/office/drawing/2014/main" val="37336866"/>
+                  </a:ext>
+                </a:extLst>
+              </a:tr>
+              <a:tr h="370840">
+                <a:tc>
+                  <a:txBody>
+                    <a:bodyPr/>
+                    <a:lstStyle/>
+                    <a:p>
+                      <a:pPr algn="ctr" fontAlgn="b"/>
+                      <a:r>
+                        <a:rPr lang="en-PH" sz="1800" b="0" i="0" u="none" strike="noStrike" dirty="0">
+                          <a:solidFill>
+                            <a:srgbClr val="333333"/>
+                          </a:solidFill>
+                          <a:effectLst/>
+                          <a:latin typeface="+mn-lt"/>
+                        </a:rPr>
+                        <a:t>VIC</a:t>
+                      </a:r>
+                    </a:p>
+                  </a:txBody>
+                  <a:tcPr marL="9525" marR="9525" marT="76200" marB="76200" anchor="b"/>
+                </a:tc>
+                <a:tc>
+                  <a:txBody>
+                    <a:bodyPr/>
+                    <a:lstStyle/>
+                    <a:p>
+                      <a:pPr algn="ctr" fontAlgn="b"/>
+                      <a:r>
+                        <a:rPr lang="en-PH" sz="1800" b="0" i="0" u="none" strike="noStrike">
+                          <a:solidFill>
+                            <a:srgbClr val="000000"/>
+                          </a:solidFill>
+                          <a:effectLst/>
+                          <a:latin typeface="+mn-lt"/>
+                        </a:rPr>
+                        <a:t>35.8688757</a:t>
+                      </a:r>
+                    </a:p>
+                  </a:txBody>
+                  <a:tcPr marL="9525" marR="9525" marT="9525" marB="0" anchor="b"/>
+                </a:tc>
+                <a:tc>
+                  <a:txBody>
+                    <a:bodyPr/>
+                    <a:lstStyle/>
+                    <a:p>
+                      <a:pPr algn="ctr" fontAlgn="b"/>
+                      <a:r>
+                        <a:rPr lang="en-PH" sz="1800" b="0" i="0" u="none" strike="noStrike">
+                          <a:solidFill>
+                            <a:srgbClr val="000000"/>
+                          </a:solidFill>
+                          <a:effectLst/>
+                          <a:latin typeface="+mn-lt"/>
+                        </a:rPr>
+                        <a:t>17</a:t>
+                      </a:r>
+                    </a:p>
+                  </a:txBody>
+                  <a:tcPr marL="9525" marR="9525" marT="9525" marB="0" anchor="b"/>
+                </a:tc>
+                <a:tc>
+                  <a:txBody>
+                    <a:bodyPr/>
+                    <a:lstStyle/>
+                    <a:p>
+                      <a:pPr algn="ctr"/>
+                      <a:r>
+                        <a:rPr lang="en-US" sz="1800" dirty="0">
+                          <a:latin typeface="+mn-lt"/>
+                        </a:rPr>
+                        <a:t>35</a:t>
+                      </a:r>
+                    </a:p>
+                  </a:txBody>
+                  <a:tcPr/>
+                </a:tc>
+                <a:extLst>
+                  <a:ext uri="{0D108BD9-81ED-4DB2-BD59-A6C34878D82A}">
+                    <a16:rowId xmlns:a16="http://schemas.microsoft.com/office/drawing/2014/main" val="245607669"/>
+                  </a:ext>
+                </a:extLst>
+              </a:tr>
+              <a:tr h="370840">
+                <a:tc>
+                  <a:txBody>
+                    <a:bodyPr/>
+                    <a:lstStyle/>
+                    <a:p>
+                      <a:pPr algn="ctr" fontAlgn="b"/>
+                      <a:r>
+                        <a:rPr lang="en-PH" sz="1800" b="0" i="0" u="none" strike="noStrike" dirty="0">
+                          <a:solidFill>
+                            <a:srgbClr val="333333"/>
+                          </a:solidFill>
+                          <a:effectLst/>
+                          <a:latin typeface="+mn-lt"/>
+                        </a:rPr>
+                        <a:t>QLD</a:t>
+                      </a:r>
+                    </a:p>
+                  </a:txBody>
+                  <a:tcPr marL="9525" marR="9525" marT="76200" marB="76200" anchor="b"/>
+                </a:tc>
+                <a:tc>
+                  <a:txBody>
+                    <a:bodyPr/>
+                    <a:lstStyle/>
+                    <a:p>
+                      <a:pPr algn="ctr" fontAlgn="b"/>
+                      <a:r>
+                        <a:rPr lang="en-PH" sz="1800" b="0" i="0" u="none" strike="noStrike" dirty="0">
+                          <a:solidFill>
+                            <a:srgbClr val="000000"/>
+                          </a:solidFill>
+                          <a:effectLst/>
+                          <a:latin typeface="+mn-lt"/>
+                        </a:rPr>
+                        <a:t>39.1061362</a:t>
+                      </a:r>
+                    </a:p>
+                  </a:txBody>
+                  <a:tcPr marL="9525" marR="9525" marT="9525" marB="0" anchor="b"/>
+                </a:tc>
+                <a:tc>
+                  <a:txBody>
+                    <a:bodyPr/>
+                    <a:lstStyle/>
+                    <a:p>
+                      <a:pPr algn="ctr" fontAlgn="b"/>
+                      <a:r>
+                        <a:rPr lang="en-PH" sz="1800" b="0" i="0" u="none" strike="noStrike">
+                          <a:solidFill>
+                            <a:srgbClr val="000000"/>
+                          </a:solidFill>
+                          <a:effectLst/>
+                          <a:latin typeface="+mn-lt"/>
+                        </a:rPr>
+                        <a:t>56</a:t>
+                      </a:r>
+                    </a:p>
+                  </a:txBody>
+                  <a:tcPr marL="9525" marR="9525" marT="9525" marB="0" anchor="b"/>
+                </a:tc>
+                <a:tc>
+                  <a:txBody>
+                    <a:bodyPr/>
+                    <a:lstStyle/>
+                    <a:p>
+                      <a:pPr algn="ctr"/>
+                      <a:r>
+                        <a:rPr lang="en-US" sz="1800" dirty="0">
+                          <a:latin typeface="+mn-lt"/>
+                        </a:rPr>
+                        <a:t>35</a:t>
+                      </a:r>
+                    </a:p>
+                  </a:txBody>
+                  <a:tcPr/>
+                </a:tc>
+                <a:extLst>
+                  <a:ext uri="{0D108BD9-81ED-4DB2-BD59-A6C34878D82A}">
+                    <a16:rowId xmlns:a16="http://schemas.microsoft.com/office/drawing/2014/main" val="1536501932"/>
+                  </a:ext>
+                </a:extLst>
+              </a:tr>
+              <a:tr h="370840">
+                <a:tc>
+                  <a:txBody>
+                    <a:bodyPr/>
+                    <a:lstStyle/>
+                    <a:p>
+                      <a:pPr algn="ctr" fontAlgn="b"/>
+                      <a:r>
+                        <a:rPr lang="en-PH" sz="1800" b="0" i="0" u="none" strike="noStrike" dirty="0">
+                          <a:solidFill>
+                            <a:srgbClr val="333333"/>
+                          </a:solidFill>
+                          <a:effectLst/>
+                          <a:latin typeface="+mn-lt"/>
+                        </a:rPr>
+                        <a:t>WA</a:t>
+                      </a:r>
+                    </a:p>
+                  </a:txBody>
+                  <a:tcPr marL="9525" marR="9525" marT="76200" marB="76200" anchor="b"/>
+                </a:tc>
+                <a:tc>
+                  <a:txBody>
+                    <a:bodyPr/>
+                    <a:lstStyle/>
+                    <a:p>
+                      <a:pPr algn="ctr" fontAlgn="b"/>
+                      <a:r>
+                        <a:rPr lang="en-PH" sz="1800" b="0" i="0" u="none" strike="noStrike">
+                          <a:solidFill>
+                            <a:srgbClr val="000000"/>
+                          </a:solidFill>
+                          <a:effectLst/>
+                          <a:latin typeface="+mn-lt"/>
+                        </a:rPr>
+                        <a:t>43.7478644</a:t>
+                      </a:r>
+                    </a:p>
+                  </a:txBody>
+                  <a:tcPr marL="9525" marR="9525" marT="9525" marB="0" anchor="b"/>
+                </a:tc>
+                <a:tc>
+                  <a:txBody>
+                    <a:bodyPr/>
+                    <a:lstStyle/>
+                    <a:p>
+                      <a:pPr algn="ctr" fontAlgn="b"/>
+                      <a:r>
+                        <a:rPr lang="en-PH" sz="1800" b="0" i="0" u="none" strike="noStrike">
+                          <a:solidFill>
+                            <a:srgbClr val="000000"/>
+                          </a:solidFill>
+                          <a:effectLst/>
+                          <a:latin typeface="+mn-lt"/>
+                        </a:rPr>
+                        <a:t>53</a:t>
+                      </a:r>
+                    </a:p>
+                  </a:txBody>
+                  <a:tcPr marL="9525" marR="9525" marT="9525" marB="0" anchor="b"/>
+                </a:tc>
+                <a:tc>
+                  <a:txBody>
+                    <a:bodyPr/>
+                    <a:lstStyle/>
+                    <a:p>
+                      <a:pPr algn="ctr"/>
+                      <a:r>
+                        <a:rPr lang="en-US" sz="1800" dirty="0">
+                          <a:latin typeface="+mn-lt"/>
+                        </a:rPr>
+                        <a:t>35</a:t>
+                      </a:r>
+                    </a:p>
+                  </a:txBody>
+                  <a:tcPr/>
+                </a:tc>
+                <a:extLst>
+                  <a:ext uri="{0D108BD9-81ED-4DB2-BD59-A6C34878D82A}">
+                    <a16:rowId xmlns:a16="http://schemas.microsoft.com/office/drawing/2014/main" val="392834156"/>
+                  </a:ext>
+                </a:extLst>
+              </a:tr>
+              <a:tr h="370840">
+                <a:tc>
+                  <a:txBody>
+                    <a:bodyPr/>
+                    <a:lstStyle/>
+                    <a:p>
+                      <a:pPr algn="ctr" fontAlgn="b"/>
+                      <a:r>
+                        <a:rPr lang="en-PH" sz="1800" b="0" i="0" u="none" strike="noStrike">
+                          <a:solidFill>
+                            <a:srgbClr val="333333"/>
+                          </a:solidFill>
+                          <a:effectLst/>
+                          <a:latin typeface="+mn-lt"/>
+                        </a:rPr>
+                        <a:t>SA</a:t>
+                      </a:r>
+                    </a:p>
+                  </a:txBody>
+                  <a:tcPr marL="9525" marR="9525" marT="76200" marB="76200" anchor="b"/>
+                </a:tc>
+                <a:tc>
+                  <a:txBody>
+                    <a:bodyPr/>
+                    <a:lstStyle/>
+                    <a:p>
+                      <a:pPr algn="ctr" fontAlgn="b"/>
+                      <a:r>
+                        <a:rPr lang="en-PH" sz="1800" b="0" i="0" u="none" strike="noStrike">
+                          <a:solidFill>
+                            <a:srgbClr val="000000"/>
+                          </a:solidFill>
+                          <a:effectLst/>
+                          <a:latin typeface="+mn-lt"/>
+                        </a:rPr>
+                        <a:t>33.1504185</a:t>
+                      </a:r>
+                    </a:p>
+                  </a:txBody>
+                  <a:tcPr marL="9525" marR="9525" marT="9525" marB="0" anchor="b"/>
+                </a:tc>
+                <a:tc>
+                  <a:txBody>
+                    <a:bodyPr/>
+                    <a:lstStyle/>
+                    <a:p>
+                      <a:pPr algn="ctr" fontAlgn="b"/>
+                      <a:r>
+                        <a:rPr lang="en-PH" sz="1800" b="0" i="0" u="none" strike="noStrike" dirty="0">
+                          <a:solidFill>
+                            <a:srgbClr val="000000"/>
+                          </a:solidFill>
+                          <a:effectLst/>
+                          <a:latin typeface="+mn-lt"/>
+                        </a:rPr>
+                        <a:t>0</a:t>
+                      </a:r>
+                    </a:p>
+                  </a:txBody>
+                  <a:tcPr marL="9525" marR="9525" marT="9525" marB="0" anchor="b"/>
+                </a:tc>
+                <a:tc>
+                  <a:txBody>
+                    <a:bodyPr/>
+                    <a:lstStyle/>
+                    <a:p>
+                      <a:pPr algn="ctr"/>
+                      <a:r>
+                        <a:rPr kumimoji="0" lang="en-US" sz="1800" b="0" i="0" u="none" strike="noStrike" kern="1200" cap="none" spc="0" normalizeH="0" baseline="0" noProof="0">
+                          <a:ln>
+                            <a:noFill/>
+                          </a:ln>
+                          <a:solidFill>
+                            <a:prstClr val="black"/>
+                          </a:solidFill>
+                          <a:effectLst/>
+                          <a:uLnTx/>
+                          <a:uFillTx/>
+                          <a:latin typeface="+mn-lt"/>
+                          <a:ea typeface="+mn-ea"/>
+                          <a:cs typeface="+mn-cs"/>
+                        </a:rPr>
+                        <a:t>35</a:t>
+                      </a:r>
+                      <a:endParaRPr lang="en-US" sz="1800" dirty="0">
+                        <a:latin typeface="+mn-lt"/>
+                      </a:endParaRPr>
+                    </a:p>
+                  </a:txBody>
+                  <a:tcPr/>
+                </a:tc>
+                <a:extLst>
+                  <a:ext uri="{0D108BD9-81ED-4DB2-BD59-A6C34878D82A}">
+                    <a16:rowId xmlns:a16="http://schemas.microsoft.com/office/drawing/2014/main" val="865714963"/>
+                  </a:ext>
+                </a:extLst>
+              </a:tr>
+              <a:tr h="370840">
+                <a:tc>
+                  <a:txBody>
+                    <a:bodyPr/>
+                    <a:lstStyle/>
+                    <a:p>
+                      <a:pPr algn="ctr" fontAlgn="b"/>
+                      <a:r>
+                        <a:rPr lang="en-PH" sz="1800" b="0" i="0" u="none" strike="noStrike" dirty="0">
+                          <a:solidFill>
+                            <a:srgbClr val="333333"/>
+                          </a:solidFill>
+                          <a:effectLst/>
+                          <a:latin typeface="+mn-lt"/>
+                        </a:rPr>
+                        <a:t>TAS</a:t>
+                      </a:r>
+                    </a:p>
+                  </a:txBody>
+                  <a:tcPr marL="9525" marR="9525" marT="76200" marB="76200" anchor="b"/>
+                </a:tc>
+                <a:tc>
+                  <a:txBody>
+                    <a:bodyPr/>
+                    <a:lstStyle/>
+                    <a:p>
+                      <a:pPr algn="ctr" fontAlgn="b"/>
+                      <a:r>
+                        <a:rPr lang="en-PH" sz="1800" b="0" i="0" u="none" strike="noStrike">
+                          <a:solidFill>
+                            <a:srgbClr val="000000"/>
+                          </a:solidFill>
+                          <a:effectLst/>
+                          <a:latin typeface="+mn-lt"/>
+                        </a:rPr>
+                        <a:t>39.2670497</a:t>
+                      </a:r>
+                    </a:p>
+                  </a:txBody>
+                  <a:tcPr marL="9525" marR="9525" marT="9525" marB="0" anchor="b"/>
+                </a:tc>
+                <a:tc>
+                  <a:txBody>
+                    <a:bodyPr/>
+                    <a:lstStyle/>
+                    <a:p>
+                      <a:pPr algn="ctr" fontAlgn="b"/>
+                      <a:r>
+                        <a:rPr lang="en-PH" sz="1800" b="0" i="0" u="none" strike="noStrike">
+                          <a:solidFill>
+                            <a:srgbClr val="000000"/>
+                          </a:solidFill>
+                          <a:effectLst/>
+                          <a:latin typeface="+mn-lt"/>
+                        </a:rPr>
+                        <a:t>8</a:t>
+                      </a:r>
+                    </a:p>
+                  </a:txBody>
+                  <a:tcPr marL="9525" marR="9525" marT="9525" marB="0" anchor="b"/>
+                </a:tc>
+                <a:tc>
+                  <a:txBody>
+                    <a:bodyPr/>
+                    <a:lstStyle/>
+                    <a:p>
+                      <a:pPr algn="ctr"/>
+                      <a:r>
+                        <a:rPr kumimoji="0" lang="en-US" sz="1800" b="0" i="0" u="none" strike="noStrike" kern="1200" cap="none" spc="0" normalizeH="0" baseline="0" noProof="0">
+                          <a:ln>
+                            <a:noFill/>
+                          </a:ln>
+                          <a:solidFill>
+                            <a:prstClr val="black"/>
+                          </a:solidFill>
+                          <a:effectLst/>
+                          <a:uLnTx/>
+                          <a:uFillTx/>
+                          <a:latin typeface="+mn-lt"/>
+                          <a:ea typeface="+mn-ea"/>
+                          <a:cs typeface="+mn-cs"/>
+                        </a:rPr>
+                        <a:t>35</a:t>
+                      </a:r>
+                      <a:endParaRPr lang="en-US" sz="1800" dirty="0">
+                        <a:latin typeface="+mn-lt"/>
+                      </a:endParaRPr>
+                    </a:p>
+                  </a:txBody>
+                  <a:tcPr/>
+                </a:tc>
+                <a:extLst>
+                  <a:ext uri="{0D108BD9-81ED-4DB2-BD59-A6C34878D82A}">
+                    <a16:rowId xmlns:a16="http://schemas.microsoft.com/office/drawing/2014/main" val="3768192521"/>
+                  </a:ext>
+                </a:extLst>
+              </a:tr>
+              <a:tr h="370840">
+                <a:tc>
+                  <a:txBody>
+                    <a:bodyPr/>
+                    <a:lstStyle/>
+                    <a:p>
+                      <a:pPr algn="ctr" fontAlgn="b"/>
+                      <a:r>
+                        <a:rPr lang="en-PH" sz="1800" b="0" i="0" u="none" strike="noStrike">
+                          <a:solidFill>
+                            <a:srgbClr val="333333"/>
+                          </a:solidFill>
+                          <a:effectLst/>
+                          <a:latin typeface="+mn-lt"/>
+                        </a:rPr>
+                        <a:t>ACT</a:t>
+                      </a:r>
+                    </a:p>
+                  </a:txBody>
+                  <a:tcPr marL="9525" marR="9525" marT="76200" marB="76200" anchor="b"/>
+                </a:tc>
+                <a:tc>
+                  <a:txBody>
+                    <a:bodyPr/>
+                    <a:lstStyle/>
+                    <a:p>
+                      <a:pPr algn="ctr" fontAlgn="b"/>
+                      <a:r>
+                        <a:rPr lang="en-PH" sz="1800" b="0" i="0" u="none" strike="noStrike">
+                          <a:solidFill>
+                            <a:srgbClr val="000000"/>
+                          </a:solidFill>
+                          <a:effectLst/>
+                          <a:latin typeface="+mn-lt"/>
+                        </a:rPr>
+                        <a:t>45.3837777</a:t>
+                      </a:r>
+                    </a:p>
+                  </a:txBody>
+                  <a:tcPr marL="9525" marR="9525" marT="9525" marB="0" anchor="b"/>
+                </a:tc>
+                <a:tc>
+                  <a:txBody>
+                    <a:bodyPr/>
+                    <a:lstStyle/>
+                    <a:p>
+                      <a:pPr algn="ctr" fontAlgn="b"/>
+                      <a:r>
+                        <a:rPr lang="en-PH" sz="1800" b="0" i="0" u="none" strike="noStrike" dirty="0">
+                          <a:solidFill>
+                            <a:srgbClr val="000000"/>
+                          </a:solidFill>
+                          <a:effectLst/>
+                          <a:latin typeface="+mn-lt"/>
+                        </a:rPr>
+                        <a:t>9</a:t>
+                      </a:r>
+                    </a:p>
+                  </a:txBody>
+                  <a:tcPr marL="9525" marR="9525" marT="9525" marB="0" anchor="b"/>
+                </a:tc>
+                <a:tc>
+                  <a:txBody>
+                    <a:bodyPr/>
+                    <a:lstStyle/>
+                    <a:p>
+                      <a:pPr algn="ctr"/>
+                      <a:r>
+                        <a:rPr kumimoji="0" lang="en-US" sz="1800" b="0" i="0" u="none" strike="noStrike" kern="1200" cap="none" spc="0" normalizeH="0" baseline="0" noProof="0">
+                          <a:ln>
+                            <a:noFill/>
+                          </a:ln>
+                          <a:solidFill>
+                            <a:prstClr val="black"/>
+                          </a:solidFill>
+                          <a:effectLst/>
+                          <a:uLnTx/>
+                          <a:uFillTx/>
+                          <a:latin typeface="+mn-lt"/>
+                          <a:ea typeface="+mn-ea"/>
+                          <a:cs typeface="+mn-cs"/>
+                        </a:rPr>
+                        <a:t>35</a:t>
+                      </a:r>
+                      <a:endParaRPr lang="en-US" sz="1800" dirty="0">
+                        <a:latin typeface="+mn-lt"/>
+                      </a:endParaRPr>
+                    </a:p>
+                  </a:txBody>
+                  <a:tcPr/>
+                </a:tc>
+                <a:extLst>
+                  <a:ext uri="{0D108BD9-81ED-4DB2-BD59-A6C34878D82A}">
+                    <a16:rowId xmlns:a16="http://schemas.microsoft.com/office/drawing/2014/main" val="1077673804"/>
+                  </a:ext>
+                </a:extLst>
+              </a:tr>
+              <a:tr h="370840">
+                <a:tc>
+                  <a:txBody>
+                    <a:bodyPr/>
+                    <a:lstStyle/>
+                    <a:p>
+                      <a:pPr algn="ctr" fontAlgn="b"/>
+                      <a:r>
+                        <a:rPr lang="en-PH" sz="1800" b="0" i="0" u="none" strike="noStrike" dirty="0">
+                          <a:solidFill>
+                            <a:srgbClr val="333333"/>
+                          </a:solidFill>
+                          <a:effectLst/>
+                          <a:latin typeface="+mn-lt"/>
+                        </a:rPr>
+                        <a:t>NT</a:t>
+                      </a:r>
+                    </a:p>
+                  </a:txBody>
+                  <a:tcPr marL="9525" marR="9525" marT="76200" marB="76200" anchor="b"/>
+                </a:tc>
+                <a:tc>
+                  <a:txBody>
+                    <a:bodyPr/>
+                    <a:lstStyle/>
+                    <a:p>
+                      <a:pPr algn="ctr" fontAlgn="b"/>
+                      <a:r>
+                        <a:rPr lang="en-PH" sz="1800" b="0" i="0" u="none" strike="noStrike" dirty="0">
+                          <a:solidFill>
+                            <a:srgbClr val="000000"/>
+                          </a:solidFill>
+                          <a:effectLst/>
+                          <a:latin typeface="+mn-lt"/>
+                        </a:rPr>
+                        <a:t>55.431903</a:t>
+                      </a:r>
+                    </a:p>
+                  </a:txBody>
+                  <a:tcPr marL="9525" marR="9525" marT="9525" marB="0" anchor="b"/>
+                </a:tc>
+                <a:tc>
+                  <a:txBody>
+                    <a:bodyPr/>
+                    <a:lstStyle/>
+                    <a:p>
+                      <a:pPr algn="ctr" fontAlgn="b"/>
+                      <a:r>
+                        <a:rPr lang="en-PH" sz="1800" b="0" i="0" u="none" strike="noStrike" dirty="0">
+                          <a:solidFill>
+                            <a:srgbClr val="000000"/>
+                          </a:solidFill>
+                          <a:effectLst/>
+                          <a:latin typeface="+mn-lt"/>
+                        </a:rPr>
+                        <a:t>7</a:t>
+                      </a:r>
+                    </a:p>
+                  </a:txBody>
+                  <a:tcPr marL="9525" marR="9525" marT="9525" marB="0" anchor="b"/>
+                </a:tc>
+                <a:tc>
+                  <a:txBody>
+                    <a:bodyPr/>
+                    <a:lstStyle/>
+                    <a:p>
+                      <a:pPr algn="ctr"/>
+                      <a:r>
+                        <a:rPr kumimoji="0" lang="en-US" sz="1800" b="0" i="0" u="none" strike="noStrike" kern="1200" cap="none" spc="0" normalizeH="0" baseline="0" noProof="0" dirty="0">
+                          <a:ln>
+                            <a:noFill/>
+                          </a:ln>
+                          <a:solidFill>
+                            <a:prstClr val="black"/>
+                          </a:solidFill>
+                          <a:effectLst/>
+                          <a:uLnTx/>
+                          <a:uFillTx/>
+                          <a:latin typeface="+mn-lt"/>
+                          <a:ea typeface="+mn-ea"/>
+                          <a:cs typeface="+mn-cs"/>
+                        </a:rPr>
+                        <a:t>35</a:t>
+                      </a:r>
+                      <a:endParaRPr lang="en-US" sz="1800" dirty="0">
+                        <a:latin typeface="+mn-lt"/>
+                      </a:endParaRPr>
+                    </a:p>
+                  </a:txBody>
+                  <a:tcPr/>
+                </a:tc>
+                <a:extLst>
+                  <a:ext uri="{0D108BD9-81ED-4DB2-BD59-A6C34878D82A}">
+                    <a16:rowId xmlns:a16="http://schemas.microsoft.com/office/drawing/2014/main" val="2472925578"/>
+                  </a:ext>
+                </a:extLst>
+              </a:tr>
+            </a:tbl>
+          </a:graphicData>
+        </a:graphic>
+      </p:graphicFrame>
+      <p:sp>
+        <p:nvSpPr>
+          <p:cNvPr id="6" name="Rectangle 5">
+            <a:extLst>
+              <a:ext uri="{FF2B5EF4-FFF2-40B4-BE49-F238E27FC236}">
+                <a16:creationId xmlns:a16="http://schemas.microsoft.com/office/drawing/2014/main" id="{84CBB06C-78AB-4C47-A1C6-53599E4C8BF4}"/>
+              </a:ext>
+            </a:extLst>
+          </p:cNvPr>
+          <p:cNvSpPr/>
+          <p:nvPr/>
+        </p:nvSpPr>
+        <p:spPr>
+          <a:xfrm>
+            <a:off x="4848726" y="5958522"/>
+            <a:ext cx="7251032" cy="646331"/>
+          </a:xfrm>
+          <a:prstGeom prst="rect">
+            <a:avLst/>
+          </a:prstGeom>
+        </p:spPr>
+        <p:txBody>
+          <a:bodyPr wrap="square">
+            <a:spAutoFit/>
+          </a:bodyPr>
+          <a:lstStyle/>
+          <a:p>
+            <a:r>
+              <a:rPr lang="en-US" sz="1200" dirty="0"/>
+              <a:t>Assumption: Each Age Care Unit has a capacity of 90</a:t>
+            </a:r>
+          </a:p>
+          <a:p>
+            <a:r>
+              <a:rPr lang="en-US" sz="1200" dirty="0"/>
+              <a:t>Goal: 1 in 35 Australian residents, ages 50 and above should have access to an ACU in their state</a:t>
+            </a:r>
+          </a:p>
+          <a:p>
+            <a:r>
+              <a:rPr lang="en-US" sz="1200" dirty="0"/>
+              <a:t>Current Total: 181 (for leeway and Other Territories)</a:t>
             </a:r>
           </a:p>
         </p:txBody>
@@ -4031,7 +6253,7 @@
     </p:spTree>
     <p:extLst>
       <p:ext uri="{BB962C8B-B14F-4D97-AF65-F5344CB8AC3E}">
-        <p14:creationId xmlns:p14="http://schemas.microsoft.com/office/powerpoint/2010/main" val="3453906704"/>
+        <p14:creationId xmlns:p14="http://schemas.microsoft.com/office/powerpoint/2010/main" val="3229751675"/>
       </p:ext>
     </p:extLst>
   </p:cSld>
@@ -4063,7 +6285,7 @@
           <p:cNvPr id="2" name="Title 1">
             <a:extLst>
               <a:ext uri="{FF2B5EF4-FFF2-40B4-BE49-F238E27FC236}">
-                <a16:creationId xmlns:a16="http://schemas.microsoft.com/office/drawing/2014/main" id="{BFC4FF89-F7D9-0D49-8660-0CA7CF98541A}"/>
+                <a16:creationId xmlns:a16="http://schemas.microsoft.com/office/drawing/2014/main" id="{155C2051-EFAB-2F47-9839-B8496127350B}"/>
               </a:ext>
             </a:extLst>
           </p:cNvPr>
@@ -4080,12 +6302,8 @@
           <a:lstStyle/>
           <a:p>
             <a:r>
-              <a:rPr lang="en-US" i="1" dirty="0"/>
-              <a:t>Technical</a:t>
-            </a:r>
-            <a:r>
               <a:rPr lang="en-US" dirty="0"/>
-              <a:t> Methodology</a:t>
+              <a:t>Hypothesis</a:t>
             </a:r>
           </a:p>
         </p:txBody>
@@ -4095,7 +6313,7 @@
           <p:cNvPr id="3" name="Content Placeholder 2">
             <a:extLst>
               <a:ext uri="{FF2B5EF4-FFF2-40B4-BE49-F238E27FC236}">
-                <a16:creationId xmlns:a16="http://schemas.microsoft.com/office/drawing/2014/main" id="{5AA2C1D9-9F25-EF4C-AAE7-FD3FE9B7526C}"/>
+                <a16:creationId xmlns:a16="http://schemas.microsoft.com/office/drawing/2014/main" id="{9D02C2DD-A0C7-E84A-A3A9-2E70D4E3753A}"/>
               </a:ext>
             </a:extLst>
           </p:cNvPr>
@@ -4113,142 +6331,47 @@
           <a:p>
             <a:r>
               <a:rPr lang="en-US" dirty="0"/>
-              <a:t>Visualise the problem using </a:t>
-            </a:r>
-            <a:r>
-              <a:rPr lang="en-US" dirty="0" err="1"/>
-              <a:t>RShiny</a:t>
-            </a:r>
+              <a:t>The ratio of old-age population distribution, and available Age Care Units (ACU) across </a:t>
+            </a:r>
+            <a:r>
+              <a:rPr lang="en-US" b="1" dirty="0"/>
+              <a:t>states</a:t>
+            </a:r>
+            <a:r>
+              <a:rPr lang="en-US" dirty="0"/>
+              <a:t> (or better yet, suburbs) should be as close as possible.</a:t>
+            </a:r>
+          </a:p>
+          <a:p>
+            <a:pPr lvl="1"/>
+            <a:r>
+              <a:rPr lang="en-US" dirty="0"/>
+              <a:t>If NSW contains 15% of the old-age population, then about 15% of the ACUs should be in NSW.</a:t>
+            </a:r>
+          </a:p>
+          <a:p>
+            <a:pPr lvl="1"/>
             <a:endParaRPr lang="en-US" dirty="0"/>
           </a:p>
           <a:p>
+            <a:r>
+              <a:rPr lang="en-US" dirty="0"/>
+              <a:t>The ratio of old-age population and the availability of ACUs should be same across all states</a:t>
+            </a:r>
+          </a:p>
+          <a:p>
             <a:pPr lvl="1"/>
             <a:r>
               <a:rPr lang="en-US" dirty="0"/>
-              <a:t>Mark the physical location of aged care units in the Australian map. Use leaflet library, and Local Government Area (LGA) shape data</a:t>
-            </a:r>
-          </a:p>
-          <a:p>
-            <a:pPr lvl="1"/>
-            <a:r>
-              <a:rPr lang="en-US" dirty="0"/>
-              <a:t>Color the LGAs depending on the old-age population density.</a:t>
-            </a:r>
-          </a:p>
-          <a:p>
-            <a:pPr lvl="1"/>
-            <a:r>
-              <a:rPr lang="en-US" dirty="0">
-                <a:solidFill>
-                  <a:srgbClr val="FF0000"/>
-                </a:solidFill>
-              </a:rPr>
-              <a:t>R, </a:t>
-            </a:r>
-            <a:r>
-              <a:rPr lang="en-US" dirty="0" err="1">
-                <a:solidFill>
-                  <a:srgbClr val="FF0000"/>
-                </a:solidFill>
-              </a:rPr>
-              <a:t>RShiny</a:t>
-            </a:r>
-            <a:r>
-              <a:rPr lang="en-US" dirty="0">
-                <a:solidFill>
-                  <a:srgbClr val="FF0000"/>
-                </a:solidFill>
-              </a:rPr>
-              <a:t>, Leaflet, </a:t>
-            </a:r>
-            <a:r>
-              <a:rPr lang="en-US" dirty="0" err="1">
-                <a:solidFill>
-                  <a:srgbClr val="FF0000"/>
-                </a:solidFill>
-              </a:rPr>
-              <a:t>GeoJSON</a:t>
-            </a:r>
-            <a:r>
-              <a:rPr lang="en-US" dirty="0">
-                <a:solidFill>
-                  <a:srgbClr val="FF0000"/>
-                </a:solidFill>
-              </a:rPr>
-              <a:t>, Mac terminal for processing shapefile data</a:t>
-            </a:r>
-          </a:p>
-          <a:p>
-            <a:r>
-              <a:rPr lang="en-US" dirty="0"/>
-              <a:t>Merge population data with aged care units data</a:t>
-            </a:r>
-          </a:p>
-          <a:p>
-            <a:pPr lvl="1"/>
-            <a:r>
-              <a:rPr lang="en-US" dirty="0"/>
-              <a:t>The tricky part is getting data with matching location granularity (smallest possible)</a:t>
-            </a:r>
-          </a:p>
-          <a:p>
-            <a:pPr lvl="1"/>
-            <a:r>
-              <a:rPr lang="en-US" dirty="0">
-                <a:solidFill>
-                  <a:srgbClr val="FF0000"/>
-                </a:solidFill>
-              </a:rPr>
-              <a:t>R, </a:t>
-            </a:r>
-            <a:r>
-              <a:rPr lang="en-US" dirty="0" err="1">
-                <a:solidFill>
-                  <a:srgbClr val="FF0000"/>
-                </a:solidFill>
-              </a:rPr>
-              <a:t>dplyr</a:t>
-            </a:r>
-            <a:r>
-              <a:rPr lang="en-US" dirty="0">
-                <a:solidFill>
-                  <a:srgbClr val="FF0000"/>
-                </a:solidFill>
-              </a:rPr>
-              <a:t>, </a:t>
-            </a:r>
-            <a:r>
-              <a:rPr lang="en-US" dirty="0" err="1">
-                <a:solidFill>
-                  <a:srgbClr val="FF0000"/>
-                </a:solidFill>
-              </a:rPr>
-              <a:t>tidyr</a:t>
-            </a:r>
-            <a:endParaRPr lang="en-US" dirty="0">
-              <a:solidFill>
-                <a:srgbClr val="FF0000"/>
-              </a:solidFill>
-            </a:endParaRPr>
-          </a:p>
-          <a:p>
-            <a:endParaRPr lang="en-US" dirty="0"/>
-          </a:p>
-          <a:p>
-            <a:endParaRPr lang="en-US" dirty="0"/>
-          </a:p>
-          <a:p>
-            <a:endParaRPr lang="en-US" dirty="0"/>
-          </a:p>
-          <a:p>
-            <a:endParaRPr lang="en-US" dirty="0"/>
+              <a:t>If 1 in 35 NSW residents has access to ACU, then this ratio should also hold true for all other Australian states.</a:t>
+            </a:r>
           </a:p>
         </p:txBody>
       </p:sp>
     </p:spTree>
     <p:extLst>
       <p:ext uri="{BB962C8B-B14F-4D97-AF65-F5344CB8AC3E}">
-        <p14:creationId xmlns:p14="http://schemas.microsoft.com/office/powerpoint/2010/main" val="2637013669"/>
+        <p14:creationId xmlns:p14="http://schemas.microsoft.com/office/powerpoint/2010/main" val="4268784176"/>
       </p:ext>
     </p:extLst>
   </p:cSld>
@@ -4280,7 +6403,7 @@
           <p:cNvPr id="2" name="Title 1">
             <a:extLst>
               <a:ext uri="{FF2B5EF4-FFF2-40B4-BE49-F238E27FC236}">
-                <a16:creationId xmlns:a16="http://schemas.microsoft.com/office/drawing/2014/main" id="{AEFF4DEA-1CBE-0545-A6D6-FC33739BFA7C}"/>
+                <a16:creationId xmlns:a16="http://schemas.microsoft.com/office/drawing/2014/main" id="{B69CC8F2-6600-9143-988A-F30CA8B38301}"/>
               </a:ext>
             </a:extLst>
           </p:cNvPr>
@@ -4296,43 +6419,63 @@
           <a:bodyPr/>
           <a:lstStyle/>
           <a:p>
-            <a:endParaRPr lang="en-US" dirty="0"/>
-          </a:p>
-        </p:txBody>
-      </p:sp>
-      <p:pic>
-        <p:nvPicPr>
-          <p:cNvPr id="5" name="Content Placeholder 4">
-            <a:extLst>
-              <a:ext uri="{FF2B5EF4-FFF2-40B4-BE49-F238E27FC236}">
-                <a16:creationId xmlns:a16="http://schemas.microsoft.com/office/drawing/2014/main" id="{7ECFBC75-B7CA-184B-BF9A-EB7D170E182A}"/>
-              </a:ext>
-            </a:extLst>
-          </p:cNvPr>
-          <p:cNvPicPr>
-            <a:picLocks noGrp="1" noChangeAspect="1"/>
-          </p:cNvPicPr>
+            <a:r>
+              <a:rPr lang="en-US" dirty="0"/>
+              <a:t>Methodology</a:t>
+            </a:r>
+          </a:p>
+        </p:txBody>
+      </p:sp>
+      <p:sp>
+        <p:nvSpPr>
+          <p:cNvPr id="3" name="Content Placeholder 2">
+            <a:extLst>
+              <a:ext uri="{FF2B5EF4-FFF2-40B4-BE49-F238E27FC236}">
+                <a16:creationId xmlns:a16="http://schemas.microsoft.com/office/drawing/2014/main" id="{F1B6E64A-69AB-984E-9DB5-1370E96612E2}"/>
+              </a:ext>
+            </a:extLst>
+          </p:cNvPr>
+          <p:cNvSpPr>
+            <a:spLocks noGrp="1"/>
+          </p:cNvSpPr>
           <p:nvPr>
             <p:ph idx="1"/>
           </p:nvPr>
-        </p:nvPicPr>
-        <p:blipFill>
-          <a:blip r:embed="rId2"/>
-          <a:stretch>
-            <a:fillRect/>
-          </a:stretch>
-        </p:blipFill>
-        <p:spPr>
-          <a:xfrm>
-            <a:off x="848155" y="1825625"/>
-            <a:ext cx="10495689" cy="4351338"/>
-          </a:xfrm>
-        </p:spPr>
-      </p:pic>
+        </p:nvSpPr>
+        <p:spPr/>
+        <p:txBody>
+          <a:bodyPr/>
+          <a:lstStyle/>
+          <a:p>
+            <a:r>
+              <a:rPr lang="en-US" dirty="0"/>
+              <a:t>Gather data on population arranged by age and location</a:t>
+            </a:r>
+          </a:p>
+          <a:p>
+            <a:r>
+              <a:rPr lang="en-US" dirty="0"/>
+              <a:t>Gather data regarding the location, and capacity of existing aged care units</a:t>
+            </a:r>
+          </a:p>
+          <a:p>
+            <a:r>
+              <a:rPr lang="en-US" dirty="0"/>
+              <a:t>Merge the two data sources and decide the best possible location for the 200 new aged care units</a:t>
+            </a:r>
+          </a:p>
+          <a:p>
+            <a:r>
+              <a:rPr lang="en-US" dirty="0"/>
+              <a:t>Provide visualisation to effectively report findings</a:t>
+            </a:r>
+          </a:p>
+        </p:txBody>
+      </p:sp>
     </p:spTree>
     <p:extLst>
       <p:ext uri="{BB962C8B-B14F-4D97-AF65-F5344CB8AC3E}">
-        <p14:creationId xmlns:p14="http://schemas.microsoft.com/office/powerpoint/2010/main" val="179634760"/>
+        <p14:creationId xmlns:p14="http://schemas.microsoft.com/office/powerpoint/2010/main" val="3453906704"/>
       </p:ext>
     </p:extLst>
   </p:cSld>
@@ -4364,7 +6507,7 @@
           <p:cNvPr id="2" name="Title 1">
             <a:extLst>
               <a:ext uri="{FF2B5EF4-FFF2-40B4-BE49-F238E27FC236}">
-                <a16:creationId xmlns:a16="http://schemas.microsoft.com/office/drawing/2014/main" id="{F5063B59-EFFC-8642-9D01-47A40B2BFD9A}"/>
+                <a16:creationId xmlns:a16="http://schemas.microsoft.com/office/drawing/2014/main" id="{3459BB52-92BA-1743-8C0A-C51EF474F67A}"/>
               </a:ext>
             </a:extLst>
           </p:cNvPr>
@@ -4382,147 +6525,542 @@
           <a:p>
             <a:r>
               <a:rPr lang="en-US" dirty="0"/>
-              <a:t>Sources</a:t>
-            </a:r>
-          </a:p>
-        </p:txBody>
-      </p:sp>
-      <p:sp>
-        <p:nvSpPr>
-          <p:cNvPr id="3" name="Content Placeholder 2">
-            <a:extLst>
-              <a:ext uri="{FF2B5EF4-FFF2-40B4-BE49-F238E27FC236}">
-                <a16:creationId xmlns:a16="http://schemas.microsoft.com/office/drawing/2014/main" id="{059D5BF5-8A23-DA4B-9C07-06CDED256842}"/>
-              </a:ext>
-            </a:extLst>
-          </p:cNvPr>
-          <p:cNvSpPr>
-            <a:spLocks noGrp="1"/>
-          </p:cNvSpPr>
+              <a:t>Focus on States with the Highest</a:t>
+            </a:r>
+            <a:br>
+              <a:rPr lang="en-US" dirty="0"/>
+            </a:br>
+            <a:r>
+              <a:rPr lang="en-US" b="1" dirty="0"/>
+              <a:t>Ratio %</a:t>
+            </a:r>
+            <a:r>
+              <a:rPr lang="en-US" b="1" dirty="0" err="1"/>
+              <a:t>Popn</a:t>
+            </a:r>
+            <a:r>
+              <a:rPr lang="en-US" b="1" dirty="0"/>
+              <a:t>-%ACU</a:t>
+            </a:r>
+          </a:p>
+        </p:txBody>
+      </p:sp>
+      <p:pic>
+        <p:nvPicPr>
+          <p:cNvPr id="11" name="Content Placeholder 10">
+            <a:extLst>
+              <a:ext uri="{FF2B5EF4-FFF2-40B4-BE49-F238E27FC236}">
+                <a16:creationId xmlns:a16="http://schemas.microsoft.com/office/drawing/2014/main" id="{274BBA36-68D2-BD43-9E5F-80FA8269C2C0}"/>
+              </a:ext>
+            </a:extLst>
+          </p:cNvPr>
+          <p:cNvPicPr>
+            <a:picLocks noGrp="1" noChangeAspect="1"/>
+          </p:cNvPicPr>
           <p:nvPr>
             <p:ph idx="1"/>
           </p:nvPr>
-        </p:nvSpPr>
-        <p:spPr/>
-        <p:txBody>
-          <a:bodyPr/>
-          <a:lstStyle/>
-          <a:p>
-            <a:r>
-              <a:rPr lang="en-US" dirty="0"/>
-              <a:t>Recent version of the 2016 aged care units data (</a:t>
-            </a:r>
-            <a:r>
-              <a:rPr lang="en-US" dirty="0">
-                <a:hlinkClick r:id="rId3"/>
-              </a:rPr>
-              <a:t>link</a:t>
-            </a:r>
-            <a:r>
-              <a:rPr lang="en-US" dirty="0"/>
-              <a:t>) - now in 2019</a:t>
-            </a:r>
-          </a:p>
-          <a:p>
-            <a:r>
-              <a:rPr lang="en-US" dirty="0"/>
-              <a:t>Population by Age and Sex (</a:t>
-            </a:r>
-            <a:r>
-              <a:rPr lang="en-US" dirty="0">
-                <a:hlinkClick r:id="rId4"/>
-              </a:rPr>
-              <a:t>link</a:t>
-            </a:r>
-            <a:r>
-              <a:rPr lang="en-US" dirty="0"/>
-              <a:t>)</a:t>
-            </a:r>
-          </a:p>
-          <a:p>
-            <a:r>
-              <a:rPr lang="en-US" dirty="0"/>
-              <a:t>Creation of </a:t>
-            </a:r>
-            <a:r>
-              <a:rPr lang="en-US" dirty="0" err="1"/>
-              <a:t>GeoJSON</a:t>
-            </a:r>
-            <a:r>
-              <a:rPr lang="en-US" dirty="0"/>
-              <a:t> file for Australian postcodes (</a:t>
-            </a:r>
-            <a:r>
-              <a:rPr lang="en-US" dirty="0">
-                <a:hlinkClick r:id="rId5"/>
-              </a:rPr>
-              <a:t>link</a:t>
-            </a:r>
-            <a:r>
-              <a:rPr lang="en-US" dirty="0"/>
-              <a:t>)</a:t>
-            </a:r>
-          </a:p>
-          <a:p>
-            <a:r>
-              <a:rPr lang="en-US" dirty="0"/>
-              <a:t>Postcode </a:t>
-            </a:r>
-            <a:r>
-              <a:rPr lang="en-US" dirty="0" err="1"/>
-              <a:t>lat</a:t>
-            </a:r>
-            <a:r>
-              <a:rPr lang="en-US" dirty="0"/>
-              <a:t>/</a:t>
-            </a:r>
-            <a:r>
-              <a:rPr lang="en-US" dirty="0" err="1"/>
-              <a:t>lon</a:t>
-            </a:r>
-            <a:r>
-              <a:rPr lang="en-US" dirty="0"/>
-              <a:t> (</a:t>
-            </a:r>
-            <a:r>
-              <a:rPr lang="en-US" dirty="0">
-                <a:hlinkClick r:id="rId6"/>
-              </a:rPr>
-              <a:t>link</a:t>
-            </a:r>
-            <a:r>
-              <a:rPr lang="en-US" dirty="0"/>
-              <a:t>)</a:t>
-            </a:r>
-          </a:p>
-          <a:p>
-            <a:r>
-              <a:rPr lang="en-US" dirty="0"/>
-              <a:t>LGA (</a:t>
-            </a:r>
-            <a:r>
-              <a:rPr lang="en-US" dirty="0">
-                <a:hlinkClick r:id="rId7"/>
-              </a:rPr>
-              <a:t>link</a:t>
-            </a:r>
-            <a:r>
-              <a:rPr lang="en-US" dirty="0"/>
-              <a:t>)</a:t>
-            </a:r>
-          </a:p>
-          <a:p>
-            <a:endParaRPr lang="en-US" dirty="0"/>
-          </a:p>
-          <a:p>
-            <a:endParaRPr lang="en-US" dirty="0"/>
+        </p:nvPicPr>
+        <p:blipFill>
+          <a:blip r:embed="rId2"/>
+          <a:stretch>
+            <a:fillRect/>
+          </a:stretch>
+        </p:blipFill>
+        <p:spPr>
+          <a:xfrm>
+            <a:off x="838200" y="1888063"/>
+            <a:ext cx="10515600" cy="4226462"/>
+          </a:xfrm>
+        </p:spPr>
+      </p:pic>
+      <p:sp>
+        <p:nvSpPr>
+          <p:cNvPr id="12" name="Rounded Rectangle 11">
+            <a:extLst>
+              <a:ext uri="{FF2B5EF4-FFF2-40B4-BE49-F238E27FC236}">
+                <a16:creationId xmlns:a16="http://schemas.microsoft.com/office/drawing/2014/main" id="{71E1C9B5-FE24-7843-9928-5CAF8E0008AC}"/>
+              </a:ext>
+            </a:extLst>
+          </p:cNvPr>
+          <p:cNvSpPr/>
+          <p:nvPr/>
+        </p:nvSpPr>
+        <p:spPr>
+          <a:xfrm>
+            <a:off x="838200" y="2707105"/>
+            <a:ext cx="10603832" cy="1888958"/>
+          </a:xfrm>
+          <a:prstGeom prst="roundRect">
+            <a:avLst/>
+          </a:prstGeom>
+          <a:noFill/>
+          <a:ln w="38100">
+            <a:solidFill>
+              <a:srgbClr val="C00000"/>
+            </a:solidFill>
+          </a:ln>
+        </p:spPr>
+        <p:style>
+          <a:lnRef idx="2">
+            <a:schemeClr val="accent1">
+              <a:shade val="50000"/>
+            </a:schemeClr>
+          </a:lnRef>
+          <a:fillRef idx="1">
+            <a:schemeClr val="accent1"/>
+          </a:fillRef>
+          <a:effectRef idx="0">
+            <a:schemeClr val="accent1"/>
+          </a:effectRef>
+          <a:fontRef idx="minor">
+            <a:schemeClr val="lt1"/>
+          </a:fontRef>
+        </p:style>
+        <p:txBody>
+          <a:bodyPr rtlCol="0" anchor="ctr"/>
+          <a:lstStyle/>
+          <a:p>
+            <a:pPr algn="ctr"/>
+            <a:endParaRPr lang="en-US"/>
           </a:p>
         </p:txBody>
       </p:sp>
     </p:spTree>
     <p:extLst>
       <p:ext uri="{BB962C8B-B14F-4D97-AF65-F5344CB8AC3E}">
-        <p14:creationId xmlns:p14="http://schemas.microsoft.com/office/powerpoint/2010/main" val="4174600064"/>
+        <p14:creationId xmlns:p14="http://schemas.microsoft.com/office/powerpoint/2010/main" val="1396542596"/>
+      </p:ext>
+    </p:extLst>
+  </p:cSld>
+  <p:clrMapOvr>
+    <a:masterClrMapping/>
+  </p:clrMapOvr>
+</p:sld>
+</file>
+
+<file path=ppt/slides/slide7.xml><?xml version="1.0" encoding="utf-8"?>
+<p:sld xmlns:a="http://schemas.openxmlformats.org/drawingml/2006/main" xmlns:r="http://schemas.openxmlformats.org/officeDocument/2006/relationships" xmlns:p="http://schemas.openxmlformats.org/presentationml/2006/main">
+  <p:cSld>
+    <p:spTree>
+      <p:nvGrpSpPr>
+        <p:cNvPr id="1" name=""/>
+        <p:cNvGrpSpPr/>
+        <p:nvPr/>
+      </p:nvGrpSpPr>
+      <p:grpSpPr>
+        <a:xfrm>
+          <a:off x="0" y="0"/>
+          <a:ext cx="0" cy="0"/>
+          <a:chOff x="0" y="0"/>
+          <a:chExt cx="0" cy="0"/>
+        </a:xfrm>
+      </p:grpSpPr>
+      <p:sp>
+        <p:nvSpPr>
+          <p:cNvPr id="2" name="Title 1">
+            <a:extLst>
+              <a:ext uri="{FF2B5EF4-FFF2-40B4-BE49-F238E27FC236}">
+                <a16:creationId xmlns:a16="http://schemas.microsoft.com/office/drawing/2014/main" id="{B660CFAD-F43C-B847-A702-35E595AA164F}"/>
+              </a:ext>
+            </a:extLst>
+          </p:cNvPr>
+          <p:cNvSpPr>
+            <a:spLocks noGrp="1"/>
+          </p:cNvSpPr>
+          <p:nvPr>
+            <p:ph type="title"/>
+          </p:nvPr>
+        </p:nvSpPr>
+        <p:spPr/>
+        <p:txBody>
+          <a:bodyPr/>
+          <a:lstStyle/>
+          <a:p>
+            <a:r>
+              <a:rPr lang="en-US" dirty="0"/>
+              <a:t>Issues</a:t>
+            </a:r>
+          </a:p>
+        </p:txBody>
+      </p:sp>
+      <p:sp>
+        <p:nvSpPr>
+          <p:cNvPr id="3" name="Content Placeholder 2">
+            <a:extLst>
+              <a:ext uri="{FF2B5EF4-FFF2-40B4-BE49-F238E27FC236}">
+                <a16:creationId xmlns:a16="http://schemas.microsoft.com/office/drawing/2014/main" id="{51DA2D4A-BAF3-3D43-A20D-4A432113163F}"/>
+              </a:ext>
+            </a:extLst>
+          </p:cNvPr>
+          <p:cNvSpPr>
+            <a:spLocks noGrp="1"/>
+          </p:cNvSpPr>
+          <p:nvPr>
+            <p:ph idx="1"/>
+          </p:nvPr>
+        </p:nvSpPr>
+        <p:spPr/>
+        <p:txBody>
+          <a:bodyPr/>
+          <a:lstStyle/>
+          <a:p>
+            <a:r>
+              <a:rPr lang="en-US" dirty="0"/>
+              <a:t>No population data gathered for Other Territories (misrepresentation)</a:t>
+            </a:r>
+          </a:p>
+        </p:txBody>
+      </p:sp>
+    </p:spTree>
+    <p:extLst>
+      <p:ext uri="{BB962C8B-B14F-4D97-AF65-F5344CB8AC3E}">
+        <p14:creationId xmlns:p14="http://schemas.microsoft.com/office/powerpoint/2010/main" val="2380432002"/>
+      </p:ext>
+    </p:extLst>
+  </p:cSld>
+  <p:clrMapOvr>
+    <a:masterClrMapping/>
+  </p:clrMapOvr>
+</p:sld>
+</file>
+
+<file path=ppt/slides/slide8.xml><?xml version="1.0" encoding="utf-8"?>
+<p:sld xmlns:a="http://schemas.openxmlformats.org/drawingml/2006/main" xmlns:r="http://schemas.openxmlformats.org/officeDocument/2006/relationships" xmlns:p="http://schemas.openxmlformats.org/presentationml/2006/main">
+  <p:cSld>
+    <p:spTree>
+      <p:nvGrpSpPr>
+        <p:cNvPr id="1" name=""/>
+        <p:cNvGrpSpPr/>
+        <p:nvPr/>
+      </p:nvGrpSpPr>
+      <p:grpSpPr>
+        <a:xfrm>
+          <a:off x="0" y="0"/>
+          <a:ext cx="0" cy="0"/>
+          <a:chOff x="0" y="0"/>
+          <a:chExt cx="0" cy="0"/>
+        </a:xfrm>
+      </p:grpSpPr>
+      <p:sp>
+        <p:nvSpPr>
+          <p:cNvPr id="2" name="Title 1">
+            <a:extLst>
+              <a:ext uri="{FF2B5EF4-FFF2-40B4-BE49-F238E27FC236}">
+                <a16:creationId xmlns:a16="http://schemas.microsoft.com/office/drawing/2014/main" id="{BFC4FF89-F7D9-0D49-8660-0CA7CF98541A}"/>
+              </a:ext>
+            </a:extLst>
+          </p:cNvPr>
+          <p:cNvSpPr>
+            <a:spLocks noGrp="1"/>
+          </p:cNvSpPr>
+          <p:nvPr>
+            <p:ph type="title"/>
+          </p:nvPr>
+        </p:nvSpPr>
+        <p:spPr/>
+        <p:txBody>
+          <a:bodyPr/>
+          <a:lstStyle/>
+          <a:p>
+            <a:r>
+              <a:rPr lang="en-US" i="1" dirty="0"/>
+              <a:t>Technical</a:t>
+            </a:r>
+            <a:r>
+              <a:rPr lang="en-US" dirty="0"/>
+              <a:t> Methodology</a:t>
+            </a:r>
+          </a:p>
+        </p:txBody>
+      </p:sp>
+      <p:sp>
+        <p:nvSpPr>
+          <p:cNvPr id="3" name="Content Placeholder 2">
+            <a:extLst>
+              <a:ext uri="{FF2B5EF4-FFF2-40B4-BE49-F238E27FC236}">
+                <a16:creationId xmlns:a16="http://schemas.microsoft.com/office/drawing/2014/main" id="{5AA2C1D9-9F25-EF4C-AAE7-FD3FE9B7526C}"/>
+              </a:ext>
+            </a:extLst>
+          </p:cNvPr>
+          <p:cNvSpPr>
+            <a:spLocks noGrp="1"/>
+          </p:cNvSpPr>
+          <p:nvPr>
+            <p:ph idx="1"/>
+          </p:nvPr>
+        </p:nvSpPr>
+        <p:spPr/>
+        <p:txBody>
+          <a:bodyPr>
+            <a:normAutofit/>
+          </a:bodyPr>
+          <a:lstStyle/>
+          <a:p>
+            <a:r>
+              <a:rPr lang="en-US" dirty="0"/>
+              <a:t>Visualise the problem using </a:t>
+            </a:r>
+            <a:r>
+              <a:rPr lang="en-US" dirty="0" err="1"/>
+              <a:t>RShiny</a:t>
+            </a:r>
+            <a:endParaRPr lang="en-US" dirty="0"/>
+          </a:p>
+          <a:p>
+            <a:pPr lvl="1"/>
+            <a:r>
+              <a:rPr lang="en-US" dirty="0"/>
+              <a:t>Mark the physical location of aged care units in the Australian map. Use leaflet library, and Local Government Area (LGA) shape data</a:t>
+            </a:r>
+          </a:p>
+          <a:p>
+            <a:pPr lvl="1"/>
+            <a:r>
+              <a:rPr lang="en-US" dirty="0"/>
+              <a:t>Color the LGAs depending on the old-age population density.</a:t>
+            </a:r>
+          </a:p>
+          <a:p>
+            <a:pPr lvl="1"/>
+            <a:r>
+              <a:rPr lang="en-US" dirty="0">
+                <a:solidFill>
+                  <a:srgbClr val="FF0000"/>
+                </a:solidFill>
+              </a:rPr>
+              <a:t>R, </a:t>
+            </a:r>
+            <a:r>
+              <a:rPr lang="en-US" dirty="0" err="1">
+                <a:solidFill>
+                  <a:srgbClr val="FF0000"/>
+                </a:solidFill>
+              </a:rPr>
+              <a:t>RShiny</a:t>
+            </a:r>
+            <a:r>
+              <a:rPr lang="en-US" dirty="0">
+                <a:solidFill>
+                  <a:srgbClr val="FF0000"/>
+                </a:solidFill>
+              </a:rPr>
+              <a:t>, Leaflet, </a:t>
+            </a:r>
+            <a:r>
+              <a:rPr lang="en-US" dirty="0" err="1">
+                <a:solidFill>
+                  <a:srgbClr val="FF0000"/>
+                </a:solidFill>
+              </a:rPr>
+              <a:t>GeoJSON</a:t>
+            </a:r>
+            <a:r>
+              <a:rPr lang="en-US" dirty="0">
+                <a:solidFill>
+                  <a:srgbClr val="FF0000"/>
+                </a:solidFill>
+              </a:rPr>
+              <a:t>, Mac terminal for processing shapefile data</a:t>
+            </a:r>
+          </a:p>
+          <a:p>
+            <a:r>
+              <a:rPr lang="en-US" dirty="0"/>
+              <a:t>Merge population data with aged care units data</a:t>
+            </a:r>
+          </a:p>
+          <a:p>
+            <a:pPr lvl="1"/>
+            <a:r>
+              <a:rPr lang="en-US" dirty="0"/>
+              <a:t>The tricky part is getting data with matching location granularity (smallest possible)</a:t>
+            </a:r>
+          </a:p>
+          <a:p>
+            <a:pPr lvl="1"/>
+            <a:r>
+              <a:rPr lang="en-US" dirty="0">
+                <a:solidFill>
+                  <a:srgbClr val="FF0000"/>
+                </a:solidFill>
+              </a:rPr>
+              <a:t>R, </a:t>
+            </a:r>
+            <a:r>
+              <a:rPr lang="en-US" dirty="0" err="1">
+                <a:solidFill>
+                  <a:srgbClr val="FF0000"/>
+                </a:solidFill>
+              </a:rPr>
+              <a:t>dplyr</a:t>
+            </a:r>
+            <a:r>
+              <a:rPr lang="en-US" dirty="0">
+                <a:solidFill>
+                  <a:srgbClr val="FF0000"/>
+                </a:solidFill>
+              </a:rPr>
+              <a:t>, </a:t>
+            </a:r>
+            <a:r>
+              <a:rPr lang="en-US" dirty="0" err="1">
+                <a:solidFill>
+                  <a:srgbClr val="FF0000"/>
+                </a:solidFill>
+              </a:rPr>
+              <a:t>tidyr</a:t>
+            </a:r>
+            <a:endParaRPr lang="en-US" dirty="0"/>
+          </a:p>
+          <a:p>
+            <a:endParaRPr lang="en-US" dirty="0"/>
+          </a:p>
+        </p:txBody>
+      </p:sp>
+    </p:spTree>
+    <p:extLst>
+      <p:ext uri="{BB962C8B-B14F-4D97-AF65-F5344CB8AC3E}">
+        <p14:creationId xmlns:p14="http://schemas.microsoft.com/office/powerpoint/2010/main" val="2637013669"/>
+      </p:ext>
+    </p:extLst>
+  </p:cSld>
+  <p:clrMapOvr>
+    <a:masterClrMapping/>
+  </p:clrMapOvr>
+</p:sld>
+</file>
+
+<file path=ppt/slides/slide9.xml><?xml version="1.0" encoding="utf-8"?>
+<p:sld xmlns:a="http://schemas.openxmlformats.org/drawingml/2006/main" xmlns:r="http://schemas.openxmlformats.org/officeDocument/2006/relationships" xmlns:p="http://schemas.openxmlformats.org/presentationml/2006/main">
+  <p:cSld>
+    <p:spTree>
+      <p:nvGrpSpPr>
+        <p:cNvPr id="1" name=""/>
+        <p:cNvGrpSpPr/>
+        <p:nvPr/>
+      </p:nvGrpSpPr>
+      <p:grpSpPr>
+        <a:xfrm>
+          <a:off x="0" y="0"/>
+          <a:ext cx="0" cy="0"/>
+          <a:chOff x="0" y="0"/>
+          <a:chExt cx="0" cy="0"/>
+        </a:xfrm>
+      </p:grpSpPr>
+      <p:sp>
+        <p:nvSpPr>
+          <p:cNvPr id="2" name="Title 1">
+            <a:extLst>
+              <a:ext uri="{FF2B5EF4-FFF2-40B4-BE49-F238E27FC236}">
+                <a16:creationId xmlns:a16="http://schemas.microsoft.com/office/drawing/2014/main" id="{BFC4FF89-F7D9-0D49-8660-0CA7CF98541A}"/>
+              </a:ext>
+            </a:extLst>
+          </p:cNvPr>
+          <p:cNvSpPr>
+            <a:spLocks noGrp="1"/>
+          </p:cNvSpPr>
+          <p:nvPr>
+            <p:ph type="title"/>
+          </p:nvPr>
+        </p:nvSpPr>
+        <p:spPr/>
+        <p:txBody>
+          <a:bodyPr/>
+          <a:lstStyle/>
+          <a:p>
+            <a:r>
+              <a:rPr lang="en-US" i="1" dirty="0"/>
+              <a:t>Technical</a:t>
+            </a:r>
+            <a:r>
+              <a:rPr lang="en-US" dirty="0"/>
+              <a:t> Methodology</a:t>
+            </a:r>
+          </a:p>
+        </p:txBody>
+      </p:sp>
+      <p:sp>
+        <p:nvSpPr>
+          <p:cNvPr id="3" name="Content Placeholder 2">
+            <a:extLst>
+              <a:ext uri="{FF2B5EF4-FFF2-40B4-BE49-F238E27FC236}">
+                <a16:creationId xmlns:a16="http://schemas.microsoft.com/office/drawing/2014/main" id="{5AA2C1D9-9F25-EF4C-AAE7-FD3FE9B7526C}"/>
+              </a:ext>
+            </a:extLst>
+          </p:cNvPr>
+          <p:cNvSpPr>
+            <a:spLocks noGrp="1"/>
+          </p:cNvSpPr>
+          <p:nvPr>
+            <p:ph idx="1"/>
+          </p:nvPr>
+        </p:nvSpPr>
+        <p:spPr/>
+        <p:txBody>
+          <a:bodyPr>
+            <a:normAutofit/>
+          </a:bodyPr>
+          <a:lstStyle/>
+          <a:p>
+            <a:r>
+              <a:rPr lang="en-US" dirty="0"/>
+              <a:t>Decide on a metric to allocate ACUs</a:t>
+            </a:r>
+          </a:p>
+          <a:p>
+            <a:pPr lvl="1"/>
+            <a:r>
+              <a:rPr lang="en-US" dirty="0"/>
+              <a:t>Ratio of (% Old-age population distribution across states) and (% ACU capacity distribution across states)</a:t>
+            </a:r>
+          </a:p>
+          <a:p>
+            <a:pPr lvl="1"/>
+            <a:r>
+              <a:rPr lang="en-US" dirty="0"/>
+              <a:t>If Ratio &gt; 1 then there are more old-age people than ACUs in a state</a:t>
+            </a:r>
+          </a:p>
+          <a:p>
+            <a:pPr lvl="1"/>
+            <a:r>
+              <a:rPr lang="en-US" dirty="0"/>
+              <a:t>If Ratio &lt; 1 then there are more ACUs than old-age people in a state</a:t>
+            </a:r>
+          </a:p>
+          <a:p>
+            <a:pPr lvl="1"/>
+            <a:r>
+              <a:rPr lang="en-US" dirty="0"/>
+              <a:t>Priority for building ACUs will go to states with higher metric value</a:t>
+            </a:r>
+          </a:p>
+          <a:p>
+            <a:r>
+              <a:rPr lang="en-US" dirty="0"/>
+              <a:t>Git and GitHub for versioning</a:t>
+            </a:r>
+          </a:p>
+          <a:p>
+            <a:pPr lvl="1"/>
+            <a:r>
+              <a:rPr lang="en-US" dirty="0"/>
+              <a:t>Code is available upon request</a:t>
+            </a:r>
+          </a:p>
+          <a:p>
+            <a:endParaRPr lang="en-US" dirty="0"/>
+          </a:p>
+          <a:p>
+            <a:endParaRPr lang="en-US" dirty="0"/>
+          </a:p>
+        </p:txBody>
+      </p:sp>
+    </p:spTree>
+    <p:extLst>
+      <p:ext uri="{BB962C8B-B14F-4D97-AF65-F5344CB8AC3E}">
+        <p14:creationId xmlns:p14="http://schemas.microsoft.com/office/powerpoint/2010/main" val="3938303032"/>
       </p:ext>
     </p:extLst>
   </p:cSld>

</xml_diff>

<commit_message>
included formula excel sheet
</commit_message>
<xml_diff>
--- a/final_presentation.pptx
+++ b/final_presentation.pptx
@@ -5,7 +5,7 @@
     <p:sldMasterId id="2147483648" r:id="rId1"/>
   </p:sldMasterIdLst>
   <p:notesMasterIdLst>
-    <p:notesMasterId r:id="rId18"/>
+    <p:notesMasterId r:id="rId17"/>
   </p:notesMasterIdLst>
   <p:sldIdLst>
     <p:sldId id="268" r:id="rId2"/>
@@ -22,8 +22,7 @@
     <p:sldId id="269" r:id="rId13"/>
     <p:sldId id="267" r:id="rId14"/>
     <p:sldId id="265" r:id="rId15"/>
-    <p:sldId id="256" r:id="rId16"/>
-    <p:sldId id="259" r:id="rId17"/>
+    <p:sldId id="259" r:id="rId16"/>
   </p:sldIdLst>
   <p:sldSz cx="12192000" cy="6858000"/>
   <p:notesSz cx="6858000" cy="9144000"/>
@@ -964,7 +963,7 @@
           <a:p>
             <a:fld id="{A8983C90-4626-814B-837F-264CA2EC8117}" type="slidenum">
               <a:rPr lang="en-US" smtClean="0"/>
-              <a:t>16</a:t>
+              <a:t>15</a:t>
             </a:fld>
             <a:endParaRPr lang="en-US"/>
           </a:p>
@@ -6003,906 +6002,6 @@
 </file>
 
 <file path=ppt/slides/slide15.xml><?xml version="1.0" encoding="utf-8"?>
-<p:sld xmlns:a="http://schemas.openxmlformats.org/drawingml/2006/main" xmlns:r="http://schemas.openxmlformats.org/officeDocument/2006/relationships" xmlns:p="http://schemas.openxmlformats.org/presentationml/2006/main">
-  <p:cSld>
-    <p:spTree>
-      <p:nvGrpSpPr>
-        <p:cNvPr id="1" name=""/>
-        <p:cNvGrpSpPr/>
-        <p:nvPr/>
-      </p:nvGrpSpPr>
-      <p:grpSpPr>
-        <a:xfrm>
-          <a:off x="0" y="0"/>
-          <a:ext cx="0" cy="0"/>
-          <a:chOff x="0" y="0"/>
-          <a:chExt cx="0" cy="0"/>
-        </a:xfrm>
-      </p:grpSpPr>
-      <p:sp>
-        <p:nvSpPr>
-          <p:cNvPr id="4" name="Title 3">
-            <a:extLst>
-              <a:ext uri="{FF2B5EF4-FFF2-40B4-BE49-F238E27FC236}">
-                <a16:creationId xmlns:a16="http://schemas.microsoft.com/office/drawing/2014/main" id="{6D5CEB95-69CA-A146-BE1D-261779EC7067}"/>
-              </a:ext>
-            </a:extLst>
-          </p:cNvPr>
-          <p:cNvSpPr>
-            <a:spLocks noGrp="1"/>
-          </p:cNvSpPr>
-          <p:nvPr>
-            <p:ph type="title"/>
-          </p:nvPr>
-        </p:nvSpPr>
-        <p:spPr/>
-        <p:txBody>
-          <a:bodyPr/>
-          <a:lstStyle/>
-          <a:p>
-            <a:r>
-              <a:rPr lang="en-US" dirty="0"/>
-              <a:t>Allocation of 200 New Aged Care Units</a:t>
-            </a:r>
-          </a:p>
-        </p:txBody>
-      </p:sp>
-      <p:sp>
-        <p:nvSpPr>
-          <p:cNvPr id="2" name="Content Placeholder 1">
-            <a:extLst>
-              <a:ext uri="{FF2B5EF4-FFF2-40B4-BE49-F238E27FC236}">
-                <a16:creationId xmlns:a16="http://schemas.microsoft.com/office/drawing/2014/main" id="{DAEAD7E2-7F49-0B40-ACCE-FC0DDB21CD50}"/>
-              </a:ext>
-            </a:extLst>
-          </p:cNvPr>
-          <p:cNvSpPr>
-            <a:spLocks noGrp="1"/>
-          </p:cNvSpPr>
-          <p:nvPr>
-            <p:ph idx="1"/>
-          </p:nvPr>
-        </p:nvSpPr>
-        <p:spPr>
-          <a:xfrm>
-            <a:off x="838200" y="1464678"/>
-            <a:ext cx="10515600" cy="4351338"/>
-          </a:xfrm>
-        </p:spPr>
-        <p:txBody>
-          <a:bodyPr/>
-          <a:lstStyle/>
-          <a:p>
-            <a:pPr marL="0" indent="0">
-              <a:buNone/>
-            </a:pPr>
-            <a:endParaRPr lang="en-US" dirty="0"/>
-          </a:p>
-        </p:txBody>
-      </p:sp>
-      <p:graphicFrame>
-        <p:nvGraphicFramePr>
-          <p:cNvPr id="3" name="Table 2">
-            <a:extLst>
-              <a:ext uri="{FF2B5EF4-FFF2-40B4-BE49-F238E27FC236}">
-                <a16:creationId xmlns:a16="http://schemas.microsoft.com/office/drawing/2014/main" id="{2454315C-A826-3949-A746-9CC6E7819ACC}"/>
-              </a:ext>
-            </a:extLst>
-          </p:cNvPr>
-          <p:cNvGraphicFramePr>
-            <a:graphicFrameLocks noGrp="1"/>
-          </p:cNvGraphicFramePr>
-          <p:nvPr>
-            <p:extLst>
-              <p:ext uri="{D42A27DB-BD31-4B8C-83A1-F6EECF244321}">
-                <p14:modId xmlns:p14="http://schemas.microsoft.com/office/powerpoint/2010/main" val="2381121513"/>
-              </p:ext>
-            </p:extLst>
-          </p:nvPr>
-        </p:nvGraphicFramePr>
-        <p:xfrm>
-          <a:off x="838200" y="1464678"/>
-          <a:ext cx="10515600" cy="4328781"/>
-        </p:xfrm>
-        <a:graphic>
-          <a:graphicData uri="http://schemas.openxmlformats.org/drawingml/2006/table">
-            <a:tbl>
-              <a:tblPr firstRow="1" bandRow="1">
-                <a:tableStyleId>{5C22544A-7EE6-4342-B048-85BDC9FD1C3A}</a:tableStyleId>
-              </a:tblPr>
-              <a:tblGrid>
-                <a:gridCol w="2103120">
-                  <a:extLst>
-                    <a:ext uri="{9D8B030D-6E8A-4147-A177-3AD203B41FA5}">
-                      <a16:colId xmlns:a16="http://schemas.microsoft.com/office/drawing/2014/main" val="2350512347"/>
-                    </a:ext>
-                  </a:extLst>
-                </a:gridCol>
-                <a:gridCol w="2103120">
-                  <a:extLst>
-                    <a:ext uri="{9D8B030D-6E8A-4147-A177-3AD203B41FA5}">
-                      <a16:colId xmlns:a16="http://schemas.microsoft.com/office/drawing/2014/main" val="360015556"/>
-                    </a:ext>
-                  </a:extLst>
-                </a:gridCol>
-                <a:gridCol w="2103120">
-                  <a:extLst>
-                    <a:ext uri="{9D8B030D-6E8A-4147-A177-3AD203B41FA5}">
-                      <a16:colId xmlns:a16="http://schemas.microsoft.com/office/drawing/2014/main" val="2611921016"/>
-                    </a:ext>
-                  </a:extLst>
-                </a:gridCol>
-                <a:gridCol w="2382487">
-                  <a:extLst>
-                    <a:ext uri="{9D8B030D-6E8A-4147-A177-3AD203B41FA5}">
-                      <a16:colId xmlns:a16="http://schemas.microsoft.com/office/drawing/2014/main" val="2352901676"/>
-                    </a:ext>
-                  </a:extLst>
-                </a:gridCol>
-                <a:gridCol w="1823753">
-                  <a:extLst>
-                    <a:ext uri="{9D8B030D-6E8A-4147-A177-3AD203B41FA5}">
-                      <a16:colId xmlns:a16="http://schemas.microsoft.com/office/drawing/2014/main" val="3979451838"/>
-                    </a:ext>
-                  </a:extLst>
-                </a:gridCol>
-              </a:tblGrid>
-              <a:tr h="1059389">
-                <a:tc>
-                  <a:txBody>
-                    <a:bodyPr/>
-                    <a:lstStyle/>
-                    <a:p>
-                      <a:pPr algn="ctr"/>
-                      <a:r>
-                        <a:rPr lang="en-US" b="0" dirty="0"/>
-                        <a:t>State</a:t>
-                      </a:r>
-                    </a:p>
-                  </a:txBody>
-                  <a:tcPr/>
-                </a:tc>
-                <a:tc>
-                  <a:txBody>
-                    <a:bodyPr/>
-                    <a:lstStyle/>
-                    <a:p>
-                      <a:pPr algn="ctr"/>
-                      <a:r>
-                        <a:rPr lang="en-US" b="0" dirty="0"/>
-                        <a:t>ACU Distribution by Capacity</a:t>
-                      </a:r>
-                    </a:p>
-                  </a:txBody>
-                  <a:tcPr/>
-                </a:tc>
-                <a:tc>
-                  <a:txBody>
-                    <a:bodyPr/>
-                    <a:lstStyle/>
-                    <a:p>
-                      <a:pPr algn="ctr"/>
-                      <a:r>
-                        <a:rPr lang="en-US" b="0" dirty="0"/>
-                        <a:t>Population Distribution</a:t>
-                      </a:r>
-                    </a:p>
-                  </a:txBody>
-                  <a:tcPr/>
-                </a:tc>
-                <a:tc>
-                  <a:txBody>
-                    <a:bodyPr/>
-                    <a:lstStyle/>
-                    <a:p>
-                      <a:pPr algn="ctr"/>
-                      <a:r>
-                        <a:rPr lang="en-US" b="0" dirty="0"/>
-                        <a:t>Ratio of ACU </a:t>
-                      </a:r>
-                      <a:r>
-                        <a:rPr lang="en-US" b="0" dirty="0" err="1"/>
-                        <a:t>Distrib</a:t>
-                      </a:r>
-                      <a:r>
-                        <a:rPr lang="en-US" b="0" dirty="0"/>
-                        <a:t> and Population </a:t>
-                      </a:r>
-                      <a:r>
-                        <a:rPr lang="en-US" b="0" dirty="0" err="1"/>
-                        <a:t>Distrib</a:t>
-                      </a:r>
-                      <a:endParaRPr lang="en-US" b="0" dirty="0"/>
-                    </a:p>
-                  </a:txBody>
-                  <a:tcPr/>
-                </a:tc>
-                <a:tc>
-                  <a:txBody>
-                    <a:bodyPr/>
-                    <a:lstStyle/>
-                    <a:p>
-                      <a:pPr algn="ctr"/>
-                      <a:r>
-                        <a:rPr lang="en-US" b="0" dirty="0"/>
-                        <a:t>Population</a:t>
-                      </a:r>
-                    </a:p>
-                  </a:txBody>
-                  <a:tcPr/>
-                </a:tc>
-                <a:extLst>
-                  <a:ext uri="{0D108BD9-81ED-4DB2-BD59-A6C34878D82A}">
-                    <a16:rowId xmlns:a16="http://schemas.microsoft.com/office/drawing/2014/main" val="3499412382"/>
-                  </a:ext>
-                </a:extLst>
-              </a:tr>
-              <a:tr h="408674">
-                <a:tc>
-                  <a:txBody>
-                    <a:bodyPr/>
-                    <a:lstStyle/>
-                    <a:p>
-                      <a:r>
-                        <a:rPr lang="en-US" dirty="0"/>
-                        <a:t>NT</a:t>
-                      </a:r>
-                    </a:p>
-                  </a:txBody>
-                  <a:tcPr/>
-                </a:tc>
-                <a:tc>
-                  <a:txBody>
-                    <a:bodyPr/>
-                    <a:lstStyle/>
-                    <a:p>
-                      <a:r>
-                        <a:rPr lang="en-US" dirty="0"/>
-                        <a:t>0.48%</a:t>
-                      </a:r>
-                    </a:p>
-                  </a:txBody>
-                  <a:tcPr/>
-                </a:tc>
-                <a:tc>
-                  <a:txBody>
-                    <a:bodyPr/>
-                    <a:lstStyle/>
-                    <a:p>
-                      <a:r>
-                        <a:rPr lang="en-US" dirty="0"/>
-                        <a:t>0.71%</a:t>
-                      </a:r>
-                    </a:p>
-                  </a:txBody>
-                  <a:tcPr/>
-                </a:tc>
-                <a:tc>
-                  <a:txBody>
-                    <a:bodyPr/>
-                    <a:lstStyle/>
-                    <a:p>
-                      <a:r>
-                        <a:rPr lang="en-US" dirty="0"/>
-                        <a:t>1.48</a:t>
-                      </a:r>
-                    </a:p>
-                  </a:txBody>
-                  <a:tcPr/>
-                </a:tc>
-                <a:tc>
-                  <a:txBody>
-                    <a:bodyPr/>
-                    <a:lstStyle/>
-                    <a:p>
-                      <a:r>
-                        <a:rPr lang="en-PH" sz="1800" b="0" i="0" kern="1200" dirty="0">
-                          <a:solidFill>
-                            <a:schemeClr val="dk1"/>
-                          </a:solidFill>
-                          <a:effectLst/>
-                          <a:latin typeface="+mn-lt"/>
-                          <a:ea typeface="+mn-ea"/>
-                          <a:cs typeface="+mn-cs"/>
-                        </a:rPr>
-                        <a:t>59,423</a:t>
-                      </a:r>
-                      <a:endParaRPr lang="en-US" dirty="0"/>
-                    </a:p>
-                  </a:txBody>
-                  <a:tcPr/>
-                </a:tc>
-                <a:extLst>
-                  <a:ext uri="{0D108BD9-81ED-4DB2-BD59-A6C34878D82A}">
-                    <a16:rowId xmlns:a16="http://schemas.microsoft.com/office/drawing/2014/main" val="1114881580"/>
-                  </a:ext>
-                </a:extLst>
-              </a:tr>
-              <a:tr h="408674">
-                <a:tc>
-                  <a:txBody>
-                    <a:bodyPr/>
-                    <a:lstStyle/>
-                    <a:p>
-                      <a:r>
-                        <a:rPr lang="en-US" dirty="0"/>
-                        <a:t>ACT</a:t>
-                      </a:r>
-                    </a:p>
-                  </a:txBody>
-                  <a:tcPr/>
-                </a:tc>
-                <a:tc>
-                  <a:txBody>
-                    <a:bodyPr/>
-                    <a:lstStyle/>
-                    <a:p>
-                      <a:r>
-                        <a:rPr lang="en-US" dirty="0"/>
-                        <a:t>1.19%</a:t>
-                      </a:r>
-                    </a:p>
-                  </a:txBody>
-                  <a:tcPr/>
-                </a:tc>
-                <a:tc>
-                  <a:txBody>
-                    <a:bodyPr/>
-                    <a:lstStyle/>
-                    <a:p>
-                      <a:r>
-                        <a:rPr lang="en-US" dirty="0"/>
-                        <a:t>1.45%</a:t>
-                      </a:r>
-                    </a:p>
-                  </a:txBody>
-                  <a:tcPr/>
-                </a:tc>
-                <a:tc>
-                  <a:txBody>
-                    <a:bodyPr/>
-                    <a:lstStyle/>
-                    <a:p>
-                      <a:r>
-                        <a:rPr lang="en-US" dirty="0"/>
-                        <a:t>1.21</a:t>
-                      </a:r>
-                    </a:p>
-                  </a:txBody>
-                  <a:tcPr/>
-                </a:tc>
-                <a:tc>
-                  <a:txBody>
-                    <a:bodyPr/>
-                    <a:lstStyle/>
-                    <a:p>
-                      <a:r>
-                        <a:rPr lang="en-PH" sz="1800" b="0" i="0" kern="1200" dirty="0">
-                          <a:solidFill>
-                            <a:schemeClr val="dk1"/>
-                          </a:solidFill>
-                          <a:effectLst/>
-                          <a:latin typeface="+mn-lt"/>
-                          <a:ea typeface="+mn-ea"/>
-                          <a:cs typeface="+mn-cs"/>
-                        </a:rPr>
-                        <a:t>120,857</a:t>
-                      </a:r>
-                      <a:endParaRPr lang="en-US" dirty="0"/>
-                    </a:p>
-                  </a:txBody>
-                  <a:tcPr/>
-                </a:tc>
-                <a:extLst>
-                  <a:ext uri="{0D108BD9-81ED-4DB2-BD59-A6C34878D82A}">
-                    <a16:rowId xmlns:a16="http://schemas.microsoft.com/office/drawing/2014/main" val="538226209"/>
-                  </a:ext>
-                </a:extLst>
-              </a:tr>
-              <a:tr h="408674">
-                <a:tc>
-                  <a:txBody>
-                    <a:bodyPr/>
-                    <a:lstStyle/>
-                    <a:p>
-                      <a:r>
-                        <a:rPr lang="en-US" dirty="0"/>
-                        <a:t>WA</a:t>
-                      </a:r>
-                    </a:p>
-                  </a:txBody>
-                  <a:tcPr/>
-                </a:tc>
-                <a:tc>
-                  <a:txBody>
-                    <a:bodyPr/>
-                    <a:lstStyle/>
-                    <a:p>
-                      <a:r>
-                        <a:rPr lang="en-US" dirty="0"/>
-                        <a:t>8.55%</a:t>
-                      </a:r>
-                    </a:p>
-                  </a:txBody>
-                  <a:tcPr/>
-                </a:tc>
-                <a:tc>
-                  <a:txBody>
-                    <a:bodyPr/>
-                    <a:lstStyle/>
-                    <a:p>
-                      <a:r>
-                        <a:rPr lang="en-US" dirty="0"/>
-                        <a:t>10.02%</a:t>
-                      </a:r>
-                    </a:p>
-                  </a:txBody>
-                  <a:tcPr/>
-                </a:tc>
-                <a:tc>
-                  <a:txBody>
-                    <a:bodyPr/>
-                    <a:lstStyle/>
-                    <a:p>
-                      <a:r>
-                        <a:rPr lang="en-US" dirty="0"/>
-                        <a:t>1.17</a:t>
-                      </a:r>
-                    </a:p>
-                  </a:txBody>
-                  <a:tcPr/>
-                </a:tc>
-                <a:tc>
-                  <a:txBody>
-                    <a:bodyPr/>
-                    <a:lstStyle/>
-                    <a:p>
-                      <a:r>
-                        <a:rPr lang="en-PH" sz="1800" b="0" i="0" kern="1200" dirty="0">
-                          <a:solidFill>
-                            <a:schemeClr val="dk1"/>
-                          </a:solidFill>
-                          <a:effectLst/>
-                          <a:latin typeface="+mn-lt"/>
-                          <a:ea typeface="+mn-ea"/>
-                          <a:cs typeface="+mn-cs"/>
-                        </a:rPr>
-                        <a:t>834,753</a:t>
-                      </a:r>
-                      <a:endParaRPr lang="en-US" dirty="0"/>
-                    </a:p>
-                  </a:txBody>
-                  <a:tcPr/>
-                </a:tc>
-                <a:extLst>
-                  <a:ext uri="{0D108BD9-81ED-4DB2-BD59-A6C34878D82A}">
-                    <a16:rowId xmlns:a16="http://schemas.microsoft.com/office/drawing/2014/main" val="491189153"/>
-                  </a:ext>
-                </a:extLst>
-              </a:tr>
-              <a:tr h="408674">
-                <a:tc>
-                  <a:txBody>
-                    <a:bodyPr/>
-                    <a:lstStyle/>
-                    <a:p>
-                      <a:r>
-                        <a:rPr lang="en-US" dirty="0"/>
-                        <a:t>TAS</a:t>
-                      </a:r>
-                    </a:p>
-                  </a:txBody>
-                  <a:tcPr/>
-                </a:tc>
-                <a:tc>
-                  <a:txBody>
-                    <a:bodyPr/>
-                    <a:lstStyle/>
-                    <a:p>
-                      <a:r>
-                        <a:rPr lang="en-US" dirty="0"/>
-                        <a:t>2.42%</a:t>
-                      </a:r>
-                    </a:p>
-                  </a:txBody>
-                  <a:tcPr/>
-                </a:tc>
-                <a:tc>
-                  <a:txBody>
-                    <a:bodyPr/>
-                    <a:lstStyle/>
-                    <a:p>
-                      <a:r>
-                        <a:rPr lang="en-US" dirty="0"/>
-                        <a:t>2.54%</a:t>
-                      </a:r>
-                    </a:p>
-                  </a:txBody>
-                  <a:tcPr/>
-                </a:tc>
-                <a:tc>
-                  <a:txBody>
-                    <a:bodyPr/>
-                    <a:lstStyle/>
-                    <a:p>
-                      <a:r>
-                        <a:rPr lang="en-US" dirty="0"/>
-                        <a:t>1.05</a:t>
-                      </a:r>
-                    </a:p>
-                  </a:txBody>
-                  <a:tcPr/>
-                </a:tc>
-                <a:tc>
-                  <a:txBody>
-                    <a:bodyPr/>
-                    <a:lstStyle/>
-                    <a:p>
-                      <a:r>
-                        <a:rPr lang="en-PH" sz="1800" b="0" i="0" kern="1200" dirty="0">
-                          <a:solidFill>
-                            <a:schemeClr val="dk1"/>
-                          </a:solidFill>
-                          <a:effectLst/>
-                          <a:latin typeface="+mn-lt"/>
-                          <a:ea typeface="+mn-ea"/>
-                          <a:cs typeface="+mn-cs"/>
-                        </a:rPr>
-                        <a:t>211,885</a:t>
-                      </a:r>
-                      <a:endParaRPr lang="en-US" dirty="0"/>
-                    </a:p>
-                  </a:txBody>
-                  <a:tcPr/>
-                </a:tc>
-                <a:extLst>
-                  <a:ext uri="{0D108BD9-81ED-4DB2-BD59-A6C34878D82A}">
-                    <a16:rowId xmlns:a16="http://schemas.microsoft.com/office/drawing/2014/main" val="485612198"/>
-                  </a:ext>
-                </a:extLst>
-              </a:tr>
-              <a:tr h="408674">
-                <a:tc>
-                  <a:txBody>
-                    <a:bodyPr/>
-                    <a:lstStyle/>
-                    <a:p>
-                      <a:r>
-                        <a:rPr lang="en-US" dirty="0"/>
-                        <a:t>QLD</a:t>
-                      </a:r>
-                    </a:p>
-                  </a:txBody>
-                  <a:tcPr/>
-                </a:tc>
-                <a:tc>
-                  <a:txBody>
-                    <a:bodyPr/>
-                    <a:lstStyle/>
-                    <a:p>
-                      <a:r>
-                        <a:rPr lang="en-US" dirty="0"/>
-                        <a:t>19.06%</a:t>
-                      </a:r>
-                    </a:p>
-                  </a:txBody>
-                  <a:tcPr/>
-                </a:tc>
-                <a:tc>
-                  <a:txBody>
-                    <a:bodyPr/>
-                    <a:lstStyle/>
-                    <a:p>
-                      <a:r>
-                        <a:rPr lang="en-US" dirty="0"/>
-                        <a:t>19.95%</a:t>
-                      </a:r>
-                    </a:p>
-                  </a:txBody>
-                  <a:tcPr/>
-                </a:tc>
-                <a:tc>
-                  <a:txBody>
-                    <a:bodyPr/>
-                    <a:lstStyle/>
-                    <a:p>
-                      <a:r>
-                        <a:rPr lang="en-US" dirty="0"/>
-                        <a:t>1.05</a:t>
-                      </a:r>
-                    </a:p>
-                  </a:txBody>
-                  <a:tcPr/>
-                </a:tc>
-                <a:tc>
-                  <a:txBody>
-                    <a:bodyPr/>
-                    <a:lstStyle/>
-                    <a:p>
-                      <a:r>
-                        <a:rPr lang="en-PH" sz="1800" b="0" i="0" kern="1200" dirty="0">
-                          <a:solidFill>
-                            <a:schemeClr val="dk1"/>
-                          </a:solidFill>
-                          <a:effectLst/>
-                          <a:latin typeface="+mn-lt"/>
-                          <a:ea typeface="+mn-ea"/>
-                          <a:cs typeface="+mn-cs"/>
-                        </a:rPr>
-                        <a:t>166,2089</a:t>
-                      </a:r>
-                      <a:endParaRPr lang="en-US" dirty="0"/>
-                    </a:p>
-                  </a:txBody>
-                  <a:tcPr/>
-                </a:tc>
-                <a:extLst>
-                  <a:ext uri="{0D108BD9-81ED-4DB2-BD59-A6C34878D82A}">
-                    <a16:rowId xmlns:a16="http://schemas.microsoft.com/office/drawing/2014/main" val="1825124918"/>
-                  </a:ext>
-                </a:extLst>
-              </a:tr>
-              <a:tr h="408674">
-                <a:tc>
-                  <a:txBody>
-                    <a:bodyPr/>
-                    <a:lstStyle/>
-                    <a:p>
-                      <a:r>
-                        <a:rPr lang="en-US" dirty="0"/>
-                        <a:t>NSW</a:t>
-                      </a:r>
-                    </a:p>
-                  </a:txBody>
-                  <a:tcPr/>
-                </a:tc>
-                <a:tc>
-                  <a:txBody>
-                    <a:bodyPr/>
-                    <a:lstStyle/>
-                    <a:p>
-                      <a:r>
-                        <a:rPr lang="en-US" dirty="0"/>
-                        <a:t>33.30%</a:t>
-                      </a:r>
-                    </a:p>
-                  </a:txBody>
-                  <a:tcPr/>
-                </a:tc>
-                <a:tc>
-                  <a:txBody>
-                    <a:bodyPr/>
-                    <a:lstStyle/>
-                    <a:p>
-                      <a:r>
-                        <a:rPr lang="en-US" dirty="0"/>
-                        <a:t>32.35%</a:t>
-                      </a:r>
-                    </a:p>
-                  </a:txBody>
-                  <a:tcPr/>
-                </a:tc>
-                <a:tc>
-                  <a:txBody>
-                    <a:bodyPr/>
-                    <a:lstStyle/>
-                    <a:p>
-                      <a:r>
-                        <a:rPr lang="en-US" dirty="0"/>
-                        <a:t>0.97</a:t>
-                      </a:r>
-                    </a:p>
-                  </a:txBody>
-                  <a:tcPr/>
-                </a:tc>
-                <a:tc>
-                  <a:txBody>
-                    <a:bodyPr/>
-                    <a:lstStyle/>
-                    <a:p>
-                      <a:r>
-                        <a:rPr lang="en-PH" sz="1800" b="0" i="0" kern="1200" dirty="0">
-                          <a:solidFill>
-                            <a:schemeClr val="dk1"/>
-                          </a:solidFill>
-                          <a:effectLst/>
-                          <a:latin typeface="+mn-lt"/>
-                          <a:ea typeface="+mn-ea"/>
-                          <a:cs typeface="+mn-cs"/>
-                        </a:rPr>
-                        <a:t>2,695,373</a:t>
-                      </a:r>
-                      <a:endParaRPr lang="en-US" dirty="0"/>
-                    </a:p>
-                  </a:txBody>
-                  <a:tcPr/>
-                </a:tc>
-                <a:extLst>
-                  <a:ext uri="{0D108BD9-81ED-4DB2-BD59-A6C34878D82A}">
-                    <a16:rowId xmlns:a16="http://schemas.microsoft.com/office/drawing/2014/main" val="2408441376"/>
-                  </a:ext>
-                </a:extLst>
-              </a:tr>
-              <a:tr h="408674">
-                <a:tc>
-                  <a:txBody>
-                    <a:bodyPr/>
-                    <a:lstStyle/>
-                    <a:p>
-                      <a:r>
-                        <a:rPr lang="en-US" dirty="0"/>
-                        <a:t>VIC</a:t>
-                      </a:r>
-                    </a:p>
-                  </a:txBody>
-                  <a:tcPr/>
-                </a:tc>
-                <a:tc>
-                  <a:txBody>
-                    <a:bodyPr/>
-                    <a:lstStyle/>
-                    <a:p>
-                      <a:r>
-                        <a:rPr lang="en-US" dirty="0"/>
-                        <a:t>26.21%</a:t>
-                      </a:r>
-                    </a:p>
-                  </a:txBody>
-                  <a:tcPr/>
-                </a:tc>
-                <a:tc>
-                  <a:txBody>
-                    <a:bodyPr/>
-                    <a:lstStyle/>
-                    <a:p>
-                      <a:r>
-                        <a:rPr lang="en-US" dirty="0"/>
-                        <a:t>25.16%</a:t>
-                      </a:r>
-                    </a:p>
-                  </a:txBody>
-                  <a:tcPr/>
-                </a:tc>
-                <a:tc>
-                  <a:txBody>
-                    <a:bodyPr/>
-                    <a:lstStyle/>
-                    <a:p>
-                      <a:r>
-                        <a:rPr lang="en-US" dirty="0"/>
-                        <a:t>0.96</a:t>
-                      </a:r>
-                    </a:p>
-                  </a:txBody>
-                  <a:tcPr/>
-                </a:tc>
-                <a:tc>
-                  <a:txBody>
-                    <a:bodyPr/>
-                    <a:lstStyle/>
-                    <a:p>
-                      <a:r>
-                        <a:rPr lang="en-PH" sz="1800" b="0" i="0" kern="1200" dirty="0">
-                          <a:solidFill>
-                            <a:schemeClr val="dk1"/>
-                          </a:solidFill>
-                          <a:effectLst/>
-                          <a:latin typeface="+mn-lt"/>
-                          <a:ea typeface="+mn-ea"/>
-                          <a:cs typeface="+mn-cs"/>
-                        </a:rPr>
-                        <a:t>2,096,751</a:t>
-                      </a:r>
-                      <a:endParaRPr lang="en-US" dirty="0"/>
-                    </a:p>
-                  </a:txBody>
-                  <a:tcPr/>
-                </a:tc>
-                <a:extLst>
-                  <a:ext uri="{0D108BD9-81ED-4DB2-BD59-A6C34878D82A}">
-                    <a16:rowId xmlns:a16="http://schemas.microsoft.com/office/drawing/2014/main" val="2719133994"/>
-                  </a:ext>
-                </a:extLst>
-              </a:tr>
-              <a:tr h="408674">
-                <a:tc>
-                  <a:txBody>
-                    <a:bodyPr/>
-                    <a:lstStyle/>
-                    <a:p>
-                      <a:r>
-                        <a:rPr lang="en-US" dirty="0"/>
-                        <a:t>SA</a:t>
-                      </a:r>
-                    </a:p>
-                  </a:txBody>
-                  <a:tcPr/>
-                </a:tc>
-                <a:tc>
-                  <a:txBody>
-                    <a:bodyPr/>
-                    <a:lstStyle/>
-                    <a:p>
-                      <a:r>
-                        <a:rPr lang="en-US" dirty="0"/>
-                        <a:t>8.78%</a:t>
-                      </a:r>
-                    </a:p>
-                  </a:txBody>
-                  <a:tcPr/>
-                </a:tc>
-                <a:tc>
-                  <a:txBody>
-                    <a:bodyPr/>
-                    <a:lstStyle/>
-                    <a:p>
-                      <a:r>
-                        <a:rPr lang="en-US" dirty="0"/>
-                        <a:t>7.79%</a:t>
-                      </a:r>
-                    </a:p>
-                  </a:txBody>
-                  <a:tcPr/>
-                </a:tc>
-                <a:tc>
-                  <a:txBody>
-                    <a:bodyPr/>
-                    <a:lstStyle/>
-                    <a:p>
-                      <a:r>
-                        <a:rPr lang="en-US" dirty="0"/>
-                        <a:t>0.89</a:t>
-                      </a:r>
-                    </a:p>
-                  </a:txBody>
-                  <a:tcPr/>
-                </a:tc>
-                <a:tc>
-                  <a:txBody>
-                    <a:bodyPr/>
-                    <a:lstStyle/>
-                    <a:p>
-                      <a:r>
-                        <a:rPr lang="en-PH" sz="1800" b="0" i="0" kern="1200" dirty="0">
-                          <a:solidFill>
-                            <a:schemeClr val="dk1"/>
-                          </a:solidFill>
-                          <a:effectLst/>
-                          <a:latin typeface="+mn-lt"/>
-                          <a:ea typeface="+mn-ea"/>
-                          <a:cs typeface="+mn-cs"/>
-                        </a:rPr>
-                        <a:t>649,483</a:t>
-                      </a:r>
-                      <a:endParaRPr lang="en-US" dirty="0"/>
-                    </a:p>
-                  </a:txBody>
-                  <a:tcPr/>
-                </a:tc>
-                <a:extLst>
-                  <a:ext uri="{0D108BD9-81ED-4DB2-BD59-A6C34878D82A}">
-                    <a16:rowId xmlns:a16="http://schemas.microsoft.com/office/drawing/2014/main" val="1659587602"/>
-                  </a:ext>
-                </a:extLst>
-              </a:tr>
-            </a:tbl>
-          </a:graphicData>
-        </a:graphic>
-      </p:graphicFrame>
-    </p:spTree>
-    <p:extLst>
-      <p:ext uri="{BB962C8B-B14F-4D97-AF65-F5344CB8AC3E}">
-        <p14:creationId xmlns:p14="http://schemas.microsoft.com/office/powerpoint/2010/main" val="3703574678"/>
-      </p:ext>
-    </p:extLst>
-  </p:cSld>
-  <p:clrMapOvr>
-    <a:masterClrMapping/>
-  </p:clrMapOvr>
-</p:sld>
-</file>
-
-<file path=ppt/slides/slide16.xml><?xml version="1.0" encoding="utf-8"?>
 <p:sld xmlns:a="http://schemas.openxmlformats.org/drawingml/2006/main" xmlns:r="http://schemas.openxmlformats.org/officeDocument/2006/relationships" xmlns:p="http://schemas.openxmlformats.org/presentationml/2006/main">
   <p:cSld>
     <p:spTree>

</xml_diff>